<commit_message>
Ppt designeolása és bővítése
</commit_message>
<xml_diff>
--- a/Beadandó VJ.pptx
+++ b/Beadandó VJ.pptx
@@ -10,10 +10,12 @@
     <p:sldId id="259" r:id="rId7"/>
     <p:sldId id="258" r:id="rId8"/>
     <p:sldId id="260" r:id="rId9"/>
-    <p:sldId id="266" r:id="rId10"/>
-    <p:sldId id="265" r:id="rId11"/>
-    <p:sldId id="264" r:id="rId12"/>
-    <p:sldId id="263" r:id="rId13"/>
+    <p:sldId id="267" r:id="rId10"/>
+    <p:sldId id="266" r:id="rId11"/>
+    <p:sldId id="268" r:id="rId12"/>
+    <p:sldId id="265" r:id="rId13"/>
+    <p:sldId id="264" r:id="rId14"/>
+    <p:sldId id="263" r:id="rId15"/>
   </p:sldIdLst>
   <p:sldSz cx="12192000" cy="6858000"/>
   <p:notesSz cx="6858000" cy="9144000"/>
@@ -358,7 +360,7 @@
           <a:p>
             <a:fld id="{8F5A1913-C1B8-42A7-81A1-2FE1D24E3BD3}" type="datetimeFigureOut">
               <a:rPr lang="hu-HU" smtClean="0"/>
-              <a:t>2022. 09. 12.</a:t>
+              <a:t>2022.09.13.</a:t>
             </a:fld>
             <a:endParaRPr lang="hu-HU"/>
           </a:p>
@@ -566,7 +568,7 @@
           <a:p>
             <a:fld id="{8F5A1913-C1B8-42A7-81A1-2FE1D24E3BD3}" type="datetimeFigureOut">
               <a:rPr lang="hu-HU" smtClean="0"/>
-              <a:t>2022. 09. 12.</a:t>
+              <a:t>2022.09.13.</a:t>
             </a:fld>
             <a:endParaRPr lang="hu-HU"/>
           </a:p>
@@ -822,7 +824,7 @@
           <a:p>
             <a:fld id="{8F5A1913-C1B8-42A7-81A1-2FE1D24E3BD3}" type="datetimeFigureOut">
               <a:rPr lang="hu-HU" smtClean="0"/>
-              <a:t>2022. 09. 12.</a:t>
+              <a:t>2022.09.13.</a:t>
             </a:fld>
             <a:endParaRPr lang="hu-HU"/>
           </a:p>
@@ -996,7 +998,7 @@
           <a:p>
             <a:fld id="{8F5A1913-C1B8-42A7-81A1-2FE1D24E3BD3}" type="datetimeFigureOut">
               <a:rPr lang="hu-HU" smtClean="0"/>
-              <a:t>2022. 09. 12.</a:t>
+              <a:t>2022.09.13.</a:t>
             </a:fld>
             <a:endParaRPr lang="hu-HU"/>
           </a:p>
@@ -1339,7 +1341,7 @@
           <a:p>
             <a:fld id="{8F5A1913-C1B8-42A7-81A1-2FE1D24E3BD3}" type="datetimeFigureOut">
               <a:rPr lang="hu-HU" smtClean="0"/>
-              <a:t>2022. 09. 12.</a:t>
+              <a:t>2022.09.13.</a:t>
             </a:fld>
             <a:endParaRPr lang="hu-HU"/>
           </a:p>
@@ -1614,7 +1616,7 @@
           <a:p>
             <a:fld id="{8F5A1913-C1B8-42A7-81A1-2FE1D24E3BD3}" type="datetimeFigureOut">
               <a:rPr lang="hu-HU" smtClean="0"/>
-              <a:t>2022. 09. 12.</a:t>
+              <a:t>2022.09.13.</a:t>
             </a:fld>
             <a:endParaRPr lang="hu-HU"/>
           </a:p>
@@ -1993,7 +1995,7 @@
           <a:p>
             <a:fld id="{8F5A1913-C1B8-42A7-81A1-2FE1D24E3BD3}" type="datetimeFigureOut">
               <a:rPr lang="hu-HU" smtClean="0"/>
-              <a:t>2022. 09. 12.</a:t>
+              <a:t>2022.09.13.</a:t>
             </a:fld>
             <a:endParaRPr lang="hu-HU"/>
           </a:p>
@@ -2111,7 +2113,7 @@
           <a:p>
             <a:fld id="{8F5A1913-C1B8-42A7-81A1-2FE1D24E3BD3}" type="datetimeFigureOut">
               <a:rPr lang="hu-HU" smtClean="0"/>
-              <a:t>2022. 09. 12.</a:t>
+              <a:t>2022.09.13.</a:t>
             </a:fld>
             <a:endParaRPr lang="hu-HU"/>
           </a:p>
@@ -2282,7 +2284,7 @@
           <a:p>
             <a:fld id="{8F5A1913-C1B8-42A7-81A1-2FE1D24E3BD3}" type="datetimeFigureOut">
               <a:rPr lang="hu-HU" smtClean="0"/>
-              <a:t>2022. 09. 12.</a:t>
+              <a:t>2022.09.13.</a:t>
             </a:fld>
             <a:endParaRPr lang="hu-HU"/>
           </a:p>
@@ -2636,7 +2638,7 @@
           <a:p>
             <a:fld id="{8F5A1913-C1B8-42A7-81A1-2FE1D24E3BD3}" type="datetimeFigureOut">
               <a:rPr lang="hu-HU" smtClean="0"/>
-              <a:t>2022. 09. 12.</a:t>
+              <a:t>2022.09.13.</a:t>
             </a:fld>
             <a:endParaRPr lang="hu-HU"/>
           </a:p>
@@ -3018,7 +3020,7 @@
           <a:p>
             <a:fld id="{8F5A1913-C1B8-42A7-81A1-2FE1D24E3BD3}" type="datetimeFigureOut">
               <a:rPr lang="hu-HU" smtClean="0"/>
-              <a:t>2022. 09. 12.</a:t>
+              <a:t>2022.09.13.</a:t>
             </a:fld>
             <a:endParaRPr lang="hu-HU"/>
           </a:p>
@@ -3305,7 +3307,7 @@
           <a:p>
             <a:fld id="{8F5A1913-C1B8-42A7-81A1-2FE1D24E3BD3}" type="datetimeFigureOut">
               <a:rPr lang="hu-HU" smtClean="0"/>
-              <a:t>2022. 09. 12.</a:t>
+              <a:t>2022.09.13.</a:t>
             </a:fld>
             <a:endParaRPr lang="hu-HU"/>
           </a:p>
@@ -3928,6 +3930,340 @@
 </p:sld>
 </file>
 
+<file path=ppt/slides/slide10.xml><?xml version="1.0" encoding="utf-8"?>
+<p:sld xmlns:a="http://schemas.openxmlformats.org/drawingml/2006/main" xmlns:r="http://schemas.openxmlformats.org/officeDocument/2006/relationships" xmlns:p="http://schemas.openxmlformats.org/presentationml/2006/main">
+  <p:cSld>
+    <p:spTree>
+      <p:nvGrpSpPr>
+        <p:cNvPr id="1" name=""/>
+        <p:cNvGrpSpPr/>
+        <p:nvPr/>
+      </p:nvGrpSpPr>
+      <p:grpSpPr>
+        <a:xfrm>
+          <a:off x="0" y="0"/>
+          <a:ext cx="0" cy="0"/>
+          <a:chOff x="0" y="0"/>
+          <a:chExt cx="0" cy="0"/>
+        </a:xfrm>
+      </p:grpSpPr>
+      <p:sp>
+        <p:nvSpPr>
+          <p:cNvPr id="2" name="Cím 1"/>
+          <p:cNvSpPr>
+            <a:spLocks noGrp="1"/>
+          </p:cNvSpPr>
+          <p:nvPr>
+            <p:ph type="title"/>
+          </p:nvPr>
+        </p:nvSpPr>
+        <p:spPr>
+          <a:xfrm>
+            <a:off x="3213100" y="2679700"/>
+            <a:ext cx="6134100" cy="723900"/>
+          </a:xfrm>
+        </p:spPr>
+        <p:txBody>
+          <a:bodyPr>
+            <a:noAutofit/>
+          </a:bodyPr>
+          <a:lstStyle/>
+          <a:p>
+            <a:r>
+              <a:rPr lang="hu-HU" dirty="0">
+                <a:latin typeface="Times New Roman" panose="02020603050405020304" pitchFamily="18" charset="0"/>
+                <a:cs typeface="Times New Roman" panose="02020603050405020304" pitchFamily="18" charset="0"/>
+              </a:rPr>
+              <a:t>Köszönöm a figyelmet! </a:t>
+            </a:r>
+          </a:p>
+        </p:txBody>
+      </p:sp>
+      <p:pic>
+        <p:nvPicPr>
+          <p:cNvPr id="3" name="Kép 2"/>
+          <p:cNvPicPr>
+            <a:picLocks noChangeAspect="1"/>
+          </p:cNvPicPr>
+          <p:nvPr/>
+        </p:nvPicPr>
+        <p:blipFill>
+          <a:blip r:embed="rId2"/>
+          <a:stretch>
+            <a:fillRect/>
+          </a:stretch>
+        </p:blipFill>
+        <p:spPr>
+          <a:xfrm>
+            <a:off x="973137" y="1612900"/>
+            <a:ext cx="10177463" cy="219075"/>
+          </a:xfrm>
+          <a:prstGeom prst="rect">
+            <a:avLst/>
+          </a:prstGeom>
+        </p:spPr>
+      </p:pic>
+    </p:spTree>
+    <p:extLst>
+      <p:ext uri="{BB962C8B-B14F-4D97-AF65-F5344CB8AC3E}">
+        <p14:creationId xmlns:p14="http://schemas.microsoft.com/office/powerpoint/2010/main" val="127159379"/>
+      </p:ext>
+    </p:extLst>
+  </p:cSld>
+  <p:clrMapOvr>
+    <a:masterClrMapping/>
+  </p:clrMapOvr>
+</p:sld>
+</file>
+
+<file path=ppt/slides/slide11.xml><?xml version="1.0" encoding="utf-8"?>
+<p:sld xmlns:a="http://schemas.openxmlformats.org/drawingml/2006/main" xmlns:r="http://schemas.openxmlformats.org/officeDocument/2006/relationships" xmlns:p="http://schemas.openxmlformats.org/presentationml/2006/main">
+  <p:cSld>
+    <p:spTree>
+      <p:nvGrpSpPr>
+        <p:cNvPr id="1" name=""/>
+        <p:cNvGrpSpPr/>
+        <p:nvPr/>
+      </p:nvGrpSpPr>
+      <p:grpSpPr>
+        <a:xfrm>
+          <a:off x="0" y="0"/>
+          <a:ext cx="0" cy="0"/>
+          <a:chOff x="0" y="0"/>
+          <a:chExt cx="0" cy="0"/>
+        </a:xfrm>
+      </p:grpSpPr>
+      <p:sp>
+        <p:nvSpPr>
+          <p:cNvPr id="2" name="Cím 1"/>
+          <p:cNvSpPr>
+            <a:spLocks noGrp="1"/>
+          </p:cNvSpPr>
+          <p:nvPr>
+            <p:ph type="title"/>
+          </p:nvPr>
+        </p:nvSpPr>
+        <p:spPr>
+          <a:xfrm>
+            <a:off x="1097280" y="286603"/>
+            <a:ext cx="3220720" cy="1465997"/>
+          </a:xfrm>
+        </p:spPr>
+        <p:txBody>
+          <a:bodyPr/>
+          <a:lstStyle/>
+          <a:p>
+            <a:r>
+              <a:rPr lang="hu-HU" dirty="0">
+                <a:latin typeface="Times New Roman" panose="02020603050405020304" pitchFamily="18" charset="0"/>
+                <a:cs typeface="Times New Roman" panose="02020603050405020304" pitchFamily="18" charset="0"/>
+              </a:rPr>
+              <a:t>Forrás</a:t>
+            </a:r>
+          </a:p>
+        </p:txBody>
+      </p:sp>
+      <p:sp>
+        <p:nvSpPr>
+          <p:cNvPr id="3" name="Tartalom helye 2"/>
+          <p:cNvSpPr>
+            <a:spLocks noGrp="1"/>
+          </p:cNvSpPr>
+          <p:nvPr>
+            <p:ph idx="1"/>
+          </p:nvPr>
+        </p:nvSpPr>
+        <p:spPr>
+          <a:xfrm>
+            <a:off x="1097280" y="1845734"/>
+            <a:ext cx="3627120" cy="2154766"/>
+          </a:xfrm>
+        </p:spPr>
+        <p:txBody>
+          <a:bodyPr/>
+          <a:lstStyle/>
+          <a:p>
+            <a:r>
+              <a:rPr lang="hu-HU" dirty="0">
+                <a:solidFill>
+                  <a:schemeClr val="tx1">
+                    <a:lumMod val="95000"/>
+                    <a:lumOff val="5000"/>
+                  </a:schemeClr>
+                </a:solidFill>
+                <a:hlinkClick r:id="rId2"/>
+              </a:rPr>
+              <a:t>https://tinyurl.com/c564n5k2</a:t>
+            </a:r>
+            <a:endParaRPr lang="hu-HU" dirty="0">
+              <a:solidFill>
+                <a:schemeClr val="tx1">
+                  <a:lumMod val="95000"/>
+                  <a:lumOff val="5000"/>
+                </a:schemeClr>
+              </a:solidFill>
+            </a:endParaRPr>
+          </a:p>
+          <a:p>
+            <a:r>
+              <a:rPr lang="hu-HU" dirty="0">
+                <a:solidFill>
+                  <a:schemeClr val="tx1">
+                    <a:lumMod val="95000"/>
+                    <a:lumOff val="5000"/>
+                  </a:schemeClr>
+                </a:solidFill>
+                <a:hlinkClick r:id="rId3"/>
+              </a:rPr>
+              <a:t>https://tinyurl.com/rjnvs4ff</a:t>
+            </a:r>
+            <a:r>
+              <a:rPr lang="hu-HU" dirty="0">
+                <a:solidFill>
+                  <a:schemeClr val="tx1">
+                    <a:lumMod val="95000"/>
+                    <a:lumOff val="5000"/>
+                  </a:schemeClr>
+                </a:solidFill>
+              </a:rPr>
+              <a:t> </a:t>
+            </a:r>
+          </a:p>
+          <a:p>
+            <a:r>
+              <a:rPr lang="hu-HU" dirty="0">
+                <a:solidFill>
+                  <a:schemeClr val="tx1">
+                    <a:lumMod val="95000"/>
+                    <a:lumOff val="5000"/>
+                  </a:schemeClr>
+                </a:solidFill>
+                <a:hlinkClick r:id="rId4"/>
+              </a:rPr>
+              <a:t>https://tinyurl.com/a6btrmyp</a:t>
+            </a:r>
+            <a:endParaRPr lang="hu-HU" dirty="0">
+              <a:solidFill>
+                <a:schemeClr val="tx1">
+                  <a:lumMod val="95000"/>
+                  <a:lumOff val="5000"/>
+                </a:schemeClr>
+              </a:solidFill>
+            </a:endParaRPr>
+          </a:p>
+          <a:p>
+            <a:r>
+              <a:rPr lang="hu-HU" dirty="0">
+                <a:solidFill>
+                  <a:schemeClr val="tx1">
+                    <a:lumMod val="95000"/>
+                    <a:lumOff val="5000"/>
+                  </a:schemeClr>
+                </a:solidFill>
+                <a:hlinkClick r:id="rId5"/>
+              </a:rPr>
+              <a:t>https://</a:t>
+            </a:r>
+            <a:r>
+              <a:rPr lang="hu-HU" dirty="0" smtClean="0">
+                <a:solidFill>
+                  <a:schemeClr val="tx1">
+                    <a:lumMod val="95000"/>
+                    <a:lumOff val="5000"/>
+                  </a:schemeClr>
+                </a:solidFill>
+                <a:hlinkClick r:id="rId5"/>
+              </a:rPr>
+              <a:t>tinyurl.com/bdhw4ykw</a:t>
+            </a:r>
+            <a:endParaRPr lang="hu-HU" dirty="0" smtClean="0">
+              <a:solidFill>
+                <a:schemeClr val="tx1">
+                  <a:lumMod val="95000"/>
+                  <a:lumOff val="5000"/>
+                </a:schemeClr>
+              </a:solidFill>
+            </a:endParaRPr>
+          </a:p>
+          <a:p>
+            <a:endParaRPr lang="hu-HU" dirty="0">
+              <a:solidFill>
+                <a:schemeClr val="tx1">
+                  <a:lumMod val="95000"/>
+                  <a:lumOff val="5000"/>
+                </a:schemeClr>
+              </a:solidFill>
+            </a:endParaRPr>
+          </a:p>
+          <a:p>
+            <a:endParaRPr lang="hu-HU" dirty="0" smtClean="0">
+              <a:solidFill>
+                <a:schemeClr val="tx1">
+                  <a:lumMod val="95000"/>
+                  <a:lumOff val="5000"/>
+                </a:schemeClr>
+              </a:solidFill>
+            </a:endParaRPr>
+          </a:p>
+          <a:p>
+            <a:endParaRPr lang="hu-HU" dirty="0">
+              <a:solidFill>
+                <a:schemeClr val="tx1">
+                  <a:lumMod val="95000"/>
+                  <a:lumOff val="5000"/>
+                </a:schemeClr>
+              </a:solidFill>
+            </a:endParaRPr>
+          </a:p>
+          <a:p>
+            <a:endParaRPr lang="hu-HU" dirty="0">
+              <a:solidFill>
+                <a:schemeClr val="tx1">
+                  <a:lumMod val="95000"/>
+                  <a:lumOff val="5000"/>
+                </a:schemeClr>
+              </a:solidFill>
+            </a:endParaRPr>
+          </a:p>
+        </p:txBody>
+      </p:sp>
+      <p:pic>
+        <p:nvPicPr>
+          <p:cNvPr id="4" name="Kép 3"/>
+          <p:cNvPicPr>
+            <a:picLocks noChangeAspect="1"/>
+          </p:cNvPicPr>
+          <p:nvPr/>
+        </p:nvPicPr>
+        <p:blipFill>
+          <a:blip r:embed="rId6"/>
+          <a:stretch>
+            <a:fillRect/>
+          </a:stretch>
+        </p:blipFill>
+        <p:spPr>
+          <a:xfrm>
+            <a:off x="1097280" y="1593689"/>
+            <a:ext cx="10193020" cy="252045"/>
+          </a:xfrm>
+          <a:prstGeom prst="rect">
+            <a:avLst/>
+          </a:prstGeom>
+        </p:spPr>
+      </p:pic>
+    </p:spTree>
+    <p:extLst>
+      <p:ext uri="{BB962C8B-B14F-4D97-AF65-F5344CB8AC3E}">
+        <p14:creationId xmlns:p14="http://schemas.microsoft.com/office/powerpoint/2010/main" val="4023112020"/>
+      </p:ext>
+    </p:extLst>
+  </p:cSld>
+  <p:clrMapOvr>
+    <a:masterClrMapping/>
+  </p:clrMapOvr>
+</p:sld>
+</file>
+
 <file path=ppt/slides/slide2.xml><?xml version="1.0" encoding="utf-8"?>
 <p:sld xmlns:a="http://schemas.openxmlformats.org/drawingml/2006/main" xmlns:r="http://schemas.openxmlformats.org/officeDocument/2006/relationships" xmlns:p="http://schemas.openxmlformats.org/presentationml/2006/main">
   <p:cSld>
@@ -3969,7 +4305,7 @@
         </p:blipFill>
         <p:spPr>
           <a:xfrm>
-            <a:off x="912685" y="1725726"/>
+            <a:off x="812800" y="1655254"/>
             <a:ext cx="10304463" cy="126107"/>
           </a:xfrm>
           <a:prstGeom prst="rect">
@@ -4064,7 +4400,7 @@
         </p:blipFill>
         <p:spPr bwMode="auto">
           <a:xfrm>
-            <a:off x="4648200" y="1074282"/>
+            <a:off x="4816642" y="1158503"/>
             <a:ext cx="6794500" cy="4246563"/>
           </a:xfrm>
           <a:prstGeom prst="rect">
@@ -4218,6 +4554,149 @@
           <a:bodyPr/>
           <a:lstStyle/>
           <a:p>
+            <a:r>
+              <a:rPr lang="hu-HU" sz="2400" dirty="0" smtClean="0">
+                <a:latin typeface="Times New Roman" panose="02020603050405020304" pitchFamily="18" charset="0"/>
+                <a:cs typeface="Times New Roman" panose="02020603050405020304" pitchFamily="18" charset="0"/>
+              </a:rPr>
+              <a:t> </a:t>
+            </a:r>
+            <a:r>
+              <a:rPr lang="hu-HU" sz="2400" dirty="0">
+                <a:latin typeface="Times New Roman" panose="02020603050405020304" pitchFamily="18" charset="0"/>
+                <a:cs typeface="Times New Roman" panose="02020603050405020304" pitchFamily="18" charset="0"/>
+              </a:rPr>
+              <a:t>operációs </a:t>
+            </a:r>
+            <a:r>
+              <a:rPr lang="hu-HU" sz="2400" dirty="0" smtClean="0">
+                <a:latin typeface="Times New Roman" panose="02020603050405020304" pitchFamily="18" charset="0"/>
+                <a:cs typeface="Times New Roman" panose="02020603050405020304" pitchFamily="18" charset="0"/>
+              </a:rPr>
+              <a:t>rendszerre</a:t>
+            </a:r>
+          </a:p>
+          <a:p>
+            <a:r>
+              <a:rPr lang="hu-HU" sz="2400" dirty="0">
+                <a:latin typeface="Times New Roman" panose="02020603050405020304" pitchFamily="18" charset="0"/>
+                <a:cs typeface="Times New Roman" panose="02020603050405020304" pitchFamily="18" charset="0"/>
+              </a:rPr>
+              <a:t/>
+            </a:r>
+            <a:br>
+              <a:rPr lang="hu-HU" sz="2400" dirty="0">
+                <a:latin typeface="Times New Roman" panose="02020603050405020304" pitchFamily="18" charset="0"/>
+                <a:cs typeface="Times New Roman" panose="02020603050405020304" pitchFamily="18" charset="0"/>
+              </a:rPr>
+            </a:br>
+            <a:r>
+              <a:rPr lang="hu-HU" sz="2400" dirty="0" smtClean="0">
+                <a:latin typeface="Times New Roman" panose="02020603050405020304" pitchFamily="18" charset="0"/>
+                <a:cs typeface="Times New Roman" panose="02020603050405020304" pitchFamily="18" charset="0"/>
+              </a:rPr>
+              <a:t> </a:t>
+            </a:r>
+            <a:r>
+              <a:rPr lang="hu-HU" sz="2400" dirty="0">
+                <a:latin typeface="Times New Roman" panose="02020603050405020304" pitchFamily="18" charset="0"/>
+                <a:cs typeface="Times New Roman" panose="02020603050405020304" pitchFamily="18" charset="0"/>
+              </a:rPr>
+              <a:t>hálózati </a:t>
+            </a:r>
+            <a:r>
+              <a:rPr lang="hu-HU" sz="2400" dirty="0" smtClean="0">
+                <a:latin typeface="Times New Roman" panose="02020603050405020304" pitchFamily="18" charset="0"/>
+                <a:cs typeface="Times New Roman" panose="02020603050405020304" pitchFamily="18" charset="0"/>
+              </a:rPr>
+              <a:t>kártyára</a:t>
+            </a:r>
+            <a:r>
+              <a:rPr lang="hu-HU" sz="2400" dirty="0">
+                <a:latin typeface="Times New Roman" panose="02020603050405020304" pitchFamily="18" charset="0"/>
+                <a:cs typeface="Times New Roman" panose="02020603050405020304" pitchFamily="18" charset="0"/>
+              </a:rPr>
+              <a:t/>
+            </a:r>
+            <a:br>
+              <a:rPr lang="hu-HU" sz="2400" dirty="0">
+                <a:latin typeface="Times New Roman" panose="02020603050405020304" pitchFamily="18" charset="0"/>
+                <a:cs typeface="Times New Roman" panose="02020603050405020304" pitchFamily="18" charset="0"/>
+              </a:rPr>
+            </a:br>
+            <a:endParaRPr lang="hu-HU" sz="2400" dirty="0" smtClean="0">
+              <a:latin typeface="Times New Roman" panose="02020603050405020304" pitchFamily="18" charset="0"/>
+              <a:cs typeface="Times New Roman" panose="02020603050405020304" pitchFamily="18" charset="0"/>
+            </a:endParaRPr>
+          </a:p>
+          <a:p>
+            <a:r>
+              <a:rPr lang="hu-HU" sz="2400" dirty="0" smtClean="0">
+                <a:latin typeface="Times New Roman" panose="02020603050405020304" pitchFamily="18" charset="0"/>
+                <a:cs typeface="Times New Roman" panose="02020603050405020304" pitchFamily="18" charset="0"/>
+              </a:rPr>
+              <a:t> </a:t>
+            </a:r>
+            <a:r>
+              <a:rPr lang="hu-HU" sz="2400" dirty="0">
+                <a:latin typeface="Times New Roman" panose="02020603050405020304" pitchFamily="18" charset="0"/>
+                <a:cs typeface="Times New Roman" panose="02020603050405020304" pitchFamily="18" charset="0"/>
+              </a:rPr>
+              <a:t>átviteli </a:t>
+            </a:r>
+            <a:r>
+              <a:rPr lang="hu-HU" sz="2400" dirty="0" smtClean="0">
+                <a:latin typeface="Times New Roman" panose="02020603050405020304" pitchFamily="18" charset="0"/>
+                <a:cs typeface="Times New Roman" panose="02020603050405020304" pitchFamily="18" charset="0"/>
+              </a:rPr>
+              <a:t>közegre</a:t>
+            </a:r>
+            <a:r>
+              <a:rPr lang="hu-HU" sz="2400" dirty="0">
+                <a:latin typeface="Times New Roman" panose="02020603050405020304" pitchFamily="18" charset="0"/>
+                <a:cs typeface="Times New Roman" panose="02020603050405020304" pitchFamily="18" charset="0"/>
+              </a:rPr>
+              <a:t/>
+            </a:r>
+            <a:br>
+              <a:rPr lang="hu-HU" sz="2400" dirty="0">
+                <a:latin typeface="Times New Roman" panose="02020603050405020304" pitchFamily="18" charset="0"/>
+                <a:cs typeface="Times New Roman" panose="02020603050405020304" pitchFamily="18" charset="0"/>
+              </a:rPr>
+            </a:br>
+            <a:endParaRPr lang="hu-HU" sz="2400" dirty="0" smtClean="0">
+              <a:latin typeface="Times New Roman" panose="02020603050405020304" pitchFamily="18" charset="0"/>
+              <a:cs typeface="Times New Roman" panose="02020603050405020304" pitchFamily="18" charset="0"/>
+            </a:endParaRPr>
+          </a:p>
+          <a:p>
+            <a:r>
+              <a:rPr lang="hu-HU" sz="2400" dirty="0" smtClean="0">
+                <a:latin typeface="Times New Roman" panose="02020603050405020304" pitchFamily="18" charset="0"/>
+                <a:cs typeface="Times New Roman" panose="02020603050405020304" pitchFamily="18" charset="0"/>
+              </a:rPr>
+              <a:t> </a:t>
+            </a:r>
+            <a:r>
+              <a:rPr lang="hu-HU" sz="2400" dirty="0">
+                <a:latin typeface="Times New Roman" panose="02020603050405020304" pitchFamily="18" charset="0"/>
+                <a:cs typeface="Times New Roman" panose="02020603050405020304" pitchFamily="18" charset="0"/>
+              </a:rPr>
+              <a:t>kapcsoló </a:t>
+            </a:r>
+            <a:r>
+              <a:rPr lang="hu-HU" sz="2400" dirty="0" smtClean="0">
+                <a:latin typeface="Times New Roman" panose="02020603050405020304" pitchFamily="18" charset="0"/>
+                <a:cs typeface="Times New Roman" panose="02020603050405020304" pitchFamily="18" charset="0"/>
+              </a:rPr>
+              <a:t>elemekre</a:t>
+            </a:r>
+            <a:endParaRPr lang="hu-HU" sz="2400" dirty="0">
+              <a:latin typeface="Times New Roman" panose="02020603050405020304" pitchFamily="18" charset="0"/>
+              <a:cs typeface="Times New Roman" panose="02020603050405020304" pitchFamily="18" charset="0"/>
+            </a:endParaRPr>
+          </a:p>
+          <a:p>
             <a:endParaRPr lang="hu-HU" dirty="0"/>
           </a:p>
         </p:txBody>
@@ -4230,8 +4709,8 @@
         </p:nvSpPr>
         <p:spPr>
           <a:xfrm>
-            <a:off x="10701020" y="5948562"/>
-            <a:ext cx="1374094" cy="215444"/>
+            <a:off x="6715558" y="5626522"/>
+            <a:ext cx="1399742" cy="215444"/>
           </a:xfrm>
           <a:prstGeom prst="rect">
             <a:avLst/>
@@ -4246,43 +4725,53 @@
           <a:p>
             <a:r>
               <a:rPr lang="hu-HU" sz="800" dirty="0"/>
-              <a:t>https://tinyurl.com/46hfejf3</a:t>
-            </a:r>
-          </a:p>
-        </p:txBody>
-      </p:sp>
-      <p:sp>
-        <p:nvSpPr>
-          <p:cNvPr id="5" name="Szövegdoboz 4">
+              <a:t>https://tinyurl.com/5n7yzr2c</a:t>
+            </a:r>
+            <a:endParaRPr lang="hu-HU" sz="800" dirty="0"/>
+          </a:p>
+        </p:txBody>
+      </p:sp>
+      <p:pic>
+        <p:nvPicPr>
+          <p:cNvPr id="3074" name="Picture 2" descr="Hálózat | Hálózati kártya | mysoft.hu"/>
+          <p:cNvPicPr>
+            <a:picLocks noChangeAspect="1" noChangeArrowheads="1"/>
+          </p:cNvPicPr>
+          <p:nvPr/>
+        </p:nvPicPr>
+        <p:blipFill>
+          <a:blip r:embed="rId3">
             <a:extLst>
-              <a:ext uri="{FF2B5EF4-FFF2-40B4-BE49-F238E27FC236}">
-                <a16:creationId xmlns:a16="http://schemas.microsoft.com/office/drawing/2014/main" id="{CD342C70-B76E-CB0D-92F5-6744000A1342}"/>
+              <a:ext uri="{28A0092B-C50C-407E-A947-70E740481C1C}">
+                <a14:useLocalDpi xmlns:a14="http://schemas.microsoft.com/office/drawing/2010/main" val="0"/>
               </a:ext>
             </a:extLst>
-          </p:cNvPr>
-          <p:cNvSpPr txBox="1"/>
-          <p:nvPr/>
-        </p:nvSpPr>
-        <p:spPr>
-          <a:xfrm>
-            <a:off x="1308683" y="1912690"/>
-            <a:ext cx="9392337" cy="4178738"/>
+          </a:blip>
+          <a:srcRect/>
+          <a:stretch>
+            <a:fillRect/>
+          </a:stretch>
+        </p:blipFill>
+        <p:spPr bwMode="auto">
+          <a:xfrm>
+            <a:off x="5257800" y="1464825"/>
+            <a:ext cx="4168107" cy="4168107"/>
           </a:xfrm>
           <a:prstGeom prst="rect">
             <a:avLst/>
           </a:prstGeom>
           <a:noFill/>
-        </p:spPr>
-        <p:txBody>
-          <a:bodyPr wrap="square" rtlCol="0">
-            <a:spAutoFit/>
-          </a:bodyPr>
-          <a:lstStyle/>
-          <a:p>
-            <a:endParaRPr lang="hu-HU" dirty="0"/>
-          </a:p>
-        </p:txBody>
-      </p:sp>
+          <a:extLst>
+            <a:ext uri="{909E8E84-426E-40DD-AFC4-6F175D3DCCD1}">
+              <a14:hiddenFill xmlns:a14="http://schemas.microsoft.com/office/drawing/2010/main">
+                <a:solidFill>
+                  <a:srgbClr val="FFFFFF"/>
+                </a:solidFill>
+              </a14:hiddenFill>
+            </a:ext>
+          </a:extLst>
+        </p:spPr>
+      </p:pic>
     </p:spTree>
     <p:extLst>
       <p:ext uri="{BB962C8B-B14F-4D97-AF65-F5344CB8AC3E}">
@@ -4547,7 +5036,7 @@
         </p:blipFill>
         <p:spPr>
           <a:xfrm>
-            <a:off x="1097280" y="1637295"/>
+            <a:off x="988996" y="1637295"/>
             <a:ext cx="10101263" cy="314961"/>
           </a:xfrm>
           <a:prstGeom prst="rect">
@@ -4610,12 +5099,16 @@
           <a:lstStyle/>
           <a:p>
             <a:r>
-              <a:rPr lang="hu-HU" sz="2400" dirty="0">
+              <a:rPr lang="hu-HU" sz="2400" dirty="0" smtClean="0">
                 <a:latin typeface="Times New Roman" panose="02020603050405020304" pitchFamily="18" charset="0"/>
                 <a:cs typeface="Times New Roman" panose="02020603050405020304" pitchFamily="18" charset="0"/>
               </a:rPr>
               <a:t>PAN</a:t>
             </a:r>
+            <a:endParaRPr lang="hu-HU" sz="2400" dirty="0">
+              <a:latin typeface="Times New Roman" panose="02020603050405020304" pitchFamily="18" charset="0"/>
+              <a:cs typeface="Times New Roman" panose="02020603050405020304" pitchFamily="18" charset="0"/>
+            </a:endParaRPr>
           </a:p>
           <a:p>
             <a:r>
@@ -4675,7 +5168,7 @@
         </p:blipFill>
         <p:spPr bwMode="auto">
           <a:xfrm>
-            <a:off x="5381952" y="1193800"/>
+            <a:off x="5953729" y="1036317"/>
             <a:ext cx="5667048" cy="4161739"/>
           </a:xfrm>
           <a:prstGeom prst="rect">
@@ -4776,9 +5269,145 @@
           <a:chExt cx="0" cy="0"/>
         </a:xfrm>
       </p:grpSpPr>
+      <p:sp>
+        <p:nvSpPr>
+          <p:cNvPr id="2" name="Cím 1"/>
+          <p:cNvSpPr>
+            <a:spLocks noGrp="1"/>
+          </p:cNvSpPr>
+          <p:nvPr>
+            <p:ph type="title"/>
+          </p:nvPr>
+        </p:nvSpPr>
+        <p:spPr>
+          <a:xfrm>
+            <a:off x="3116179" y="186538"/>
+            <a:ext cx="5440680" cy="1450757"/>
+          </a:xfrm>
+        </p:spPr>
+        <p:txBody>
+          <a:bodyPr>
+            <a:normAutofit/>
+          </a:bodyPr>
+          <a:lstStyle/>
+          <a:p>
+            <a:r>
+              <a:rPr lang="hu-HU" sz="4300" dirty="0" smtClean="0">
+                <a:latin typeface="Times New Roman" panose="02020603050405020304" pitchFamily="18" charset="0"/>
+                <a:cs typeface="Times New Roman" panose="02020603050405020304" pitchFamily="18" charset="0"/>
+              </a:rPr>
+              <a:t>Hálózati modellek</a:t>
+            </a:r>
+            <a:endParaRPr lang="hu-HU" sz="4300" dirty="0">
+              <a:latin typeface="Times New Roman" panose="02020603050405020304" pitchFamily="18" charset="0"/>
+              <a:cs typeface="Times New Roman" panose="02020603050405020304" pitchFamily="18" charset="0"/>
+            </a:endParaRPr>
+          </a:p>
+        </p:txBody>
+      </p:sp>
+      <p:sp>
+        <p:nvSpPr>
+          <p:cNvPr id="3" name="Tartalom helye 2"/>
+          <p:cNvSpPr>
+            <a:spLocks noGrp="1"/>
+          </p:cNvSpPr>
+          <p:nvPr>
+            <p:ph idx="1"/>
+          </p:nvPr>
+        </p:nvSpPr>
+        <p:spPr>
+          <a:xfrm>
+            <a:off x="923575" y="1952256"/>
+            <a:ext cx="3342373" cy="3592540"/>
+          </a:xfrm>
+        </p:spPr>
+        <p:txBody>
+          <a:bodyPr>
+            <a:normAutofit/>
+          </a:bodyPr>
+          <a:lstStyle/>
+          <a:p>
+            <a:endParaRPr lang="hu-HU" sz="2400" dirty="0" smtClean="0">
+              <a:latin typeface="Times New Roman" panose="02020603050405020304" pitchFamily="18" charset="0"/>
+              <a:cs typeface="Times New Roman" panose="02020603050405020304" pitchFamily="18" charset="0"/>
+            </a:endParaRPr>
+          </a:p>
+          <a:p>
+            <a:r>
+              <a:rPr lang="hu-HU" sz="2400" dirty="0" smtClean="0">
+                <a:latin typeface="Times New Roman" panose="02020603050405020304" pitchFamily="18" charset="0"/>
+                <a:cs typeface="Times New Roman" panose="02020603050405020304" pitchFamily="18" charset="0"/>
+              </a:rPr>
+              <a:t>Kliens Server Modell</a:t>
+            </a:r>
+          </a:p>
+          <a:p>
+            <a:endParaRPr lang="hu-HU" sz="2400" dirty="0">
+              <a:latin typeface="Times New Roman" panose="02020603050405020304" pitchFamily="18" charset="0"/>
+              <a:cs typeface="Times New Roman" panose="02020603050405020304" pitchFamily="18" charset="0"/>
+            </a:endParaRPr>
+          </a:p>
+          <a:p>
+            <a:r>
+              <a:rPr lang="hu-HU" sz="2400" dirty="0" err="1" smtClean="0">
+                <a:latin typeface="Times New Roman" panose="02020603050405020304" pitchFamily="18" charset="0"/>
+                <a:cs typeface="Times New Roman" panose="02020603050405020304" pitchFamily="18" charset="0"/>
+              </a:rPr>
+              <a:t>Host</a:t>
+            </a:r>
+            <a:r>
+              <a:rPr lang="hu-HU" sz="2400" dirty="0" smtClean="0">
+                <a:latin typeface="Times New Roman" panose="02020603050405020304" pitchFamily="18" charset="0"/>
+                <a:cs typeface="Times New Roman" panose="02020603050405020304" pitchFamily="18" charset="0"/>
+              </a:rPr>
+              <a:t> Terminal Modell</a:t>
+            </a:r>
+          </a:p>
+          <a:p>
+            <a:endParaRPr lang="hu-HU" sz="2400" dirty="0">
+              <a:latin typeface="Times New Roman" panose="02020603050405020304" pitchFamily="18" charset="0"/>
+              <a:cs typeface="Times New Roman" panose="02020603050405020304" pitchFamily="18" charset="0"/>
+            </a:endParaRPr>
+          </a:p>
+          <a:p>
+            <a:r>
+              <a:rPr lang="hu-HU" sz="2400" dirty="0" smtClean="0">
+                <a:latin typeface="Times New Roman" panose="02020603050405020304" pitchFamily="18" charset="0"/>
+                <a:cs typeface="Times New Roman" panose="02020603050405020304" pitchFamily="18" charset="0"/>
+              </a:rPr>
+              <a:t>Peer </a:t>
+            </a:r>
+            <a:r>
+              <a:rPr lang="hu-HU" sz="2400" dirty="0" err="1">
+                <a:latin typeface="Times New Roman" panose="02020603050405020304" pitchFamily="18" charset="0"/>
+                <a:cs typeface="Times New Roman" panose="02020603050405020304" pitchFamily="18" charset="0"/>
+              </a:rPr>
+              <a:t>t</a:t>
+            </a:r>
+            <a:r>
+              <a:rPr lang="hu-HU" sz="2400" dirty="0" err="1" smtClean="0">
+                <a:latin typeface="Times New Roman" panose="02020603050405020304" pitchFamily="18" charset="0"/>
+                <a:cs typeface="Times New Roman" panose="02020603050405020304" pitchFamily="18" charset="0"/>
+              </a:rPr>
+              <a:t>o</a:t>
+            </a:r>
+            <a:r>
+              <a:rPr lang="hu-HU" sz="2400" dirty="0" smtClean="0">
+                <a:latin typeface="Times New Roman" panose="02020603050405020304" pitchFamily="18" charset="0"/>
+                <a:cs typeface="Times New Roman" panose="02020603050405020304" pitchFamily="18" charset="0"/>
+              </a:rPr>
+              <a:t> Peer Modell</a:t>
+            </a:r>
+            <a:endParaRPr lang="hu-HU" sz="2400" dirty="0">
+              <a:latin typeface="Times New Roman" panose="02020603050405020304" pitchFamily="18" charset="0"/>
+              <a:cs typeface="Times New Roman" panose="02020603050405020304" pitchFamily="18" charset="0"/>
+            </a:endParaRPr>
+          </a:p>
+        </p:txBody>
+      </p:sp>
       <p:pic>
         <p:nvPicPr>
-          <p:cNvPr id="5" name="Kép 4"/>
+          <p:cNvPr id="4" name="Kép 3"/>
           <p:cNvPicPr>
             <a:picLocks noChangeAspect="1"/>
           </p:cNvPicPr>
@@ -4792,7 +5421,7 @@
         </p:blipFill>
         <p:spPr>
           <a:xfrm>
-            <a:off x="1045368" y="1557432"/>
+            <a:off x="988996" y="1637295"/>
             <a:ext cx="10101263" cy="314961"/>
           </a:xfrm>
           <a:prstGeom prst="rect">
@@ -4800,122 +5429,16 @@
           </a:prstGeom>
         </p:spPr>
       </p:pic>
-      <p:sp>
-        <p:nvSpPr>
-          <p:cNvPr id="2" name="Cím 1"/>
-          <p:cNvSpPr>
-            <a:spLocks noGrp="1"/>
-          </p:cNvSpPr>
-          <p:nvPr>
-            <p:ph type="title"/>
-          </p:nvPr>
-        </p:nvSpPr>
-        <p:spPr>
-          <a:xfrm>
-            <a:off x="460756" y="419100"/>
-            <a:ext cx="5050028" cy="715587"/>
-          </a:xfrm>
-        </p:spPr>
-        <p:txBody>
-          <a:bodyPr>
-            <a:noAutofit/>
-          </a:bodyPr>
-          <a:lstStyle/>
-          <a:p>
-            <a:r>
-              <a:rPr lang="hu-HU" sz="4300" dirty="0">
-                <a:latin typeface="Times New Roman" panose="02020603050405020304" pitchFamily="18" charset="0"/>
-                <a:cs typeface="Times New Roman" panose="02020603050405020304" pitchFamily="18" charset="0"/>
-              </a:rPr>
-              <a:t>Hálózatok topológiája</a:t>
-            </a:r>
-          </a:p>
-        </p:txBody>
-      </p:sp>
-      <p:sp>
-        <p:nvSpPr>
-          <p:cNvPr id="3" name="Tartalom helye 2"/>
-          <p:cNvSpPr>
-            <a:spLocks noGrp="1"/>
-          </p:cNvSpPr>
-          <p:nvPr>
-            <p:ph idx="1"/>
-          </p:nvPr>
-        </p:nvSpPr>
-        <p:spPr>
-          <a:xfrm>
-            <a:off x="614680" y="1968500"/>
-            <a:ext cx="2192020" cy="3733800"/>
-          </a:xfrm>
-        </p:spPr>
-        <p:txBody>
-          <a:bodyPr>
-            <a:normAutofit/>
-          </a:bodyPr>
-          <a:lstStyle/>
-          <a:p>
-            <a:r>
-              <a:rPr lang="hu-HU" sz="2400" dirty="0">
-                <a:latin typeface="Times New Roman" panose="02020603050405020304" pitchFamily="18" charset="0"/>
-                <a:cs typeface="Times New Roman" panose="02020603050405020304" pitchFamily="18" charset="0"/>
-              </a:rPr>
-              <a:t>Sín topológia</a:t>
-            </a:r>
-          </a:p>
-          <a:p>
-            <a:endParaRPr lang="hu-HU" sz="2400" dirty="0">
-              <a:latin typeface="Times New Roman" panose="02020603050405020304" pitchFamily="18" charset="0"/>
-              <a:cs typeface="Times New Roman" panose="02020603050405020304" pitchFamily="18" charset="0"/>
-            </a:endParaRPr>
-          </a:p>
-          <a:p>
-            <a:endParaRPr lang="hu-HU" sz="2400" dirty="0">
-              <a:latin typeface="Times New Roman" panose="02020603050405020304" pitchFamily="18" charset="0"/>
-              <a:cs typeface="Times New Roman" panose="02020603050405020304" pitchFamily="18" charset="0"/>
-            </a:endParaRPr>
-          </a:p>
-          <a:p>
-            <a:r>
-              <a:rPr lang="hu-HU" sz="2400" dirty="0">
-                <a:latin typeface="Times New Roman" panose="02020603050405020304" pitchFamily="18" charset="0"/>
-                <a:cs typeface="Times New Roman" panose="02020603050405020304" pitchFamily="18" charset="0"/>
-              </a:rPr>
-              <a:t>Csillag topológia</a:t>
-            </a:r>
-          </a:p>
-          <a:p>
-            <a:endParaRPr lang="hu-HU" sz="2400" dirty="0">
-              <a:latin typeface="Times New Roman" panose="02020603050405020304" pitchFamily="18" charset="0"/>
-              <a:cs typeface="Times New Roman" panose="02020603050405020304" pitchFamily="18" charset="0"/>
-            </a:endParaRPr>
-          </a:p>
-          <a:p>
-            <a:endParaRPr lang="hu-HU" sz="2400" dirty="0">
-              <a:latin typeface="Times New Roman" panose="02020603050405020304" pitchFamily="18" charset="0"/>
-              <a:cs typeface="Times New Roman" panose="02020603050405020304" pitchFamily="18" charset="0"/>
-            </a:endParaRPr>
-          </a:p>
-          <a:p>
-            <a:r>
-              <a:rPr lang="hu-HU" sz="2400" dirty="0">
-                <a:latin typeface="Times New Roman" panose="02020603050405020304" pitchFamily="18" charset="0"/>
-                <a:cs typeface="Times New Roman" panose="02020603050405020304" pitchFamily="18" charset="0"/>
-              </a:rPr>
-              <a:t>Gyűrű topológia</a:t>
-            </a:r>
-          </a:p>
-        </p:txBody>
-      </p:sp>
       <p:pic>
         <p:nvPicPr>
-          <p:cNvPr id="2050" name="Picture 2" descr="http://www.agr.unideb.hu/~agocs/informatics/05_h_ecdl/ECDLweb/ecdlweb.uw.hu/m1lan1.gif"/>
+          <p:cNvPr id="2050" name="Picture 2" descr="Peer-to-peer - Wikipedia"/>
           <p:cNvPicPr>
             <a:picLocks noChangeAspect="1" noChangeArrowheads="1"/>
           </p:cNvPicPr>
           <p:nvPr/>
         </p:nvPicPr>
         <p:blipFill>
-          <a:blip r:embed="rId3">
+          <a:blip r:embed="rId3" cstate="print">
             <a:extLst>
               <a:ext uri="{28A0092B-C50C-407E-A947-70E740481C1C}">
                 <a14:useLocalDpi xmlns:a14="http://schemas.microsoft.com/office/drawing/2010/main" val="0"/>
@@ -4929,8 +5452,8 @@
         </p:blipFill>
         <p:spPr bwMode="auto">
           <a:xfrm>
-            <a:off x="3317557" y="1313723"/>
-            <a:ext cx="4255132" cy="1328193"/>
+            <a:off x="5708824" y="1952256"/>
+            <a:ext cx="3938558" cy="3429828"/>
           </a:xfrm>
           <a:prstGeom prst="rect">
             <a:avLst/>
@@ -4947,132 +5470,21 @@
           </a:extLst>
         </p:spPr>
       </p:pic>
-      <p:pic>
-        <p:nvPicPr>
-          <p:cNvPr id="2052" name="Picture 4" descr="http://www.agr.unideb.hu/~agocs/informatics/05_h_ecdl/ECDLweb/ecdlweb.uw.hu/m1lan2.gif"/>
-          <p:cNvPicPr>
-            <a:picLocks noChangeAspect="1" noChangeArrowheads="1"/>
-          </p:cNvPicPr>
+      <p:sp>
+        <p:nvSpPr>
+          <p:cNvPr id="5" name="Szövegdoboz 4"/>
+          <p:cNvSpPr txBox="1"/>
           <p:nvPr/>
-        </p:nvPicPr>
-        <p:blipFill>
-          <a:blip r:embed="rId4">
-            <a:extLst>
-              <a:ext uri="{28A0092B-C50C-407E-A947-70E740481C1C}">
-                <a14:useLocalDpi xmlns:a14="http://schemas.microsoft.com/office/drawing/2010/main" val="0"/>
-              </a:ext>
-            </a:extLst>
-          </a:blip>
-          <a:srcRect/>
-          <a:stretch>
-            <a:fillRect/>
-          </a:stretch>
-        </p:blipFill>
-        <p:spPr bwMode="auto">
-          <a:xfrm>
-            <a:off x="7912100" y="2147536"/>
-            <a:ext cx="3520119" cy="2569430"/>
+        </p:nvSpPr>
+        <p:spPr>
+          <a:xfrm>
+            <a:off x="9962148" y="4090737"/>
+            <a:ext cx="1433406" cy="215444"/>
           </a:xfrm>
           <a:prstGeom prst="rect">
             <a:avLst/>
           </a:prstGeom>
           <a:noFill/>
-          <a:extLst>
-            <a:ext uri="{909E8E84-426E-40DD-AFC4-6F175D3DCCD1}">
-              <a14:hiddenFill xmlns:a14="http://schemas.microsoft.com/office/drawing/2010/main">
-                <a:solidFill>
-                  <a:srgbClr val="FFFFFF"/>
-                </a:solidFill>
-              </a14:hiddenFill>
-            </a:ext>
-          </a:extLst>
-        </p:spPr>
-      </p:pic>
-      <p:pic>
-        <p:nvPicPr>
-          <p:cNvPr id="2054" name="Picture 6" descr="http://www.agr.unideb.hu/~agocs/informatics/05_h_ecdl/ECDLweb/ecdlweb.uw.hu/m1lan3.gif"/>
-          <p:cNvPicPr>
-            <a:picLocks noChangeAspect="1" noChangeArrowheads="1"/>
-          </p:cNvPicPr>
-          <p:nvPr/>
-        </p:nvPicPr>
-        <p:blipFill>
-          <a:blip r:embed="rId5">
-            <a:extLst>
-              <a:ext uri="{28A0092B-C50C-407E-A947-70E740481C1C}">
-                <a14:useLocalDpi xmlns:a14="http://schemas.microsoft.com/office/drawing/2010/main" val="0"/>
-              </a:ext>
-            </a:extLst>
-          </a:blip>
-          <a:srcRect/>
-          <a:stretch>
-            <a:fillRect/>
-          </a:stretch>
-        </p:blipFill>
-        <p:spPr bwMode="auto">
-          <a:xfrm>
-            <a:off x="3587749" y="4134026"/>
-            <a:ext cx="3714747" cy="2012773"/>
-          </a:xfrm>
-          <a:prstGeom prst="rect">
-            <a:avLst/>
-          </a:prstGeom>
-          <a:noFill/>
-          <a:extLst>
-            <a:ext uri="{909E8E84-426E-40DD-AFC4-6F175D3DCCD1}">
-              <a14:hiddenFill xmlns:a14="http://schemas.microsoft.com/office/drawing/2010/main">
-                <a:solidFill>
-                  <a:srgbClr val="FFFFFF"/>
-                </a:solidFill>
-              </a14:hiddenFill>
-            </a:ext>
-          </a:extLst>
-        </p:spPr>
-      </p:pic>
-      <p:sp>
-        <p:nvSpPr>
-          <p:cNvPr id="4" name="Szövegdoboz 3"/>
-          <p:cNvSpPr txBox="1"/>
-          <p:nvPr/>
-        </p:nvSpPr>
-        <p:spPr>
-          <a:xfrm>
-            <a:off x="6197600" y="975816"/>
-            <a:ext cx="1714500" cy="215444"/>
-          </a:xfrm>
-          <a:prstGeom prst="rect">
-            <a:avLst/>
-          </a:prstGeom>
-          <a:noFill/>
-        </p:spPr>
-        <p:txBody>
-          <a:bodyPr wrap="square" rtlCol="0">
-            <a:spAutoFit/>
-          </a:bodyPr>
-          <a:lstStyle/>
-          <a:p>
-            <a:r>
-              <a:rPr lang="hu-HU" sz="800" dirty="0"/>
-              <a:t>https://tinyurl.com/zjsaskd8</a:t>
-            </a:r>
-          </a:p>
-        </p:txBody>
-      </p:sp>
-      <p:sp>
-        <p:nvSpPr>
-          <p:cNvPr id="6" name="Szövegdoboz 5"/>
-          <p:cNvSpPr txBox="1"/>
-          <p:nvPr/>
-        </p:nvSpPr>
-        <p:spPr>
-          <a:xfrm>
-            <a:off x="10026065" y="4909180"/>
-            <a:ext cx="1406154" cy="215444"/>
-          </a:xfrm>
-          <a:prstGeom prst="rect">
-            <a:avLst/>
-          </a:prstGeom>
-          <a:noFill/>
         </p:spPr>
         <p:txBody>
           <a:bodyPr wrap="none" rtlCol="0">
@@ -5082,36 +5494,7 @@
           <a:p>
             <a:r>
               <a:rPr lang="hu-HU" sz="800" dirty="0"/>
-              <a:t>https://tinyurl.com/h4rvkdyx</a:t>
-            </a:r>
-          </a:p>
-        </p:txBody>
-      </p:sp>
-      <p:sp>
-        <p:nvSpPr>
-          <p:cNvPr id="7" name="Szövegdoboz 6"/>
-          <p:cNvSpPr txBox="1"/>
-          <p:nvPr/>
-        </p:nvSpPr>
-        <p:spPr>
-          <a:xfrm>
-            <a:off x="7572689" y="5931355"/>
-            <a:ext cx="1407758" cy="215444"/>
-          </a:xfrm>
-          <a:prstGeom prst="rect">
-            <a:avLst/>
-          </a:prstGeom>
-          <a:noFill/>
-        </p:spPr>
-        <p:txBody>
-          <a:bodyPr wrap="none" rtlCol="0">
-            <a:spAutoFit/>
-          </a:bodyPr>
-          <a:lstStyle/>
-          <a:p>
-            <a:r>
-              <a:rPr lang="hu-HU" sz="800" dirty="0"/>
-              <a:t>https://tinyurl.com/2384yk7f</a:t>
+              <a:t>https://tinyurl.com/hea44ch5</a:t>
             </a:r>
           </a:p>
         </p:txBody>
@@ -5119,7 +5502,7 @@
     </p:spTree>
     <p:extLst>
       <p:ext uri="{BB962C8B-B14F-4D97-AF65-F5344CB8AC3E}">
-        <p14:creationId xmlns:p14="http://schemas.microsoft.com/office/powerpoint/2010/main" val="3838305485"/>
+        <p14:creationId xmlns:p14="http://schemas.microsoft.com/office/powerpoint/2010/main" val="1350070956"/>
       </p:ext>
     </p:extLst>
   </p:cSld>
@@ -5162,8 +5545,8 @@
         </p:blipFill>
         <p:spPr>
           <a:xfrm>
-            <a:off x="1182686" y="1578889"/>
-            <a:ext cx="10164763" cy="316941"/>
+            <a:off x="1033336" y="1521337"/>
+            <a:ext cx="10101263" cy="314961"/>
           </a:xfrm>
           <a:prstGeom prst="rect">
             <a:avLst/>
@@ -5182,13 +5565,13 @@
         </p:nvSpPr>
         <p:spPr>
           <a:xfrm>
-            <a:off x="1182686" y="709585"/>
-            <a:ext cx="4839716" cy="709433"/>
+            <a:off x="460756" y="419100"/>
+            <a:ext cx="5050028" cy="715587"/>
           </a:xfrm>
         </p:spPr>
         <p:txBody>
           <a:bodyPr>
-            <a:normAutofit/>
+            <a:noAutofit/>
           </a:bodyPr>
           <a:lstStyle/>
           <a:p>
@@ -5197,7 +5580,7 @@
                 <a:latin typeface="Times New Roman" panose="02020603050405020304" pitchFamily="18" charset="0"/>
                 <a:cs typeface="Times New Roman" panose="02020603050405020304" pitchFamily="18" charset="0"/>
               </a:rPr>
-              <a:t>Adatátviteli közegek</a:t>
+              <a:t>Hálózatok topológiája</a:t>
             </a:r>
           </a:p>
         </p:txBody>
@@ -5214,8 +5597,8 @@
         </p:nvSpPr>
         <p:spPr>
           <a:xfrm>
-            <a:off x="825500" y="2093136"/>
-            <a:ext cx="2959100" cy="3673475"/>
+            <a:off x="614680" y="1968500"/>
+            <a:ext cx="2192020" cy="3733800"/>
           </a:xfrm>
         </p:spPr>
         <p:txBody>
@@ -5223,26 +5606,26 @@
             <a:normAutofit/>
           </a:bodyPr>
           <a:lstStyle/>
-          <a:p>
-            <a:pPr marL="0" indent="0">
-              <a:buNone/>
-            </a:pPr>
-            <a:r>
-              <a:rPr lang="hu-HU" sz="2400" b="1" dirty="0">
-                <a:latin typeface="Times New Roman" panose="02020603050405020304" pitchFamily="18" charset="0"/>
-                <a:cs typeface="Times New Roman" panose="02020603050405020304" pitchFamily="18" charset="0"/>
-              </a:rPr>
-              <a:t>Vezetékes:</a:t>
-            </a:r>
-          </a:p>
           <a:p>
             <a:r>
               <a:rPr lang="hu-HU" sz="2400" dirty="0">
                 <a:latin typeface="Times New Roman" panose="02020603050405020304" pitchFamily="18" charset="0"/>
                 <a:cs typeface="Times New Roman" panose="02020603050405020304" pitchFamily="18" charset="0"/>
               </a:rPr>
-              <a:t>Koaxiális kábel</a:t>
-            </a:r>
+              <a:t>Sín topológia</a:t>
+            </a:r>
+          </a:p>
+          <a:p>
+            <a:endParaRPr lang="hu-HU" sz="2400" dirty="0">
+              <a:latin typeface="Times New Roman" panose="02020603050405020304" pitchFamily="18" charset="0"/>
+              <a:cs typeface="Times New Roman" panose="02020603050405020304" pitchFamily="18" charset="0"/>
+            </a:endParaRPr>
+          </a:p>
+          <a:p>
+            <a:endParaRPr lang="hu-HU" sz="2400" dirty="0">
+              <a:latin typeface="Times New Roman" panose="02020603050405020304" pitchFamily="18" charset="0"/>
+              <a:cs typeface="Times New Roman" panose="02020603050405020304" pitchFamily="18" charset="0"/>
+            </a:endParaRPr>
           </a:p>
           <a:p>
             <a:r>
@@ -5250,29 +5633,20 @@
                 <a:latin typeface="Times New Roman" panose="02020603050405020304" pitchFamily="18" charset="0"/>
                 <a:cs typeface="Times New Roman" panose="02020603050405020304" pitchFamily="18" charset="0"/>
               </a:rPr>
-              <a:t>Optikai kábel</a:t>
-            </a:r>
-          </a:p>
-          <a:p>
-            <a:pPr marL="0" indent="0">
-              <a:buNone/>
-            </a:pPr>
+              <a:t>Csillag topológia</a:t>
+            </a:r>
+          </a:p>
+          <a:p>
             <a:endParaRPr lang="hu-HU" sz="2400" dirty="0">
               <a:latin typeface="Times New Roman" panose="02020603050405020304" pitchFamily="18" charset="0"/>
               <a:cs typeface="Times New Roman" panose="02020603050405020304" pitchFamily="18" charset="0"/>
             </a:endParaRPr>
           </a:p>
           <a:p>
-            <a:pPr marL="0" indent="0">
-              <a:buNone/>
-            </a:pPr>
-            <a:r>
-              <a:rPr lang="hu-HU" sz="2400" b="1" dirty="0">
-                <a:latin typeface="Times New Roman" panose="02020603050405020304" pitchFamily="18" charset="0"/>
-                <a:cs typeface="Times New Roman" panose="02020603050405020304" pitchFamily="18" charset="0"/>
-              </a:rPr>
-              <a:t>Vezeték nélküli:</a:t>
-            </a:r>
+            <a:endParaRPr lang="hu-HU" sz="2400" dirty="0">
+              <a:latin typeface="Times New Roman" panose="02020603050405020304" pitchFamily="18" charset="0"/>
+              <a:cs typeface="Times New Roman" panose="02020603050405020304" pitchFamily="18" charset="0"/>
+            </a:endParaRPr>
           </a:p>
           <a:p>
             <a:r>
@@ -5280,64 +5654,14 @@
                 <a:latin typeface="Times New Roman" panose="02020603050405020304" pitchFamily="18" charset="0"/>
                 <a:cs typeface="Times New Roman" panose="02020603050405020304" pitchFamily="18" charset="0"/>
               </a:rPr>
-              <a:t>Rádiófrekvenciás</a:t>
-            </a:r>
-          </a:p>
-          <a:p>
-            <a:r>
-              <a:rPr lang="hu-HU" sz="2400" dirty="0">
-                <a:latin typeface="Times New Roman" panose="02020603050405020304" pitchFamily="18" charset="0"/>
-                <a:cs typeface="Times New Roman" panose="02020603050405020304" pitchFamily="18" charset="0"/>
-              </a:rPr>
-              <a:t>Műholdas</a:t>
-            </a:r>
-          </a:p>
-          <a:p>
-            <a:endParaRPr lang="hu-HU" sz="2400" dirty="0">
-              <a:latin typeface="Times New Roman" panose="02020603050405020304" pitchFamily="18" charset="0"/>
-              <a:cs typeface="Times New Roman" panose="02020603050405020304" pitchFamily="18" charset="0"/>
-            </a:endParaRPr>
-          </a:p>
-          <a:p>
-            <a:endParaRPr lang="hu-HU" sz="2400" dirty="0">
-              <a:latin typeface="Times New Roman" panose="02020603050405020304" pitchFamily="18" charset="0"/>
-              <a:cs typeface="Times New Roman" panose="02020603050405020304" pitchFamily="18" charset="0"/>
-            </a:endParaRPr>
-          </a:p>
-        </p:txBody>
-      </p:sp>
-      <p:sp>
-        <p:nvSpPr>
-          <p:cNvPr id="4" name="Szövegdoboz 3"/>
-          <p:cNvSpPr txBox="1"/>
-          <p:nvPr/>
-        </p:nvSpPr>
-        <p:spPr>
-          <a:xfrm>
-            <a:off x="8407400" y="6070600"/>
-            <a:ext cx="1407758" cy="215444"/>
-          </a:xfrm>
-          <a:prstGeom prst="rect">
-            <a:avLst/>
-          </a:prstGeom>
-          <a:noFill/>
-        </p:spPr>
-        <p:txBody>
-          <a:bodyPr wrap="none" rtlCol="0">
-            <a:spAutoFit/>
-          </a:bodyPr>
-          <a:lstStyle/>
-          <a:p>
-            <a:r>
-              <a:rPr lang="hu-HU" sz="800" dirty="0"/>
-              <a:t>https://tinyurl.com/rz85a358</a:t>
+              <a:t>Gyűrű topológia</a:t>
             </a:r>
           </a:p>
         </p:txBody>
       </p:sp>
       <p:pic>
         <p:nvPicPr>
-          <p:cNvPr id="1026" name="Picture 2" descr="https://www.kabelfutar.hu/images/stories/virtuemart/product/huzalpancel.png"/>
+          <p:cNvPr id="2050" name="Picture 2" descr="http://www.agr.unideb.hu/~agocs/informatics/05_h_ecdl/ECDLweb/ecdlweb.uw.hu/m1lan1.gif"/>
           <p:cNvPicPr>
             <a:picLocks noChangeAspect="1" noChangeArrowheads="1"/>
           </p:cNvPicPr>
@@ -5358,8 +5682,8 @@
         </p:blipFill>
         <p:spPr bwMode="auto">
           <a:xfrm>
-            <a:off x="3784600" y="1737359"/>
-            <a:ext cx="7628889" cy="3660184"/>
+            <a:off x="3317557" y="1313723"/>
+            <a:ext cx="4255132" cy="1328193"/>
           </a:xfrm>
           <a:prstGeom prst="rect">
             <a:avLst/>
@@ -5376,10 +5700,179 @@
           </a:extLst>
         </p:spPr>
       </p:pic>
+      <p:pic>
+        <p:nvPicPr>
+          <p:cNvPr id="2052" name="Picture 4" descr="http://www.agr.unideb.hu/~agocs/informatics/05_h_ecdl/ECDLweb/ecdlweb.uw.hu/m1lan2.gif"/>
+          <p:cNvPicPr>
+            <a:picLocks noChangeAspect="1" noChangeArrowheads="1"/>
+          </p:cNvPicPr>
+          <p:nvPr/>
+        </p:nvPicPr>
+        <p:blipFill>
+          <a:blip r:embed="rId4">
+            <a:extLst>
+              <a:ext uri="{28A0092B-C50C-407E-A947-70E740481C1C}">
+                <a14:useLocalDpi xmlns:a14="http://schemas.microsoft.com/office/drawing/2010/main" val="0"/>
+              </a:ext>
+            </a:extLst>
+          </a:blip>
+          <a:srcRect/>
+          <a:stretch>
+            <a:fillRect/>
+          </a:stretch>
+        </p:blipFill>
+        <p:spPr bwMode="auto">
+          <a:xfrm>
+            <a:off x="7912100" y="2147536"/>
+            <a:ext cx="3520119" cy="2569430"/>
+          </a:xfrm>
+          <a:prstGeom prst="rect">
+            <a:avLst/>
+          </a:prstGeom>
+          <a:noFill/>
+          <a:extLst>
+            <a:ext uri="{909E8E84-426E-40DD-AFC4-6F175D3DCCD1}">
+              <a14:hiddenFill xmlns:a14="http://schemas.microsoft.com/office/drawing/2010/main">
+                <a:solidFill>
+                  <a:srgbClr val="FFFFFF"/>
+                </a:solidFill>
+              </a14:hiddenFill>
+            </a:ext>
+          </a:extLst>
+        </p:spPr>
+      </p:pic>
+      <p:pic>
+        <p:nvPicPr>
+          <p:cNvPr id="2054" name="Picture 6" descr="http://www.agr.unideb.hu/~agocs/informatics/05_h_ecdl/ECDLweb/ecdlweb.uw.hu/m1lan3.gif"/>
+          <p:cNvPicPr>
+            <a:picLocks noChangeAspect="1" noChangeArrowheads="1"/>
+          </p:cNvPicPr>
+          <p:nvPr/>
+        </p:nvPicPr>
+        <p:blipFill>
+          <a:blip r:embed="rId5">
+            <a:extLst>
+              <a:ext uri="{28A0092B-C50C-407E-A947-70E740481C1C}">
+                <a14:useLocalDpi xmlns:a14="http://schemas.microsoft.com/office/drawing/2010/main" val="0"/>
+              </a:ext>
+            </a:extLst>
+          </a:blip>
+          <a:srcRect/>
+          <a:stretch>
+            <a:fillRect/>
+          </a:stretch>
+        </p:blipFill>
+        <p:spPr bwMode="auto">
+          <a:xfrm>
+            <a:off x="3587749" y="4134026"/>
+            <a:ext cx="3714747" cy="2012773"/>
+          </a:xfrm>
+          <a:prstGeom prst="rect">
+            <a:avLst/>
+          </a:prstGeom>
+          <a:noFill/>
+          <a:extLst>
+            <a:ext uri="{909E8E84-426E-40DD-AFC4-6F175D3DCCD1}">
+              <a14:hiddenFill xmlns:a14="http://schemas.microsoft.com/office/drawing/2010/main">
+                <a:solidFill>
+                  <a:srgbClr val="FFFFFF"/>
+                </a:solidFill>
+              </a14:hiddenFill>
+            </a:ext>
+          </a:extLst>
+        </p:spPr>
+      </p:pic>
+      <p:sp>
+        <p:nvSpPr>
+          <p:cNvPr id="4" name="Szövegdoboz 3"/>
+          <p:cNvSpPr txBox="1"/>
+          <p:nvPr/>
+        </p:nvSpPr>
+        <p:spPr>
+          <a:xfrm>
+            <a:off x="6197600" y="975816"/>
+            <a:ext cx="1714500" cy="215444"/>
+          </a:xfrm>
+          <a:prstGeom prst="rect">
+            <a:avLst/>
+          </a:prstGeom>
+          <a:noFill/>
+        </p:spPr>
+        <p:txBody>
+          <a:bodyPr wrap="square" rtlCol="0">
+            <a:spAutoFit/>
+          </a:bodyPr>
+          <a:lstStyle/>
+          <a:p>
+            <a:r>
+              <a:rPr lang="hu-HU" sz="800" dirty="0"/>
+              <a:t>https://tinyurl.com/zjsaskd8</a:t>
+            </a:r>
+          </a:p>
+        </p:txBody>
+      </p:sp>
+      <p:sp>
+        <p:nvSpPr>
+          <p:cNvPr id="6" name="Szövegdoboz 5"/>
+          <p:cNvSpPr txBox="1"/>
+          <p:nvPr/>
+        </p:nvSpPr>
+        <p:spPr>
+          <a:xfrm>
+            <a:off x="10026065" y="4909180"/>
+            <a:ext cx="1406154" cy="215444"/>
+          </a:xfrm>
+          <a:prstGeom prst="rect">
+            <a:avLst/>
+          </a:prstGeom>
+          <a:noFill/>
+        </p:spPr>
+        <p:txBody>
+          <a:bodyPr wrap="none" rtlCol="0">
+            <a:spAutoFit/>
+          </a:bodyPr>
+          <a:lstStyle/>
+          <a:p>
+            <a:r>
+              <a:rPr lang="hu-HU" sz="800" dirty="0"/>
+              <a:t>https://tinyurl.com/h4rvkdyx</a:t>
+            </a:r>
+          </a:p>
+        </p:txBody>
+      </p:sp>
+      <p:sp>
+        <p:nvSpPr>
+          <p:cNvPr id="7" name="Szövegdoboz 6"/>
+          <p:cNvSpPr txBox="1"/>
+          <p:nvPr/>
+        </p:nvSpPr>
+        <p:spPr>
+          <a:xfrm>
+            <a:off x="7572689" y="5931355"/>
+            <a:ext cx="1407758" cy="215444"/>
+          </a:xfrm>
+          <a:prstGeom prst="rect">
+            <a:avLst/>
+          </a:prstGeom>
+          <a:noFill/>
+        </p:spPr>
+        <p:txBody>
+          <a:bodyPr wrap="none" rtlCol="0">
+            <a:spAutoFit/>
+          </a:bodyPr>
+          <a:lstStyle/>
+          <a:p>
+            <a:r>
+              <a:rPr lang="hu-HU" sz="800" dirty="0"/>
+              <a:t>https://tinyurl.com/2384yk7f</a:t>
+            </a:r>
+          </a:p>
+        </p:txBody>
+      </p:sp>
     </p:spTree>
     <p:extLst>
       <p:ext uri="{BB962C8B-B14F-4D97-AF65-F5344CB8AC3E}">
-        <p14:creationId xmlns:p14="http://schemas.microsoft.com/office/powerpoint/2010/main" val="1474880856"/>
+        <p14:creationId xmlns:p14="http://schemas.microsoft.com/office/powerpoint/2010/main" val="3838305485"/>
       </p:ext>
     </p:extLst>
   </p:cSld>
@@ -5418,29 +5911,102 @@
         </p:nvSpPr>
         <p:spPr>
           <a:xfrm>
-            <a:off x="3213100" y="2679700"/>
-            <a:ext cx="6134100" cy="723900"/>
+            <a:off x="276727" y="541421"/>
+            <a:ext cx="4803006" cy="907181"/>
           </a:xfrm>
         </p:spPr>
         <p:txBody>
           <a:bodyPr>
-            <a:noAutofit/>
+            <a:normAutofit fontScale="90000"/>
           </a:bodyPr>
           <a:lstStyle/>
           <a:p>
-            <a:r>
-              <a:rPr lang="hu-HU" dirty="0">
+            <a:pPr algn="ctr"/>
+            <a:r>
+              <a:rPr lang="hu-HU" sz="4300" dirty="0">
                 <a:latin typeface="Times New Roman" panose="02020603050405020304" pitchFamily="18" charset="0"/>
                 <a:cs typeface="Times New Roman" panose="02020603050405020304" pitchFamily="18" charset="0"/>
               </a:rPr>
-              <a:t>Köszönöm a figyelmet! </a:t>
-            </a:r>
+              <a:t>Hálózatok topológiája</a:t>
+            </a:r>
+          </a:p>
+        </p:txBody>
+      </p:sp>
+      <p:sp>
+        <p:nvSpPr>
+          <p:cNvPr id="3" name="Tartalom helye 2"/>
+          <p:cNvSpPr>
+            <a:spLocks noGrp="1"/>
+          </p:cNvSpPr>
+          <p:nvPr>
+            <p:ph idx="1"/>
+          </p:nvPr>
+        </p:nvSpPr>
+        <p:spPr>
+          <a:xfrm>
+            <a:off x="1097280" y="1845734"/>
+            <a:ext cx="3366436" cy="3688792"/>
+          </a:xfrm>
+        </p:spPr>
+        <p:txBody>
+          <a:bodyPr>
+            <a:normAutofit/>
+          </a:bodyPr>
+          <a:lstStyle/>
+          <a:p>
+            <a:endParaRPr lang="hu-HU" sz="2400" dirty="0" smtClean="0">
+              <a:latin typeface="Times New Roman" panose="02020603050405020304" pitchFamily="18" charset="0"/>
+              <a:cs typeface="Times New Roman" panose="02020603050405020304" pitchFamily="18" charset="0"/>
+            </a:endParaRPr>
+          </a:p>
+          <a:p>
+            <a:r>
+              <a:rPr lang="hu-HU" sz="2400" dirty="0" smtClean="0">
+                <a:latin typeface="Times New Roman" panose="02020603050405020304" pitchFamily="18" charset="0"/>
+                <a:cs typeface="Times New Roman" panose="02020603050405020304" pitchFamily="18" charset="0"/>
+              </a:rPr>
+              <a:t>Teljes topológia</a:t>
+            </a:r>
+          </a:p>
+          <a:p>
+            <a:endParaRPr lang="hu-HU" sz="2400" dirty="0">
+              <a:latin typeface="Times New Roman" panose="02020603050405020304" pitchFamily="18" charset="0"/>
+              <a:cs typeface="Times New Roman" panose="02020603050405020304" pitchFamily="18" charset="0"/>
+            </a:endParaRPr>
+          </a:p>
+          <a:p>
+            <a:r>
+              <a:rPr lang="hu-HU" sz="2400" dirty="0" smtClean="0">
+                <a:latin typeface="Times New Roman" panose="02020603050405020304" pitchFamily="18" charset="0"/>
+                <a:cs typeface="Times New Roman" panose="02020603050405020304" pitchFamily="18" charset="0"/>
+              </a:rPr>
+              <a:t>Hálós topológia</a:t>
+            </a:r>
+          </a:p>
+          <a:p>
+            <a:endParaRPr lang="hu-HU" sz="2400" dirty="0">
+              <a:latin typeface="Times New Roman" panose="02020603050405020304" pitchFamily="18" charset="0"/>
+              <a:cs typeface="Times New Roman" panose="02020603050405020304" pitchFamily="18" charset="0"/>
+            </a:endParaRPr>
+          </a:p>
+          <a:p>
+            <a:r>
+              <a:rPr lang="hu-HU" sz="2400" dirty="0" smtClean="0">
+                <a:latin typeface="Times New Roman" panose="02020603050405020304" pitchFamily="18" charset="0"/>
+                <a:cs typeface="Times New Roman" panose="02020603050405020304" pitchFamily="18" charset="0"/>
+              </a:rPr>
+              <a:t>Hibrid topológia</a:t>
+            </a:r>
+            <a:endParaRPr lang="hu-HU" sz="2400" dirty="0">
+              <a:latin typeface="Times New Roman" panose="02020603050405020304" pitchFamily="18" charset="0"/>
+              <a:cs typeface="Times New Roman" panose="02020603050405020304" pitchFamily="18" charset="0"/>
+            </a:endParaRPr>
           </a:p>
         </p:txBody>
       </p:sp>
       <p:pic>
         <p:nvPicPr>
-          <p:cNvPr id="3" name="Kép 2"/>
+          <p:cNvPr id="4" name="Kép 3"/>
           <p:cNvPicPr>
             <a:picLocks noChangeAspect="1"/>
           </p:cNvPicPr>
@@ -5454,18 +6020,194 @@
         </p:blipFill>
         <p:spPr>
           <a:xfrm>
-            <a:off x="973137" y="1612900"/>
-            <a:ext cx="10177463" cy="219075"/>
+            <a:off x="1097280" y="1530773"/>
+            <a:ext cx="10101263" cy="314961"/>
           </a:xfrm>
           <a:prstGeom prst="rect">
             <a:avLst/>
           </a:prstGeom>
         </p:spPr>
       </p:pic>
+      <p:pic>
+        <p:nvPicPr>
+          <p:cNvPr id="1026" name="Picture 2" descr="Számítógépes ismeretek | Sulinet Tudásbázis"/>
+          <p:cNvPicPr>
+            <a:picLocks noChangeAspect="1" noChangeArrowheads="1"/>
+          </p:cNvPicPr>
+          <p:nvPr/>
+        </p:nvPicPr>
+        <p:blipFill>
+          <a:blip r:embed="rId3" cstate="print">
+            <a:extLst>
+              <a:ext uri="{28A0092B-C50C-407E-A947-70E740481C1C}">
+                <a14:useLocalDpi xmlns:a14="http://schemas.microsoft.com/office/drawing/2010/main" val="0"/>
+              </a:ext>
+            </a:extLst>
+          </a:blip>
+          <a:srcRect/>
+          <a:stretch>
+            <a:fillRect/>
+          </a:stretch>
+        </p:blipFill>
+        <p:spPr bwMode="auto">
+          <a:xfrm>
+            <a:off x="5064643" y="1297732"/>
+            <a:ext cx="2391023" cy="2395280"/>
+          </a:xfrm>
+          <a:prstGeom prst="rect">
+            <a:avLst/>
+          </a:prstGeom>
+          <a:noFill/>
+          <a:extLst>
+            <a:ext uri="{909E8E84-426E-40DD-AFC4-6F175D3DCCD1}">
+              <a14:hiddenFill xmlns:a14="http://schemas.microsoft.com/office/drawing/2010/main">
+                <a:solidFill>
+                  <a:srgbClr val="FFFFFF"/>
+                </a:solidFill>
+              </a14:hiddenFill>
+            </a:ext>
+          </a:extLst>
+        </p:spPr>
+      </p:pic>
+      <p:pic>
+        <p:nvPicPr>
+          <p:cNvPr id="6" name="Kép 5"/>
+          <p:cNvPicPr>
+            <a:picLocks noChangeAspect="1"/>
+          </p:cNvPicPr>
+          <p:nvPr/>
+        </p:nvPicPr>
+        <p:blipFill>
+          <a:blip r:embed="rId4"/>
+          <a:stretch>
+            <a:fillRect/>
+          </a:stretch>
+        </p:blipFill>
+        <p:spPr>
+          <a:xfrm>
+            <a:off x="3816767" y="4081914"/>
+            <a:ext cx="4029075" cy="1704975"/>
+          </a:xfrm>
+          <a:prstGeom prst="rect">
+            <a:avLst/>
+          </a:prstGeom>
+        </p:spPr>
+      </p:pic>
+      <p:sp>
+        <p:nvSpPr>
+          <p:cNvPr id="7" name="Szövegdoboz 6"/>
+          <p:cNvSpPr txBox="1"/>
+          <p:nvPr/>
+        </p:nvSpPr>
+        <p:spPr>
+          <a:xfrm>
+            <a:off x="5245162" y="5936808"/>
+            <a:ext cx="1425390" cy="215444"/>
+          </a:xfrm>
+          <a:prstGeom prst="rect">
+            <a:avLst/>
+          </a:prstGeom>
+          <a:noFill/>
+        </p:spPr>
+        <p:txBody>
+          <a:bodyPr wrap="none" rtlCol="0">
+            <a:spAutoFit/>
+          </a:bodyPr>
+          <a:lstStyle/>
+          <a:p>
+            <a:r>
+              <a:rPr lang="hu-HU" sz="800" dirty="0"/>
+              <a:t>https://tinyurl.com/328t8hu9</a:t>
+            </a:r>
+          </a:p>
+        </p:txBody>
+      </p:sp>
+      <p:sp>
+        <p:nvSpPr>
+          <p:cNvPr id="8" name="Szövegdoboz 7"/>
+          <p:cNvSpPr txBox="1"/>
+          <p:nvPr/>
+        </p:nvSpPr>
+        <p:spPr>
+          <a:xfrm>
+            <a:off x="5506680" y="1007329"/>
+            <a:ext cx="1382110" cy="215444"/>
+          </a:xfrm>
+          <a:prstGeom prst="rect">
+            <a:avLst/>
+          </a:prstGeom>
+          <a:noFill/>
+        </p:spPr>
+        <p:txBody>
+          <a:bodyPr wrap="none" rtlCol="0">
+            <a:spAutoFit/>
+          </a:bodyPr>
+          <a:lstStyle/>
+          <a:p>
+            <a:r>
+              <a:rPr lang="hu-HU" sz="800" dirty="0"/>
+              <a:t>https://tinyurl.com/yckve8kj</a:t>
+            </a:r>
+          </a:p>
+        </p:txBody>
+      </p:sp>
+      <p:pic>
+        <p:nvPicPr>
+          <p:cNvPr id="9" name="Kép 8"/>
+          <p:cNvPicPr>
+            <a:picLocks noChangeAspect="1"/>
+          </p:cNvPicPr>
+          <p:nvPr/>
+        </p:nvPicPr>
+        <p:blipFill>
+          <a:blip r:embed="rId5"/>
+          <a:stretch>
+            <a:fillRect/>
+          </a:stretch>
+        </p:blipFill>
+        <p:spPr>
+          <a:xfrm>
+            <a:off x="7818120" y="2228694"/>
+            <a:ext cx="2616241" cy="2034854"/>
+          </a:xfrm>
+          <a:prstGeom prst="rect">
+            <a:avLst/>
+          </a:prstGeom>
+        </p:spPr>
+      </p:pic>
+      <p:sp>
+        <p:nvSpPr>
+          <p:cNvPr id="10" name="Szövegdoboz 9"/>
+          <p:cNvSpPr txBox="1"/>
+          <p:nvPr/>
+        </p:nvSpPr>
+        <p:spPr>
+          <a:xfrm>
+            <a:off x="10489054" y="3030677"/>
+            <a:ext cx="1418978" cy="215444"/>
+          </a:xfrm>
+          <a:prstGeom prst="rect">
+            <a:avLst/>
+          </a:prstGeom>
+          <a:noFill/>
+        </p:spPr>
+        <p:txBody>
+          <a:bodyPr wrap="none" rtlCol="0">
+            <a:spAutoFit/>
+          </a:bodyPr>
+          <a:lstStyle/>
+          <a:p>
+            <a:r>
+              <a:rPr lang="hu-HU" sz="800" dirty="0"/>
+              <a:t>https://tinyurl.com/2p8zr6up</a:t>
+            </a:r>
+          </a:p>
+        </p:txBody>
+      </p:sp>
     </p:spTree>
     <p:extLst>
       <p:ext uri="{BB962C8B-B14F-4D97-AF65-F5344CB8AC3E}">
-        <p14:creationId xmlns:p14="http://schemas.microsoft.com/office/powerpoint/2010/main" val="127159379"/>
+        <p14:creationId xmlns:p14="http://schemas.microsoft.com/office/powerpoint/2010/main" val="1502694442"/>
       </p:ext>
     </p:extLst>
   </p:cSld>
@@ -5492,184 +6234,240 @@
           <a:chExt cx="0" cy="0"/>
         </a:xfrm>
       </p:grpSpPr>
-      <p:sp>
-        <p:nvSpPr>
-          <p:cNvPr id="2" name="Cím 1"/>
-          <p:cNvSpPr>
-            <a:spLocks noGrp="1"/>
-          </p:cNvSpPr>
-          <p:nvPr>
-            <p:ph type="title"/>
-          </p:nvPr>
-        </p:nvSpPr>
-        <p:spPr>
-          <a:xfrm>
-            <a:off x="1097280" y="286603"/>
-            <a:ext cx="3220720" cy="1465997"/>
-          </a:xfrm>
-        </p:spPr>
-        <p:txBody>
-          <a:bodyPr/>
-          <a:lstStyle/>
-          <a:p>
-            <a:r>
-              <a:rPr lang="hu-HU" dirty="0">
-                <a:latin typeface="Times New Roman" panose="02020603050405020304" pitchFamily="18" charset="0"/>
-                <a:cs typeface="Times New Roman" panose="02020603050405020304" pitchFamily="18" charset="0"/>
-              </a:rPr>
-              <a:t>Forrás</a:t>
-            </a:r>
-          </a:p>
-        </p:txBody>
-      </p:sp>
-      <p:sp>
-        <p:nvSpPr>
-          <p:cNvPr id="3" name="Tartalom helye 2"/>
-          <p:cNvSpPr>
-            <a:spLocks noGrp="1"/>
-          </p:cNvSpPr>
-          <p:nvPr>
-            <p:ph idx="1"/>
-          </p:nvPr>
-        </p:nvSpPr>
-        <p:spPr>
-          <a:xfrm>
-            <a:off x="1097280" y="1845734"/>
-            <a:ext cx="3627120" cy="2154766"/>
-          </a:xfrm>
-        </p:spPr>
-        <p:txBody>
-          <a:bodyPr/>
-          <a:lstStyle/>
-          <a:p>
-            <a:r>
-              <a:rPr lang="hu-HU" dirty="0">
-                <a:solidFill>
-                  <a:schemeClr val="tx1">
-                    <a:lumMod val="95000"/>
-                    <a:lumOff val="5000"/>
-                  </a:schemeClr>
-                </a:solidFill>
-                <a:hlinkClick r:id="rId2"/>
-              </a:rPr>
-              <a:t>https://tinyurl.com/c564n5k2</a:t>
-            </a:r>
-            <a:endParaRPr lang="hu-HU" dirty="0">
-              <a:solidFill>
-                <a:schemeClr val="tx1">
-                  <a:lumMod val="95000"/>
-                  <a:lumOff val="5000"/>
-                </a:schemeClr>
-              </a:solidFill>
-            </a:endParaRPr>
-          </a:p>
-          <a:p>
-            <a:r>
-              <a:rPr lang="hu-HU" dirty="0">
-                <a:solidFill>
-                  <a:schemeClr val="tx1">
-                    <a:lumMod val="95000"/>
-                    <a:lumOff val="5000"/>
-                  </a:schemeClr>
-                </a:solidFill>
-                <a:hlinkClick r:id="rId3"/>
-              </a:rPr>
-              <a:t>https://tinyurl.com/rjnvs4ff</a:t>
-            </a:r>
-            <a:r>
-              <a:rPr lang="hu-HU" dirty="0">
-                <a:solidFill>
-                  <a:schemeClr val="tx1">
-                    <a:lumMod val="95000"/>
-                    <a:lumOff val="5000"/>
-                  </a:schemeClr>
-                </a:solidFill>
-              </a:rPr>
-              <a:t> </a:t>
-            </a:r>
-          </a:p>
-          <a:p>
-            <a:r>
-              <a:rPr lang="hu-HU" dirty="0">
-                <a:solidFill>
-                  <a:schemeClr val="tx1">
-                    <a:lumMod val="95000"/>
-                    <a:lumOff val="5000"/>
-                  </a:schemeClr>
-                </a:solidFill>
-                <a:hlinkClick r:id="rId4"/>
-              </a:rPr>
-              <a:t>https://tinyurl.com/a6btrmyp</a:t>
-            </a:r>
-            <a:endParaRPr lang="hu-HU" dirty="0">
-              <a:solidFill>
-                <a:schemeClr val="tx1">
-                  <a:lumMod val="95000"/>
-                  <a:lumOff val="5000"/>
-                </a:schemeClr>
-              </a:solidFill>
-            </a:endParaRPr>
-          </a:p>
-          <a:p>
-            <a:endParaRPr lang="hu-HU" dirty="0">
-              <a:solidFill>
-                <a:schemeClr val="tx1">
-                  <a:lumMod val="95000"/>
-                  <a:lumOff val="5000"/>
-                </a:schemeClr>
-              </a:solidFill>
-            </a:endParaRPr>
-          </a:p>
-          <a:p>
-            <a:endParaRPr lang="hu-HU" dirty="0">
-              <a:solidFill>
-                <a:schemeClr val="tx1">
-                  <a:lumMod val="95000"/>
-                  <a:lumOff val="5000"/>
-                </a:schemeClr>
-              </a:solidFill>
-            </a:endParaRPr>
-          </a:p>
-          <a:p>
-            <a:endParaRPr lang="hu-HU" dirty="0">
-              <a:solidFill>
-                <a:schemeClr val="tx1">
-                  <a:lumMod val="95000"/>
-                  <a:lumOff val="5000"/>
-                </a:schemeClr>
-              </a:solidFill>
-            </a:endParaRPr>
-          </a:p>
-        </p:txBody>
-      </p:sp>
       <p:pic>
         <p:nvPicPr>
-          <p:cNvPr id="4" name="Kép 3"/>
+          <p:cNvPr id="5" name="Kép 4"/>
           <p:cNvPicPr>
             <a:picLocks noChangeAspect="1"/>
           </p:cNvPicPr>
           <p:nvPr/>
         </p:nvPicPr>
         <p:blipFill>
-          <a:blip r:embed="rId5"/>
+          <a:blip r:embed="rId2"/>
           <a:stretch>
             <a:fillRect/>
           </a:stretch>
         </p:blipFill>
         <p:spPr>
           <a:xfrm>
-            <a:off x="1097280" y="1593689"/>
-            <a:ext cx="10193020" cy="252045"/>
+            <a:off x="1182686" y="1578889"/>
+            <a:ext cx="10164763" cy="316941"/>
           </a:xfrm>
           <a:prstGeom prst="rect">
             <a:avLst/>
           </a:prstGeom>
+        </p:spPr>
+      </p:pic>
+      <p:sp>
+        <p:nvSpPr>
+          <p:cNvPr id="2" name="Cím 1"/>
+          <p:cNvSpPr>
+            <a:spLocks noGrp="1"/>
+          </p:cNvSpPr>
+          <p:nvPr>
+            <p:ph type="title"/>
+          </p:nvPr>
+        </p:nvSpPr>
+        <p:spPr>
+          <a:xfrm>
+            <a:off x="1182686" y="709585"/>
+            <a:ext cx="4839716" cy="709433"/>
+          </a:xfrm>
+        </p:spPr>
+        <p:txBody>
+          <a:bodyPr>
+            <a:normAutofit/>
+          </a:bodyPr>
+          <a:lstStyle/>
+          <a:p>
+            <a:r>
+              <a:rPr lang="hu-HU" sz="4300" dirty="0">
+                <a:latin typeface="Times New Roman" panose="02020603050405020304" pitchFamily="18" charset="0"/>
+                <a:cs typeface="Times New Roman" panose="02020603050405020304" pitchFamily="18" charset="0"/>
+              </a:rPr>
+              <a:t>Adatátviteli közegek</a:t>
+            </a:r>
+          </a:p>
+        </p:txBody>
+      </p:sp>
+      <p:sp>
+        <p:nvSpPr>
+          <p:cNvPr id="3" name="Tartalom helye 2"/>
+          <p:cNvSpPr>
+            <a:spLocks noGrp="1"/>
+          </p:cNvSpPr>
+          <p:nvPr>
+            <p:ph idx="1"/>
+          </p:nvPr>
+        </p:nvSpPr>
+        <p:spPr>
+          <a:xfrm>
+            <a:off x="825500" y="2093136"/>
+            <a:ext cx="2959100" cy="3673475"/>
+          </a:xfrm>
+        </p:spPr>
+        <p:txBody>
+          <a:bodyPr>
+            <a:normAutofit/>
+          </a:bodyPr>
+          <a:lstStyle/>
+          <a:p>
+            <a:pPr marL="0" indent="0">
+              <a:buNone/>
+            </a:pPr>
+            <a:r>
+              <a:rPr lang="hu-HU" sz="2400" b="1" dirty="0">
+                <a:latin typeface="Times New Roman" panose="02020603050405020304" pitchFamily="18" charset="0"/>
+                <a:cs typeface="Times New Roman" panose="02020603050405020304" pitchFamily="18" charset="0"/>
+              </a:rPr>
+              <a:t>Vezetékes:</a:t>
+            </a:r>
+          </a:p>
+          <a:p>
+            <a:r>
+              <a:rPr lang="hu-HU" sz="2400" dirty="0">
+                <a:latin typeface="Times New Roman" panose="02020603050405020304" pitchFamily="18" charset="0"/>
+                <a:cs typeface="Times New Roman" panose="02020603050405020304" pitchFamily="18" charset="0"/>
+              </a:rPr>
+              <a:t>Koaxiális kábel</a:t>
+            </a:r>
+          </a:p>
+          <a:p>
+            <a:r>
+              <a:rPr lang="hu-HU" sz="2400" dirty="0">
+                <a:latin typeface="Times New Roman" panose="02020603050405020304" pitchFamily="18" charset="0"/>
+                <a:cs typeface="Times New Roman" panose="02020603050405020304" pitchFamily="18" charset="0"/>
+              </a:rPr>
+              <a:t>Optikai kábel</a:t>
+            </a:r>
+          </a:p>
+          <a:p>
+            <a:pPr marL="0" indent="0">
+              <a:buNone/>
+            </a:pPr>
+            <a:endParaRPr lang="hu-HU" sz="2400" dirty="0">
+              <a:latin typeface="Times New Roman" panose="02020603050405020304" pitchFamily="18" charset="0"/>
+              <a:cs typeface="Times New Roman" panose="02020603050405020304" pitchFamily="18" charset="0"/>
+            </a:endParaRPr>
+          </a:p>
+          <a:p>
+            <a:pPr marL="0" indent="0">
+              <a:buNone/>
+            </a:pPr>
+            <a:r>
+              <a:rPr lang="hu-HU" sz="2400" b="1" dirty="0">
+                <a:latin typeface="Times New Roman" panose="02020603050405020304" pitchFamily="18" charset="0"/>
+                <a:cs typeface="Times New Roman" panose="02020603050405020304" pitchFamily="18" charset="0"/>
+              </a:rPr>
+              <a:t>Vezeték nélküli:</a:t>
+            </a:r>
+          </a:p>
+          <a:p>
+            <a:r>
+              <a:rPr lang="hu-HU" sz="2400" dirty="0">
+                <a:latin typeface="Times New Roman" panose="02020603050405020304" pitchFamily="18" charset="0"/>
+                <a:cs typeface="Times New Roman" panose="02020603050405020304" pitchFamily="18" charset="0"/>
+              </a:rPr>
+              <a:t>Rádiófrekvenciás</a:t>
+            </a:r>
+          </a:p>
+          <a:p>
+            <a:r>
+              <a:rPr lang="hu-HU" sz="2400" dirty="0">
+                <a:latin typeface="Times New Roman" panose="02020603050405020304" pitchFamily="18" charset="0"/>
+                <a:cs typeface="Times New Roman" panose="02020603050405020304" pitchFamily="18" charset="0"/>
+              </a:rPr>
+              <a:t>Műholdas</a:t>
+            </a:r>
+          </a:p>
+          <a:p>
+            <a:endParaRPr lang="hu-HU" sz="2400" dirty="0">
+              <a:latin typeface="Times New Roman" panose="02020603050405020304" pitchFamily="18" charset="0"/>
+              <a:cs typeface="Times New Roman" panose="02020603050405020304" pitchFamily="18" charset="0"/>
+            </a:endParaRPr>
+          </a:p>
+          <a:p>
+            <a:endParaRPr lang="hu-HU" sz="2400" dirty="0">
+              <a:latin typeface="Times New Roman" panose="02020603050405020304" pitchFamily="18" charset="0"/>
+              <a:cs typeface="Times New Roman" panose="02020603050405020304" pitchFamily="18" charset="0"/>
+            </a:endParaRPr>
+          </a:p>
+        </p:txBody>
+      </p:sp>
+      <p:sp>
+        <p:nvSpPr>
+          <p:cNvPr id="4" name="Szövegdoboz 3"/>
+          <p:cNvSpPr txBox="1"/>
+          <p:nvPr/>
+        </p:nvSpPr>
+        <p:spPr>
+          <a:xfrm>
+            <a:off x="8407400" y="6070600"/>
+            <a:ext cx="1407758" cy="215444"/>
+          </a:xfrm>
+          <a:prstGeom prst="rect">
+            <a:avLst/>
+          </a:prstGeom>
+          <a:noFill/>
+        </p:spPr>
+        <p:txBody>
+          <a:bodyPr wrap="none" rtlCol="0">
+            <a:spAutoFit/>
+          </a:bodyPr>
+          <a:lstStyle/>
+          <a:p>
+            <a:r>
+              <a:rPr lang="hu-HU" sz="800" dirty="0"/>
+              <a:t>https://tinyurl.com/rz85a358</a:t>
+            </a:r>
+          </a:p>
+        </p:txBody>
+      </p:sp>
+      <p:pic>
+        <p:nvPicPr>
+          <p:cNvPr id="1026" name="Picture 2" descr="https://www.kabelfutar.hu/images/stories/virtuemart/product/huzalpancel.png"/>
+          <p:cNvPicPr>
+            <a:picLocks noChangeAspect="1" noChangeArrowheads="1"/>
+          </p:cNvPicPr>
+          <p:nvPr/>
+        </p:nvPicPr>
+        <p:blipFill>
+          <a:blip r:embed="rId3">
+            <a:extLst>
+              <a:ext uri="{28A0092B-C50C-407E-A947-70E740481C1C}">
+                <a14:useLocalDpi xmlns:a14="http://schemas.microsoft.com/office/drawing/2010/main" val="0"/>
+              </a:ext>
+            </a:extLst>
+          </a:blip>
+          <a:srcRect/>
+          <a:stretch>
+            <a:fillRect/>
+          </a:stretch>
+        </p:blipFill>
+        <p:spPr bwMode="auto">
+          <a:xfrm>
+            <a:off x="3784600" y="1737359"/>
+            <a:ext cx="7628889" cy="3660184"/>
+          </a:xfrm>
+          <a:prstGeom prst="rect">
+            <a:avLst/>
+          </a:prstGeom>
+          <a:noFill/>
+          <a:extLst>
+            <a:ext uri="{909E8E84-426E-40DD-AFC4-6F175D3DCCD1}">
+              <a14:hiddenFill xmlns:a14="http://schemas.microsoft.com/office/drawing/2010/main">
+                <a:solidFill>
+                  <a:srgbClr val="FFFFFF"/>
+                </a:solidFill>
+              </a14:hiddenFill>
+            </a:ext>
+          </a:extLst>
         </p:spPr>
       </p:pic>
     </p:spTree>
     <p:extLst>
       <p:ext uri="{BB962C8B-B14F-4D97-AF65-F5344CB8AC3E}">
-        <p14:creationId xmlns:p14="http://schemas.microsoft.com/office/powerpoint/2010/main" val="4023112020"/>
+        <p14:creationId xmlns:p14="http://schemas.microsoft.com/office/powerpoint/2010/main" val="1474880856"/>
       </p:ext>
     </p:extLst>
   </p:cSld>
@@ -5963,20 +6761,20 @@
 </file>
 
 <file path=customXml/item1.xml><?xml version="1.0" encoding="utf-8"?>
-<p:properties xmlns:p="http://schemas.microsoft.com/office/2006/metadata/properties" xmlns:xsi="http://www.w3.org/2001/XMLSchema-instance" xmlns:pc="http://schemas.microsoft.com/office/infopath/2007/PartnerControls">
-  <documentManagement>
-    <ReferenceId xmlns="cda7f449-9791-4026-adf0-6249e0f1a277" xsi:nil="true"/>
-  </documentManagement>
-</p:properties>
-</file>
-
-<file path=customXml/item2.xml><?xml version="1.0" encoding="utf-8"?>
 <?mso-contentType ?>
 <FormTemplates xmlns="http://schemas.microsoft.com/sharepoint/v3/contenttype/forms">
   <Display>DocumentLibraryForm</Display>
   <Edit>DocumentLibraryForm</Edit>
   <New>DocumentLibraryForm</New>
 </FormTemplates>
+</file>
+
+<file path=customXml/item2.xml><?xml version="1.0" encoding="utf-8"?>
+<p:properties xmlns:p="http://schemas.microsoft.com/office/2006/metadata/properties" xmlns:xsi="http://www.w3.org/2001/XMLSchema-instance" xmlns:pc="http://schemas.microsoft.com/office/infopath/2007/PartnerControls">
+  <documentManagement>
+    <ReferenceId xmlns="cda7f449-9791-4026-adf0-6249e0f1a277" xsi:nil="true"/>
+  </documentManagement>
+</p:properties>
 </file>
 
 <file path=customXml/item3.xml><?xml version="1.0" encoding="utf-8"?>
@@ -6118,19 +6916,19 @@
 </file>
 
 <file path=customXml/itemProps1.xml><?xml version="1.0" encoding="utf-8"?>
+<ds:datastoreItem xmlns:ds="http://schemas.openxmlformats.org/officeDocument/2006/customXml" ds:itemID="{B114293F-6EE4-4834-97C1-1E9AD42354D9}">
+  <ds:schemaRefs>
+    <ds:schemaRef ds:uri="http://schemas.microsoft.com/sharepoint/v3/contenttype/forms"/>
+  </ds:schemaRefs>
+</ds:datastoreItem>
+</file>
+
+<file path=customXml/itemProps2.xml><?xml version="1.0" encoding="utf-8"?>
 <ds:datastoreItem xmlns:ds="http://schemas.openxmlformats.org/officeDocument/2006/customXml" ds:itemID="{B47C1B41-847B-4982-A61B-2DE97E148F4F}">
   <ds:schemaRefs>
     <ds:schemaRef ds:uri="http://schemas.microsoft.com/office/2006/metadata/properties"/>
     <ds:schemaRef ds:uri="http://schemas.microsoft.com/office/infopath/2007/PartnerControls"/>
     <ds:schemaRef ds:uri="cda7f449-9791-4026-adf0-6249e0f1a277"/>
-  </ds:schemaRefs>
-</ds:datastoreItem>
-</file>
-
-<file path=customXml/itemProps2.xml><?xml version="1.0" encoding="utf-8"?>
-<ds:datastoreItem xmlns:ds="http://schemas.openxmlformats.org/officeDocument/2006/customXml" ds:itemID="{B114293F-6EE4-4834-97C1-1E9AD42354D9}">
-  <ds:schemaRefs>
-    <ds:schemaRef ds:uri="http://schemas.microsoft.com/sharepoint/v3/contenttype/forms"/>
   </ds:schemaRefs>
 </ds:datastoreItem>
 </file>

</xml_diff>

<commit_message>
html, css upadte és ppt elkészítése
</commit_message>
<xml_diff>
--- a/Beadandó VJ.pptx
+++ b/Beadandó VJ.pptx
@@ -2,18 +2,18 @@
 <file path=ppt/presentation.xml><?xml version="1.0" encoding="utf-8"?>
 <p:presentation xmlns:a="http://schemas.openxmlformats.org/drawingml/2006/main" xmlns:r="http://schemas.openxmlformats.org/officeDocument/2006/relationships" xmlns:p="http://schemas.openxmlformats.org/presentationml/2006/main" saveSubsetFonts="1">
   <p:sldMasterIdLst>
-    <p:sldMasterId id="2147484127" r:id="rId4"/>
+    <p:sldMasterId id="2147484187" r:id="rId4"/>
   </p:sldMasterIdLst>
   <p:sldIdLst>
     <p:sldId id="256" r:id="rId5"/>
     <p:sldId id="257" r:id="rId6"/>
-    <p:sldId id="259" r:id="rId7"/>
-    <p:sldId id="258" r:id="rId8"/>
-    <p:sldId id="260" r:id="rId9"/>
-    <p:sldId id="267" r:id="rId10"/>
-    <p:sldId id="266" r:id="rId11"/>
-    <p:sldId id="268" r:id="rId12"/>
-    <p:sldId id="265" r:id="rId13"/>
+    <p:sldId id="258" r:id="rId7"/>
+    <p:sldId id="259" r:id="rId8"/>
+    <p:sldId id="266" r:id="rId9"/>
+    <p:sldId id="269" r:id="rId10"/>
+    <p:sldId id="268" r:id="rId11"/>
+    <p:sldId id="260" r:id="rId12"/>
+    <p:sldId id="267" r:id="rId13"/>
     <p:sldId id="264" r:id="rId14"/>
     <p:sldId id="263" r:id="rId15"/>
   </p:sldIdLst>
@@ -264,7 +264,7 @@
           </a:lstStyle>
           <a:p>
             <a:r>
-              <a:rPr lang="hu-HU"/>
+              <a:rPr lang="hu-HU" smtClean="0"/>
               <a:t>Mintacím szerkesztése</a:t>
             </a:r>
             <a:endParaRPr lang="en-US" dirty="0"/>
@@ -336,7 +336,7 @@
           </a:lstStyle>
           <a:p>
             <a:r>
-              <a:rPr lang="hu-HU"/>
+              <a:rPr lang="hu-HU" smtClean="0"/>
               <a:t>Kattintson ide az alcím mintájának szerkesztéséhez</a:t>
             </a:r>
             <a:endParaRPr lang="en-US" dirty="0"/>
@@ -360,7 +360,7 @@
           <a:p>
             <a:fld id="{8F5A1913-C1B8-42A7-81A1-2FE1D24E3BD3}" type="datetimeFigureOut">
               <a:rPr lang="hu-HU" smtClean="0"/>
-              <a:t>2022.09.15.</a:t>
+              <a:t>2022.09.19.</a:t>
             </a:fld>
             <a:endParaRPr lang="hu-HU"/>
           </a:p>
@@ -449,7 +449,7 @@
     </p:spTree>
     <p:extLst>
       <p:ext uri="{BB962C8B-B14F-4D97-AF65-F5344CB8AC3E}">
-        <p14:creationId xmlns:p14="http://schemas.microsoft.com/office/powerpoint/2010/main" val="477503147"/>
+        <p14:creationId xmlns:p14="http://schemas.microsoft.com/office/powerpoint/2010/main" val="1613368685"/>
       </p:ext>
     </p:extLst>
   </p:cSld>
@@ -492,7 +492,7 @@
           <a:lstStyle/>
           <a:p>
             <a:r>
-              <a:rPr lang="hu-HU"/>
+              <a:rPr lang="hu-HU" smtClean="0"/>
               <a:t>Mintacím szerkesztése</a:t>
             </a:r>
             <a:endParaRPr lang="en-US" dirty="0"/>
@@ -516,35 +516,35 @@
           <a:p>
             <a:pPr lvl="0"/>
             <a:r>
-              <a:rPr lang="hu-HU"/>
+              <a:rPr lang="hu-HU" smtClean="0"/>
               <a:t>Mintaszöveg szerkesztése</a:t>
             </a:r>
           </a:p>
           <a:p>
             <a:pPr lvl="1"/>
             <a:r>
-              <a:rPr lang="hu-HU"/>
+              <a:rPr lang="hu-HU" smtClean="0"/>
               <a:t>Második szint</a:t>
             </a:r>
           </a:p>
           <a:p>
             <a:pPr lvl="2"/>
             <a:r>
-              <a:rPr lang="hu-HU"/>
+              <a:rPr lang="hu-HU" smtClean="0"/>
               <a:t>Harmadik szint</a:t>
             </a:r>
           </a:p>
           <a:p>
             <a:pPr lvl="3"/>
             <a:r>
-              <a:rPr lang="hu-HU"/>
+              <a:rPr lang="hu-HU" smtClean="0"/>
               <a:t>Negyedik szint</a:t>
             </a:r>
           </a:p>
           <a:p>
             <a:pPr lvl="4"/>
             <a:r>
-              <a:rPr lang="hu-HU"/>
+              <a:rPr lang="hu-HU" smtClean="0"/>
               <a:t>Ötödik szint</a:t>
             </a:r>
             <a:endParaRPr lang="en-US" dirty="0"/>
@@ -568,7 +568,7 @@
           <a:p>
             <a:fld id="{8F5A1913-C1B8-42A7-81A1-2FE1D24E3BD3}" type="datetimeFigureOut">
               <a:rPr lang="hu-HU" smtClean="0"/>
-              <a:t>2022.09.15.</a:t>
+              <a:t>2022.09.19.</a:t>
             </a:fld>
             <a:endParaRPr lang="hu-HU"/>
           </a:p>
@@ -619,7 +619,7 @@
     </p:spTree>
     <p:extLst>
       <p:ext uri="{BB962C8B-B14F-4D97-AF65-F5344CB8AC3E}">
-        <p14:creationId xmlns:p14="http://schemas.microsoft.com/office/powerpoint/2010/main" val="6538864"/>
+        <p14:creationId xmlns:p14="http://schemas.microsoft.com/office/powerpoint/2010/main" val="1462502236"/>
       </p:ext>
     </p:extLst>
   </p:cSld>
@@ -743,7 +743,7 @@
           <a:lstStyle/>
           <a:p>
             <a:r>
-              <a:rPr lang="hu-HU"/>
+              <a:rPr lang="hu-HU" smtClean="0"/>
               <a:t>Mintacím szerkesztése</a:t>
             </a:r>
             <a:endParaRPr lang="en-US" dirty="0"/>
@@ -772,35 +772,35 @@
           <a:p>
             <a:pPr lvl="0"/>
             <a:r>
-              <a:rPr lang="hu-HU"/>
+              <a:rPr lang="hu-HU" smtClean="0"/>
               <a:t>Mintaszöveg szerkesztése</a:t>
             </a:r>
           </a:p>
           <a:p>
             <a:pPr lvl="1"/>
             <a:r>
-              <a:rPr lang="hu-HU"/>
+              <a:rPr lang="hu-HU" smtClean="0"/>
               <a:t>Második szint</a:t>
             </a:r>
           </a:p>
           <a:p>
             <a:pPr lvl="2"/>
             <a:r>
-              <a:rPr lang="hu-HU"/>
+              <a:rPr lang="hu-HU" smtClean="0"/>
               <a:t>Harmadik szint</a:t>
             </a:r>
           </a:p>
           <a:p>
             <a:pPr lvl="3"/>
             <a:r>
-              <a:rPr lang="hu-HU"/>
+              <a:rPr lang="hu-HU" smtClean="0"/>
               <a:t>Negyedik szint</a:t>
             </a:r>
           </a:p>
           <a:p>
             <a:pPr lvl="4"/>
             <a:r>
-              <a:rPr lang="hu-HU"/>
+              <a:rPr lang="hu-HU" smtClean="0"/>
               <a:t>Ötödik szint</a:t>
             </a:r>
             <a:endParaRPr lang="en-US" dirty="0"/>
@@ -824,7 +824,7 @@
           <a:p>
             <a:fld id="{8F5A1913-C1B8-42A7-81A1-2FE1D24E3BD3}" type="datetimeFigureOut">
               <a:rPr lang="hu-HU" smtClean="0"/>
-              <a:t>2022.09.15.</a:t>
+              <a:t>2022.09.19.</a:t>
             </a:fld>
             <a:endParaRPr lang="hu-HU"/>
           </a:p>
@@ -875,7 +875,7 @@
     </p:spTree>
     <p:extLst>
       <p:ext uri="{BB962C8B-B14F-4D97-AF65-F5344CB8AC3E}">
-        <p14:creationId xmlns:p14="http://schemas.microsoft.com/office/powerpoint/2010/main" val="752473862"/>
+        <p14:creationId xmlns:p14="http://schemas.microsoft.com/office/powerpoint/2010/main" val="1840586414"/>
       </p:ext>
     </p:extLst>
   </p:cSld>
@@ -922,7 +922,7 @@
           </a:lstStyle>
           <a:p>
             <a:r>
-              <a:rPr lang="hu-HU"/>
+              <a:rPr lang="hu-HU" smtClean="0"/>
               <a:t>Mintacím szerkesztése</a:t>
             </a:r>
             <a:endParaRPr lang="en-US" dirty="0"/>
@@ -946,35 +946,35 @@
           <a:p>
             <a:pPr lvl="0"/>
             <a:r>
-              <a:rPr lang="hu-HU"/>
+              <a:rPr lang="hu-HU" smtClean="0"/>
               <a:t>Mintaszöveg szerkesztése</a:t>
             </a:r>
           </a:p>
           <a:p>
             <a:pPr lvl="1"/>
             <a:r>
-              <a:rPr lang="hu-HU"/>
+              <a:rPr lang="hu-HU" smtClean="0"/>
               <a:t>Második szint</a:t>
             </a:r>
           </a:p>
           <a:p>
             <a:pPr lvl="2"/>
             <a:r>
-              <a:rPr lang="hu-HU"/>
+              <a:rPr lang="hu-HU" smtClean="0"/>
               <a:t>Harmadik szint</a:t>
             </a:r>
           </a:p>
           <a:p>
             <a:pPr lvl="3"/>
             <a:r>
-              <a:rPr lang="hu-HU"/>
+              <a:rPr lang="hu-HU" smtClean="0"/>
               <a:t>Negyedik szint</a:t>
             </a:r>
           </a:p>
           <a:p>
             <a:pPr lvl="4"/>
             <a:r>
-              <a:rPr lang="hu-HU"/>
+              <a:rPr lang="hu-HU" smtClean="0"/>
               <a:t>Ötödik szint</a:t>
             </a:r>
             <a:endParaRPr lang="en-US" dirty="0"/>
@@ -998,7 +998,7 @@
           <a:p>
             <a:fld id="{8F5A1913-C1B8-42A7-81A1-2FE1D24E3BD3}" type="datetimeFigureOut">
               <a:rPr lang="hu-HU" smtClean="0"/>
-              <a:t>2022.09.15.</a:t>
+              <a:t>2022.09.19.</a:t>
             </a:fld>
             <a:endParaRPr lang="hu-HU"/>
           </a:p>
@@ -1049,7 +1049,7 @@
     </p:spTree>
     <p:extLst>
       <p:ext uri="{BB962C8B-B14F-4D97-AF65-F5344CB8AC3E}">
-        <p14:creationId xmlns:p14="http://schemas.microsoft.com/office/powerpoint/2010/main" val="2722133418"/>
+        <p14:creationId xmlns:p14="http://schemas.microsoft.com/office/powerpoint/2010/main" val="2122507320"/>
       </p:ext>
     </p:extLst>
   </p:cSld>
@@ -1197,7 +1197,7 @@
           </a:lstStyle>
           <a:p>
             <a:r>
-              <a:rPr lang="hu-HU"/>
+              <a:rPr lang="hu-HU" smtClean="0"/>
               <a:t>Mintacím szerkesztése</a:t>
             </a:r>
             <a:endParaRPr lang="en-US" dirty="0"/>
@@ -1318,7 +1318,7 @@
           <a:p>
             <a:pPr lvl="0"/>
             <a:r>
-              <a:rPr lang="hu-HU"/>
+              <a:rPr lang="hu-HU" smtClean="0"/>
               <a:t>Mintaszöveg szerkesztése</a:t>
             </a:r>
           </a:p>
@@ -1341,7 +1341,7 @@
           <a:p>
             <a:fld id="{8F5A1913-C1B8-42A7-81A1-2FE1D24E3BD3}" type="datetimeFigureOut">
               <a:rPr lang="hu-HU" smtClean="0"/>
-              <a:t>2022.09.15.</a:t>
+              <a:t>2022.09.19.</a:t>
             </a:fld>
             <a:endParaRPr lang="hu-HU"/>
           </a:p>
@@ -1430,7 +1430,7 @@
     </p:spTree>
     <p:extLst>
       <p:ext uri="{BB962C8B-B14F-4D97-AF65-F5344CB8AC3E}">
-        <p14:creationId xmlns:p14="http://schemas.microsoft.com/office/powerpoint/2010/main" val="3894605585"/>
+        <p14:creationId xmlns:p14="http://schemas.microsoft.com/office/powerpoint/2010/main" val="3981230593"/>
       </p:ext>
     </p:extLst>
   </p:cSld>
@@ -1478,7 +1478,7 @@
           <a:lstStyle/>
           <a:p>
             <a:r>
-              <a:rPr lang="hu-HU"/>
+              <a:rPr lang="hu-HU" smtClean="0"/>
               <a:t>Mintacím szerkesztése</a:t>
             </a:r>
             <a:endParaRPr lang="en-US" dirty="0"/>
@@ -1507,35 +1507,35 @@
           <a:p>
             <a:pPr lvl="0"/>
             <a:r>
-              <a:rPr lang="hu-HU"/>
+              <a:rPr lang="hu-HU" smtClean="0"/>
               <a:t>Mintaszöveg szerkesztése</a:t>
             </a:r>
           </a:p>
           <a:p>
             <a:pPr lvl="1"/>
             <a:r>
-              <a:rPr lang="hu-HU"/>
+              <a:rPr lang="hu-HU" smtClean="0"/>
               <a:t>Második szint</a:t>
             </a:r>
           </a:p>
           <a:p>
             <a:pPr lvl="2"/>
             <a:r>
-              <a:rPr lang="hu-HU"/>
+              <a:rPr lang="hu-HU" smtClean="0"/>
               <a:t>Harmadik szint</a:t>
             </a:r>
           </a:p>
           <a:p>
             <a:pPr lvl="3"/>
             <a:r>
-              <a:rPr lang="hu-HU"/>
+              <a:rPr lang="hu-HU" smtClean="0"/>
               <a:t>Negyedik szint</a:t>
             </a:r>
           </a:p>
           <a:p>
             <a:pPr lvl="4"/>
             <a:r>
-              <a:rPr lang="hu-HU"/>
+              <a:rPr lang="hu-HU" smtClean="0"/>
               <a:t>Ötödik szint</a:t>
             </a:r>
             <a:endParaRPr lang="en-US" dirty="0"/>
@@ -1564,35 +1564,35 @@
           <a:p>
             <a:pPr lvl="0"/>
             <a:r>
-              <a:rPr lang="hu-HU"/>
+              <a:rPr lang="hu-HU" smtClean="0"/>
               <a:t>Mintaszöveg szerkesztése</a:t>
             </a:r>
           </a:p>
           <a:p>
             <a:pPr lvl="1"/>
             <a:r>
-              <a:rPr lang="hu-HU"/>
+              <a:rPr lang="hu-HU" smtClean="0"/>
               <a:t>Második szint</a:t>
             </a:r>
           </a:p>
           <a:p>
             <a:pPr lvl="2"/>
             <a:r>
-              <a:rPr lang="hu-HU"/>
+              <a:rPr lang="hu-HU" smtClean="0"/>
               <a:t>Harmadik szint</a:t>
             </a:r>
           </a:p>
           <a:p>
             <a:pPr lvl="3"/>
             <a:r>
-              <a:rPr lang="hu-HU"/>
+              <a:rPr lang="hu-HU" smtClean="0"/>
               <a:t>Negyedik szint</a:t>
             </a:r>
           </a:p>
           <a:p>
             <a:pPr lvl="4"/>
             <a:r>
-              <a:rPr lang="hu-HU"/>
+              <a:rPr lang="hu-HU" smtClean="0"/>
               <a:t>Ötödik szint</a:t>
             </a:r>
             <a:endParaRPr lang="en-US" dirty="0"/>
@@ -1616,7 +1616,7 @@
           <a:p>
             <a:fld id="{8F5A1913-C1B8-42A7-81A1-2FE1D24E3BD3}" type="datetimeFigureOut">
               <a:rPr lang="hu-HU" smtClean="0"/>
-              <a:t>2022.09.15.</a:t>
+              <a:t>2022.09.19.</a:t>
             </a:fld>
             <a:endParaRPr lang="hu-HU"/>
           </a:p>
@@ -1667,7 +1667,7 @@
     </p:spTree>
     <p:extLst>
       <p:ext uri="{BB962C8B-B14F-4D97-AF65-F5344CB8AC3E}">
-        <p14:creationId xmlns:p14="http://schemas.microsoft.com/office/powerpoint/2010/main" val="2435732132"/>
+        <p14:creationId xmlns:p14="http://schemas.microsoft.com/office/powerpoint/2010/main" val="4153742586"/>
       </p:ext>
     </p:extLst>
   </p:cSld>
@@ -1715,7 +1715,7 @@
           <a:lstStyle/>
           <a:p>
             <a:r>
-              <a:rPr lang="hu-HU"/>
+              <a:rPr lang="hu-HU" smtClean="0"/>
               <a:t>Mintacím szerkesztése</a:t>
             </a:r>
             <a:endParaRPr lang="en-US" dirty="0"/>
@@ -1787,7 +1787,7 @@
           <a:p>
             <a:pPr lvl="0"/>
             <a:r>
-              <a:rPr lang="hu-HU"/>
+              <a:rPr lang="hu-HU" smtClean="0"/>
               <a:t>Mintaszöveg szerkesztése</a:t>
             </a:r>
           </a:p>
@@ -1815,35 +1815,35 @@
           <a:p>
             <a:pPr lvl="0"/>
             <a:r>
-              <a:rPr lang="hu-HU"/>
+              <a:rPr lang="hu-HU" smtClean="0"/>
               <a:t>Mintaszöveg szerkesztése</a:t>
             </a:r>
           </a:p>
           <a:p>
             <a:pPr lvl="1"/>
             <a:r>
-              <a:rPr lang="hu-HU"/>
+              <a:rPr lang="hu-HU" smtClean="0"/>
               <a:t>Második szint</a:t>
             </a:r>
           </a:p>
           <a:p>
             <a:pPr lvl="2"/>
             <a:r>
-              <a:rPr lang="hu-HU"/>
+              <a:rPr lang="hu-HU" smtClean="0"/>
               <a:t>Harmadik szint</a:t>
             </a:r>
           </a:p>
           <a:p>
             <a:pPr lvl="3"/>
             <a:r>
-              <a:rPr lang="hu-HU"/>
+              <a:rPr lang="hu-HU" smtClean="0"/>
               <a:t>Negyedik szint</a:t>
             </a:r>
           </a:p>
           <a:p>
             <a:pPr lvl="4"/>
             <a:r>
-              <a:rPr lang="hu-HU"/>
+              <a:rPr lang="hu-HU" smtClean="0"/>
               <a:t>Ötödik szint</a:t>
             </a:r>
             <a:endParaRPr lang="en-US" dirty="0"/>
@@ -1915,7 +1915,7 @@
           <a:p>
             <a:pPr lvl="0"/>
             <a:r>
-              <a:rPr lang="hu-HU"/>
+              <a:rPr lang="hu-HU" smtClean="0"/>
               <a:t>Mintaszöveg szerkesztése</a:t>
             </a:r>
           </a:p>
@@ -1943,35 +1943,35 @@
           <a:p>
             <a:pPr lvl="0"/>
             <a:r>
-              <a:rPr lang="hu-HU"/>
+              <a:rPr lang="hu-HU" smtClean="0"/>
               <a:t>Mintaszöveg szerkesztése</a:t>
             </a:r>
           </a:p>
           <a:p>
             <a:pPr lvl="1"/>
             <a:r>
-              <a:rPr lang="hu-HU"/>
+              <a:rPr lang="hu-HU" smtClean="0"/>
               <a:t>Második szint</a:t>
             </a:r>
           </a:p>
           <a:p>
             <a:pPr lvl="2"/>
             <a:r>
-              <a:rPr lang="hu-HU"/>
+              <a:rPr lang="hu-HU" smtClean="0"/>
               <a:t>Harmadik szint</a:t>
             </a:r>
           </a:p>
           <a:p>
             <a:pPr lvl="3"/>
             <a:r>
-              <a:rPr lang="hu-HU"/>
+              <a:rPr lang="hu-HU" smtClean="0"/>
               <a:t>Negyedik szint</a:t>
             </a:r>
           </a:p>
           <a:p>
             <a:pPr lvl="4"/>
             <a:r>
-              <a:rPr lang="hu-HU"/>
+              <a:rPr lang="hu-HU" smtClean="0"/>
               <a:t>Ötödik szint</a:t>
             </a:r>
             <a:endParaRPr lang="en-US" dirty="0"/>
@@ -1995,7 +1995,7 @@
           <a:p>
             <a:fld id="{8F5A1913-C1B8-42A7-81A1-2FE1D24E3BD3}" type="datetimeFigureOut">
               <a:rPr lang="hu-HU" smtClean="0"/>
-              <a:t>2022.09.15.</a:t>
+              <a:t>2022.09.19.</a:t>
             </a:fld>
             <a:endParaRPr lang="hu-HU"/>
           </a:p>
@@ -2046,7 +2046,7 @@
     </p:spTree>
     <p:extLst>
       <p:ext uri="{BB962C8B-B14F-4D97-AF65-F5344CB8AC3E}">
-        <p14:creationId xmlns:p14="http://schemas.microsoft.com/office/powerpoint/2010/main" val="2477008085"/>
+        <p14:creationId xmlns:p14="http://schemas.microsoft.com/office/powerpoint/2010/main" val="4005302490"/>
       </p:ext>
     </p:extLst>
   </p:cSld>
@@ -2089,7 +2089,7 @@
           <a:lstStyle/>
           <a:p>
             <a:r>
-              <a:rPr lang="hu-HU"/>
+              <a:rPr lang="hu-HU" smtClean="0"/>
               <a:t>Mintacím szerkesztése</a:t>
             </a:r>
             <a:endParaRPr lang="en-US" dirty="0"/>
@@ -2113,7 +2113,7 @@
           <a:p>
             <a:fld id="{8F5A1913-C1B8-42A7-81A1-2FE1D24E3BD3}" type="datetimeFigureOut">
               <a:rPr lang="hu-HU" smtClean="0"/>
-              <a:t>2022.09.15.</a:t>
+              <a:t>2022.09.19.</a:t>
             </a:fld>
             <a:endParaRPr lang="hu-HU"/>
           </a:p>
@@ -2164,7 +2164,7 @@
     </p:spTree>
     <p:extLst>
       <p:ext uri="{BB962C8B-B14F-4D97-AF65-F5344CB8AC3E}">
-        <p14:creationId xmlns:p14="http://schemas.microsoft.com/office/powerpoint/2010/main" val="2185010750"/>
+        <p14:creationId xmlns:p14="http://schemas.microsoft.com/office/powerpoint/2010/main" val="3100887637"/>
       </p:ext>
     </p:extLst>
   </p:cSld>
@@ -2284,7 +2284,7 @@
           <a:p>
             <a:fld id="{8F5A1913-C1B8-42A7-81A1-2FE1D24E3BD3}" type="datetimeFigureOut">
               <a:rPr lang="hu-HU" smtClean="0"/>
-              <a:t>2022.09.15.</a:t>
+              <a:t>2022.09.19.</a:t>
             </a:fld>
             <a:endParaRPr lang="hu-HU"/>
           </a:p>
@@ -2343,7 +2343,7 @@
     </p:spTree>
     <p:extLst>
       <p:ext uri="{BB962C8B-B14F-4D97-AF65-F5344CB8AC3E}">
-        <p14:creationId xmlns:p14="http://schemas.microsoft.com/office/powerpoint/2010/main" val="2019355833"/>
+        <p14:creationId xmlns:p14="http://schemas.microsoft.com/office/powerpoint/2010/main" val="4078997968"/>
       </p:ext>
     </p:extLst>
   </p:cSld>
@@ -2477,7 +2477,7 @@
           </a:lstStyle>
           <a:p>
             <a:r>
-              <a:rPr lang="hu-HU"/>
+              <a:rPr lang="hu-HU" smtClean="0"/>
               <a:t>Mintacím szerkesztése</a:t>
             </a:r>
             <a:endParaRPr lang="en-US" dirty="0"/>
@@ -2506,35 +2506,35 @@
           <a:p>
             <a:pPr lvl="0"/>
             <a:r>
-              <a:rPr lang="hu-HU"/>
+              <a:rPr lang="hu-HU" smtClean="0"/>
               <a:t>Mintaszöveg szerkesztése</a:t>
             </a:r>
           </a:p>
           <a:p>
             <a:pPr lvl="1"/>
             <a:r>
-              <a:rPr lang="hu-HU"/>
+              <a:rPr lang="hu-HU" smtClean="0"/>
               <a:t>Második szint</a:t>
             </a:r>
           </a:p>
           <a:p>
             <a:pPr lvl="2"/>
             <a:r>
-              <a:rPr lang="hu-HU"/>
+              <a:rPr lang="hu-HU" smtClean="0"/>
               <a:t>Harmadik szint</a:t>
             </a:r>
           </a:p>
           <a:p>
             <a:pPr lvl="3"/>
             <a:r>
-              <a:rPr lang="hu-HU"/>
+              <a:rPr lang="hu-HU" smtClean="0"/>
               <a:t>Negyedik szint</a:t>
             </a:r>
           </a:p>
           <a:p>
             <a:pPr lvl="4"/>
             <a:r>
-              <a:rPr lang="hu-HU"/>
+              <a:rPr lang="hu-HU" smtClean="0"/>
               <a:t>Ötödik szint</a:t>
             </a:r>
             <a:endParaRPr lang="en-US" dirty="0"/>
@@ -2606,7 +2606,7 @@
           <a:p>
             <a:pPr lvl="0"/>
             <a:r>
-              <a:rPr lang="hu-HU"/>
+              <a:rPr lang="hu-HU" smtClean="0"/>
               <a:t>Mintaszöveg szerkesztése</a:t>
             </a:r>
           </a:p>
@@ -2638,7 +2638,7 @@
           <a:p>
             <a:fld id="{8F5A1913-C1B8-42A7-81A1-2FE1D24E3BD3}" type="datetimeFigureOut">
               <a:rPr lang="hu-HU" smtClean="0"/>
-              <a:t>2022.09.15.</a:t>
+              <a:t>2022.09.19.</a:t>
             </a:fld>
             <a:endParaRPr lang="hu-HU"/>
           </a:p>
@@ -2710,7 +2710,7 @@
     </p:spTree>
     <p:extLst>
       <p:ext uri="{BB962C8B-B14F-4D97-AF65-F5344CB8AC3E}">
-        <p14:creationId xmlns:p14="http://schemas.microsoft.com/office/powerpoint/2010/main" val="3665435154"/>
+        <p14:creationId xmlns:p14="http://schemas.microsoft.com/office/powerpoint/2010/main" val="3241715841"/>
       </p:ext>
     </p:extLst>
   </p:cSld>
@@ -2844,7 +2844,7 @@
           </a:lstStyle>
           <a:p>
             <a:r>
-              <a:rPr lang="hu-HU"/>
+              <a:rPr lang="hu-HU" smtClean="0"/>
               <a:t>Mintacím szerkesztése</a:t>
             </a:r>
             <a:endParaRPr lang="en-US" dirty="0"/>
@@ -2919,7 +2919,7 @@
           </a:lstStyle>
           <a:p>
             <a:r>
-              <a:rPr lang="hu-HU"/>
+              <a:rPr lang="hu-HU" smtClean="0"/>
               <a:t>Kép beszúrásához kattintson az ikonra</a:t>
             </a:r>
             <a:endParaRPr lang="en-US" dirty="0"/>
@@ -2997,7 +2997,7 @@
           <a:p>
             <a:pPr lvl="0"/>
             <a:r>
-              <a:rPr lang="hu-HU"/>
+              <a:rPr lang="hu-HU" smtClean="0"/>
               <a:t>Mintaszöveg szerkesztése</a:t>
             </a:r>
           </a:p>
@@ -3020,7 +3020,7 @@
           <a:p>
             <a:fld id="{8F5A1913-C1B8-42A7-81A1-2FE1D24E3BD3}" type="datetimeFigureOut">
               <a:rPr lang="hu-HU" smtClean="0"/>
-              <a:t>2022.09.15.</a:t>
+              <a:t>2022.09.19.</a:t>
             </a:fld>
             <a:endParaRPr lang="hu-HU"/>
           </a:p>
@@ -3071,7 +3071,7 @@
     </p:spTree>
     <p:extLst>
       <p:ext uri="{BB962C8B-B14F-4D97-AF65-F5344CB8AC3E}">
-        <p14:creationId xmlns:p14="http://schemas.microsoft.com/office/powerpoint/2010/main" val="1991596673"/>
+        <p14:creationId xmlns:p14="http://schemas.microsoft.com/office/powerpoint/2010/main" val="201766085"/>
       </p:ext>
     </p:extLst>
   </p:cSld>
@@ -3205,7 +3205,7 @@
           <a:lstStyle/>
           <a:p>
             <a:r>
-              <a:rPr lang="hu-HU"/>
+              <a:rPr lang="hu-HU" smtClean="0"/>
               <a:t>Mintacím szerkesztése</a:t>
             </a:r>
             <a:endParaRPr lang="en-US" dirty="0"/>
@@ -3239,35 +3239,35 @@
           <a:p>
             <a:pPr lvl="0"/>
             <a:r>
-              <a:rPr lang="hu-HU"/>
+              <a:rPr lang="hu-HU" smtClean="0"/>
               <a:t>Mintaszöveg szerkesztése</a:t>
             </a:r>
           </a:p>
           <a:p>
             <a:pPr lvl="1"/>
             <a:r>
-              <a:rPr lang="hu-HU"/>
+              <a:rPr lang="hu-HU" smtClean="0"/>
               <a:t>Második szint</a:t>
             </a:r>
           </a:p>
           <a:p>
             <a:pPr lvl="2"/>
             <a:r>
-              <a:rPr lang="hu-HU"/>
+              <a:rPr lang="hu-HU" smtClean="0"/>
               <a:t>Harmadik szint</a:t>
             </a:r>
           </a:p>
           <a:p>
             <a:pPr lvl="3"/>
             <a:r>
-              <a:rPr lang="hu-HU"/>
+              <a:rPr lang="hu-HU" smtClean="0"/>
               <a:t>Negyedik szint</a:t>
             </a:r>
           </a:p>
           <a:p>
             <a:pPr lvl="4"/>
             <a:r>
-              <a:rPr lang="hu-HU"/>
+              <a:rPr lang="hu-HU" smtClean="0"/>
               <a:t>Ötödik szint</a:t>
             </a:r>
             <a:endParaRPr lang="en-US" dirty="0"/>
@@ -3307,7 +3307,7 @@
           <a:p>
             <a:fld id="{8F5A1913-C1B8-42A7-81A1-2FE1D24E3BD3}" type="datetimeFigureOut">
               <a:rPr lang="hu-HU" smtClean="0"/>
-              <a:t>2022.09.15.</a:t>
+              <a:t>2022.09.19.</a:t>
             </a:fld>
             <a:endParaRPr lang="hu-HU"/>
           </a:p>
@@ -3428,23 +3428,23 @@
     </p:spTree>
     <p:extLst>
       <p:ext uri="{BB962C8B-B14F-4D97-AF65-F5344CB8AC3E}">
-        <p14:creationId xmlns:p14="http://schemas.microsoft.com/office/powerpoint/2010/main" val="4040506662"/>
+        <p14:creationId xmlns:p14="http://schemas.microsoft.com/office/powerpoint/2010/main" val="2754629093"/>
       </p:ext>
     </p:extLst>
   </p:cSld>
   <p:clrMap bg1="lt1" tx1="dk1" bg2="lt2" tx2="dk2" accent1="accent1" accent2="accent2" accent3="accent3" accent4="accent4" accent5="accent5" accent6="accent6" hlink="hlink" folHlink="folHlink"/>
   <p:sldLayoutIdLst>
-    <p:sldLayoutId id="2147484128" r:id="rId1"/>
-    <p:sldLayoutId id="2147484129" r:id="rId2"/>
-    <p:sldLayoutId id="2147484130" r:id="rId3"/>
-    <p:sldLayoutId id="2147484131" r:id="rId4"/>
-    <p:sldLayoutId id="2147484132" r:id="rId5"/>
-    <p:sldLayoutId id="2147484133" r:id="rId6"/>
-    <p:sldLayoutId id="2147484134" r:id="rId7"/>
-    <p:sldLayoutId id="2147484135" r:id="rId8"/>
-    <p:sldLayoutId id="2147484136" r:id="rId9"/>
-    <p:sldLayoutId id="2147484137" r:id="rId10"/>
-    <p:sldLayoutId id="2147484138" r:id="rId11"/>
+    <p:sldLayoutId id="2147484188" r:id="rId1"/>
+    <p:sldLayoutId id="2147484189" r:id="rId2"/>
+    <p:sldLayoutId id="2147484190" r:id="rId3"/>
+    <p:sldLayoutId id="2147484191" r:id="rId4"/>
+    <p:sldLayoutId id="2147484192" r:id="rId5"/>
+    <p:sldLayoutId id="2147484193" r:id="rId6"/>
+    <p:sldLayoutId id="2147484194" r:id="rId7"/>
+    <p:sldLayoutId id="2147484195" r:id="rId8"/>
+    <p:sldLayoutId id="2147484196" r:id="rId9"/>
+    <p:sldLayoutId id="2147484197" r:id="rId10"/>
+    <p:sldLayoutId id="2147484198" r:id="rId11"/>
   </p:sldLayoutIdLst>
   <p:txStyles>
     <p:titleStyle>
@@ -3940,6 +3940,13 @@
   <p:clrMapOvr>
     <a:masterClrMapping/>
   </p:clrMapOvr>
+  <p:timing>
+    <p:tnLst>
+      <p:par>
+        <p:cTn id="1" dur="indefinite" restart="never" nodeType="tmRoot"/>
+      </p:par>
+    </p:tnLst>
+  </p:timing>
 </p:sld>
 </file>
 
@@ -4026,6 +4033,13 @@
   <p:clrMapOvr>
     <a:masterClrMapping/>
   </p:clrMapOvr>
+  <p:timing>
+    <p:tnLst>
+      <p:par>
+        <p:cTn id="1" dur="indefinite" restart="never" nodeType="tmRoot"/>
+      </p:par>
+    </p:tnLst>
+  </p:timing>
 </p:sld>
 </file>
 
@@ -4093,7 +4107,9 @@
           </a:xfrm>
         </p:spPr>
         <p:txBody>
-          <a:bodyPr/>
+          <a:bodyPr>
+            <a:normAutofit lnSpcReduction="10000"/>
+          </a:bodyPr>
           <a:lstStyle/>
           <a:p>
             <a:pPr marL="0" indent="0">
@@ -4136,6 +4152,219 @@
             <a:pPr marL="0" indent="0">
               <a:buNone/>
             </a:pPr>
+            <a:r>
+              <a:rPr lang="hu-HU" dirty="0">
+                <a:solidFill>
+                  <a:schemeClr val="tx1">
+                    <a:lumMod val="95000"/>
+                    <a:lumOff val="5000"/>
+                  </a:schemeClr>
+                </a:solidFill>
+                <a:hlinkClick r:id="rId3"/>
+              </a:rPr>
+              <a:t>https://</a:t>
+            </a:r>
+            <a:r>
+              <a:rPr lang="hu-HU" dirty="0" smtClean="0">
+                <a:solidFill>
+                  <a:schemeClr val="tx1">
+                    <a:lumMod val="95000"/>
+                    <a:lumOff val="5000"/>
+                  </a:schemeClr>
+                </a:solidFill>
+                <a:hlinkClick r:id="rId3"/>
+              </a:rPr>
+              <a:t>tinyurl.com/4zzu967y</a:t>
+            </a:r>
+            <a:endParaRPr lang="hu-HU" dirty="0" smtClean="0">
+              <a:solidFill>
+                <a:schemeClr val="tx1">
+                  <a:lumMod val="95000"/>
+                  <a:lumOff val="5000"/>
+                </a:schemeClr>
+              </a:solidFill>
+            </a:endParaRPr>
+          </a:p>
+          <a:p>
+            <a:pPr marL="0" indent="0">
+              <a:buNone/>
+            </a:pPr>
+            <a:r>
+              <a:rPr lang="hu-HU" dirty="0">
+                <a:solidFill>
+                  <a:schemeClr val="tx1">
+                    <a:lumMod val="95000"/>
+                    <a:lumOff val="5000"/>
+                  </a:schemeClr>
+                </a:solidFill>
+                <a:hlinkClick r:id="rId4"/>
+              </a:rPr>
+              <a:t>https://</a:t>
+            </a:r>
+            <a:r>
+              <a:rPr lang="hu-HU" dirty="0" smtClean="0">
+                <a:solidFill>
+                  <a:schemeClr val="tx1">
+                    <a:lumMod val="95000"/>
+                    <a:lumOff val="5000"/>
+                  </a:schemeClr>
+                </a:solidFill>
+                <a:hlinkClick r:id="rId4"/>
+              </a:rPr>
+              <a:t>tinyurl.com/2p84pabh</a:t>
+            </a:r>
+            <a:endParaRPr lang="hu-HU" dirty="0" smtClean="0">
+              <a:solidFill>
+                <a:schemeClr val="tx1">
+                  <a:lumMod val="95000"/>
+                  <a:lumOff val="5000"/>
+                </a:schemeClr>
+              </a:solidFill>
+            </a:endParaRPr>
+          </a:p>
+          <a:p>
+            <a:pPr marL="0" indent="0">
+              <a:buNone/>
+            </a:pPr>
+            <a:r>
+              <a:rPr lang="hu-HU" dirty="0">
+                <a:solidFill>
+                  <a:schemeClr val="tx1">
+                    <a:lumMod val="95000"/>
+                    <a:lumOff val="5000"/>
+                  </a:schemeClr>
+                </a:solidFill>
+                <a:hlinkClick r:id="rId5"/>
+              </a:rPr>
+              <a:t>https://</a:t>
+            </a:r>
+            <a:r>
+              <a:rPr lang="hu-HU" dirty="0" smtClean="0">
+                <a:solidFill>
+                  <a:schemeClr val="tx1">
+                    <a:lumMod val="95000"/>
+                    <a:lumOff val="5000"/>
+                  </a:schemeClr>
+                </a:solidFill>
+                <a:hlinkClick r:id="rId5"/>
+              </a:rPr>
+              <a:t>tinyurl.com/3mvb7t98</a:t>
+            </a:r>
+            <a:endParaRPr lang="hu-HU" dirty="0" smtClean="0">
+              <a:solidFill>
+                <a:schemeClr val="tx1">
+                  <a:lumMod val="95000"/>
+                  <a:lumOff val="5000"/>
+                </a:schemeClr>
+              </a:solidFill>
+            </a:endParaRPr>
+          </a:p>
+          <a:p>
+            <a:pPr marL="0" indent="0">
+              <a:buNone/>
+            </a:pPr>
+            <a:r>
+              <a:rPr lang="hu-HU" dirty="0">
+                <a:solidFill>
+                  <a:schemeClr val="tx1">
+                    <a:lumMod val="95000"/>
+                    <a:lumOff val="5000"/>
+                  </a:schemeClr>
+                </a:solidFill>
+                <a:hlinkClick r:id="rId6"/>
+              </a:rPr>
+              <a:t>https://</a:t>
+            </a:r>
+            <a:r>
+              <a:rPr lang="hu-HU" dirty="0" smtClean="0">
+                <a:solidFill>
+                  <a:schemeClr val="tx1">
+                    <a:lumMod val="95000"/>
+                    <a:lumOff val="5000"/>
+                  </a:schemeClr>
+                </a:solidFill>
+                <a:hlinkClick r:id="rId6"/>
+              </a:rPr>
+              <a:t>tinyurl.com/ys6x6v2t</a:t>
+            </a:r>
+            <a:endParaRPr lang="hu-HU" dirty="0" smtClean="0">
+              <a:solidFill>
+                <a:schemeClr val="tx1">
+                  <a:lumMod val="95000"/>
+                  <a:lumOff val="5000"/>
+                </a:schemeClr>
+              </a:solidFill>
+            </a:endParaRPr>
+          </a:p>
+          <a:p>
+            <a:pPr marL="0" indent="0">
+              <a:buNone/>
+            </a:pPr>
+            <a:endParaRPr lang="hu-HU" dirty="0" smtClean="0">
+              <a:solidFill>
+                <a:schemeClr val="tx1">
+                  <a:lumMod val="95000"/>
+                  <a:lumOff val="5000"/>
+                </a:schemeClr>
+              </a:solidFill>
+            </a:endParaRPr>
+          </a:p>
+          <a:p>
+            <a:pPr marL="0" indent="0">
+              <a:buNone/>
+            </a:pPr>
+            <a:endParaRPr lang="hu-HU" dirty="0" smtClean="0">
+              <a:solidFill>
+                <a:schemeClr val="tx1">
+                  <a:lumMod val="95000"/>
+                  <a:lumOff val="5000"/>
+                </a:schemeClr>
+              </a:solidFill>
+            </a:endParaRPr>
+          </a:p>
+          <a:p>
+            <a:pPr marL="0" indent="0">
+              <a:buNone/>
+            </a:pPr>
+            <a:endParaRPr lang="hu-HU" dirty="0" smtClean="0">
+              <a:solidFill>
+                <a:schemeClr val="tx1">
+                  <a:lumMod val="95000"/>
+                  <a:lumOff val="5000"/>
+                </a:schemeClr>
+              </a:solidFill>
+            </a:endParaRPr>
+          </a:p>
+          <a:p>
+            <a:pPr marL="0" indent="0">
+              <a:buNone/>
+            </a:pPr>
+            <a:endParaRPr lang="hu-HU" dirty="0">
+              <a:solidFill>
+                <a:schemeClr val="tx1">
+                  <a:lumMod val="95000"/>
+                  <a:lumOff val="5000"/>
+                </a:schemeClr>
+              </a:solidFill>
+            </a:endParaRPr>
+          </a:p>
+          <a:p>
+            <a:pPr marL="0" indent="0">
+              <a:buNone/>
+            </a:pPr>
+            <a:endParaRPr lang="hu-HU" dirty="0" smtClean="0">
+              <a:solidFill>
+                <a:schemeClr val="tx1">
+                  <a:lumMod val="95000"/>
+                  <a:lumOff val="5000"/>
+                </a:schemeClr>
+              </a:solidFill>
+            </a:endParaRPr>
+          </a:p>
+          <a:p>
+            <a:pPr marL="0" indent="0">
+              <a:buNone/>
+            </a:pPr>
             <a:endParaRPr lang="hu-HU" dirty="0">
               <a:solidFill>
                 <a:schemeClr val="tx1">
@@ -4156,7 +4385,7 @@
           <p:nvPr/>
         </p:nvPicPr>
         <p:blipFill>
-          <a:blip r:embed="rId3"/>
+          <a:blip r:embed="rId7"/>
           <a:stretch>
             <a:fillRect/>
           </a:stretch>
@@ -4181,6 +4410,13 @@
   <p:clrMapOvr>
     <a:masterClrMapping/>
   </p:clrMapOvr>
+  <p:timing>
+    <p:tnLst>
+      <p:par>
+        <p:cTn id="1" dur="indefinite" restart="never" nodeType="tmRoot"/>
+      </p:par>
+    </p:tnLst>
+  </p:timing>
 </p:sld>
 </file>
 
@@ -4225,7 +4461,7 @@
         </p:blipFill>
         <p:spPr>
           <a:xfrm>
-            <a:off x="812800" y="1719986"/>
+            <a:off x="945163" y="1656190"/>
             <a:ext cx="10773611" cy="131848"/>
           </a:xfrm>
           <a:prstGeom prst="rect">
@@ -4335,6 +4571,30 @@
           </a:p>
         </p:txBody>
       </p:sp>
+      <p:pic>
+        <p:nvPicPr>
+          <p:cNvPr id="4" name="Kép 3"/>
+          <p:cNvPicPr>
+            <a:picLocks noChangeAspect="1"/>
+          </p:cNvPicPr>
+          <p:nvPr/>
+        </p:nvPicPr>
+        <p:blipFill>
+          <a:blip r:embed="rId3"/>
+          <a:stretch>
+            <a:fillRect/>
+          </a:stretch>
+        </p:blipFill>
+        <p:spPr>
+          <a:xfrm>
+            <a:off x="5029201" y="968243"/>
+            <a:ext cx="5806039" cy="4931718"/>
+          </a:xfrm>
+          <a:prstGeom prst="rect">
+            <a:avLst/>
+          </a:prstGeom>
+        </p:spPr>
+      </p:pic>
     </p:spTree>
     <p:extLst>
       <p:ext uri="{BB962C8B-B14F-4D97-AF65-F5344CB8AC3E}">
@@ -4345,10 +4605,200 @@
   <p:clrMapOvr>
     <a:masterClrMapping/>
   </p:clrMapOvr>
+  <p:timing>
+    <p:tnLst>
+      <p:par>
+        <p:cTn id="1" dur="indefinite" restart="never" nodeType="tmRoot"/>
+      </p:par>
+    </p:tnLst>
+  </p:timing>
 </p:sld>
 </file>
 
 <file path=ppt/slides/slide3.xml><?xml version="1.0" encoding="utf-8"?>
+<p:sld xmlns:a="http://schemas.openxmlformats.org/drawingml/2006/main" xmlns:r="http://schemas.openxmlformats.org/officeDocument/2006/relationships" xmlns:p="http://schemas.openxmlformats.org/presentationml/2006/main">
+  <p:cSld>
+    <p:spTree>
+      <p:nvGrpSpPr>
+        <p:cNvPr id="1" name=""/>
+        <p:cNvGrpSpPr/>
+        <p:nvPr/>
+      </p:nvGrpSpPr>
+      <p:grpSpPr>
+        <a:xfrm>
+          <a:off x="0" y="0"/>
+          <a:ext cx="0" cy="0"/>
+          <a:chOff x="0" y="0"/>
+          <a:chExt cx="0" cy="0"/>
+        </a:xfrm>
+      </p:grpSpPr>
+      <p:pic>
+        <p:nvPicPr>
+          <p:cNvPr id="6" name="Kép 5"/>
+          <p:cNvPicPr>
+            <a:picLocks noChangeAspect="1"/>
+          </p:cNvPicPr>
+          <p:nvPr/>
+        </p:nvPicPr>
+        <p:blipFill>
+          <a:blip r:embed="rId2"/>
+          <a:stretch>
+            <a:fillRect/>
+          </a:stretch>
+        </p:blipFill>
+        <p:spPr>
+          <a:xfrm>
+            <a:off x="1097278" y="1668953"/>
+            <a:ext cx="10380847" cy="137626"/>
+          </a:xfrm>
+          <a:prstGeom prst="rect">
+            <a:avLst/>
+          </a:prstGeom>
+        </p:spPr>
+      </p:pic>
+      <p:sp>
+        <p:nvSpPr>
+          <p:cNvPr id="2" name="Cím 1"/>
+          <p:cNvSpPr>
+            <a:spLocks noGrp="1"/>
+          </p:cNvSpPr>
+          <p:nvPr>
+            <p:ph type="title"/>
+          </p:nvPr>
+        </p:nvSpPr>
+        <p:spPr>
+          <a:xfrm>
+            <a:off x="585275" y="752398"/>
+            <a:ext cx="4414520" cy="813754"/>
+          </a:xfrm>
+        </p:spPr>
+        <p:txBody>
+          <a:bodyPr>
+            <a:normAutofit/>
+          </a:bodyPr>
+          <a:lstStyle/>
+          <a:p>
+            <a:r>
+              <a:rPr lang="hu-HU" dirty="0" smtClean="0">
+                <a:latin typeface="Times New Roman" panose="02020603050405020304" pitchFamily="18" charset="0"/>
+                <a:cs typeface="Times New Roman" panose="02020603050405020304" pitchFamily="18" charset="0"/>
+              </a:rPr>
+              <a:t>Kernel feladatai</a:t>
+            </a:r>
+            <a:endParaRPr lang="hu-HU" dirty="0">
+              <a:latin typeface="Times New Roman" panose="02020603050405020304" pitchFamily="18" charset="0"/>
+              <a:cs typeface="Times New Roman" panose="02020603050405020304" pitchFamily="18" charset="0"/>
+            </a:endParaRPr>
+          </a:p>
+        </p:txBody>
+      </p:sp>
+      <p:sp>
+        <p:nvSpPr>
+          <p:cNvPr id="3" name="Tartalom helye 2"/>
+          <p:cNvSpPr>
+            <a:spLocks noGrp="1"/>
+          </p:cNvSpPr>
+          <p:nvPr>
+            <p:ph idx="1"/>
+          </p:nvPr>
+        </p:nvSpPr>
+        <p:spPr>
+          <a:xfrm>
+            <a:off x="585275" y="1909380"/>
+            <a:ext cx="3878441" cy="3757494"/>
+          </a:xfrm>
+        </p:spPr>
+        <p:txBody>
+          <a:bodyPr>
+            <a:normAutofit/>
+          </a:bodyPr>
+          <a:lstStyle/>
+          <a:p>
+            <a:pPr marL="0" indent="0">
+              <a:buNone/>
+            </a:pPr>
+            <a:r>
+              <a:rPr lang="hu-HU" sz="2400" dirty="0" smtClean="0">
+                <a:latin typeface="Times New Roman" panose="02020603050405020304" pitchFamily="18" charset="0"/>
+                <a:cs typeface="Times New Roman" panose="02020603050405020304" pitchFamily="18" charset="0"/>
+              </a:rPr>
+              <a:t>Eszközök kezelése</a:t>
+            </a:r>
+          </a:p>
+          <a:p>
+            <a:pPr marL="0" indent="0">
+              <a:buNone/>
+            </a:pPr>
+            <a:endParaRPr lang="hu-HU" sz="2400" dirty="0" smtClean="0">
+              <a:latin typeface="Times New Roman" panose="02020603050405020304" pitchFamily="18" charset="0"/>
+              <a:cs typeface="Times New Roman" panose="02020603050405020304" pitchFamily="18" charset="0"/>
+            </a:endParaRPr>
+          </a:p>
+          <a:p>
+            <a:pPr marL="0" indent="0">
+              <a:buNone/>
+            </a:pPr>
+            <a:r>
+              <a:rPr lang="hu-HU" sz="2400" dirty="0" smtClean="0">
+                <a:latin typeface="Times New Roman" panose="02020603050405020304" pitchFamily="18" charset="0"/>
+                <a:cs typeface="Times New Roman" panose="02020603050405020304" pitchFamily="18" charset="0"/>
+              </a:rPr>
+              <a:t>Programok futásának kezelése</a:t>
+            </a:r>
+          </a:p>
+          <a:p>
+            <a:pPr marL="0" indent="0">
+              <a:buNone/>
+            </a:pPr>
+            <a:endParaRPr lang="hu-HU" sz="2400" dirty="0" smtClean="0">
+              <a:latin typeface="Times New Roman" panose="02020603050405020304" pitchFamily="18" charset="0"/>
+              <a:cs typeface="Times New Roman" panose="02020603050405020304" pitchFamily="18" charset="0"/>
+            </a:endParaRPr>
+          </a:p>
+          <a:p>
+            <a:pPr marL="0" indent="0">
+              <a:buNone/>
+            </a:pPr>
+            <a:r>
+              <a:rPr lang="hu-HU" sz="2400" dirty="0" smtClean="0">
+                <a:latin typeface="Times New Roman" panose="02020603050405020304" pitchFamily="18" charset="0"/>
+                <a:cs typeface="Times New Roman" panose="02020603050405020304" pitchFamily="18" charset="0"/>
+              </a:rPr>
+              <a:t>Háttértárolók kezelése</a:t>
+            </a:r>
+          </a:p>
+          <a:p>
+            <a:pPr marL="0" indent="0">
+              <a:buNone/>
+            </a:pPr>
+            <a:endParaRPr lang="hu-HU" sz="2400" dirty="0">
+              <a:latin typeface="Times New Roman" panose="02020603050405020304" pitchFamily="18" charset="0"/>
+              <a:cs typeface="Times New Roman" panose="02020603050405020304" pitchFamily="18" charset="0"/>
+            </a:endParaRPr>
+          </a:p>
+        </p:txBody>
+      </p:sp>
+    </p:spTree>
+    <p:extLst>
+      <p:ext uri="{BB962C8B-B14F-4D97-AF65-F5344CB8AC3E}">
+        <p14:creationId xmlns:p14="http://schemas.microsoft.com/office/powerpoint/2010/main" val="2154744984"/>
+      </p:ext>
+    </p:extLst>
+  </p:cSld>
+  <p:clrMapOvr>
+    <a:masterClrMapping/>
+  </p:clrMapOvr>
+  <p:timing>
+    <p:tnLst>
+      <p:par>
+        <p:cTn id="1" dur="indefinite" restart="never" nodeType="tmRoot"/>
+      </p:par>
+    </p:tnLst>
+  </p:timing>
+</p:sld>
+</file>
+
+<file path=ppt/slides/slide4.xml><?xml version="1.0" encoding="utf-8"?>
 <p:sld xmlns:a="http://schemas.openxmlformats.org/drawingml/2006/main" xmlns:r="http://schemas.openxmlformats.org/officeDocument/2006/relationships" xmlns:p="http://schemas.openxmlformats.org/presentationml/2006/main">
   <p:cSld>
     <p:spTree>
@@ -4553,10 +5003,17 @@
   <p:clrMapOvr>
     <a:masterClrMapping/>
   </p:clrMapOvr>
+  <p:timing>
+    <p:tnLst>
+      <p:par>
+        <p:cTn id="1" dur="indefinite" restart="never" nodeType="tmRoot"/>
+      </p:par>
+    </p:tnLst>
+  </p:timing>
 </p:sld>
 </file>
 
-<file path=ppt/slides/slide4.xml><?xml version="1.0" encoding="utf-8"?>
+<file path=ppt/slides/slide5.xml><?xml version="1.0" encoding="utf-8"?>
 <p:sld xmlns:a="http://schemas.openxmlformats.org/drawingml/2006/main" xmlns:r="http://schemas.openxmlformats.org/officeDocument/2006/relationships" xmlns:p="http://schemas.openxmlformats.org/presentationml/2006/main">
   <p:cSld>
     <p:spTree>
@@ -4575,7 +5032,7 @@
       </p:grpSpPr>
       <p:pic>
         <p:nvPicPr>
-          <p:cNvPr id="6" name="Kép 5"/>
+          <p:cNvPr id="5" name="Kép 4"/>
           <p:cNvPicPr>
             <a:picLocks noChangeAspect="1"/>
           </p:cNvPicPr>
@@ -4589,8 +5046,8 @@
         </p:blipFill>
         <p:spPr>
           <a:xfrm>
-            <a:off x="1097278" y="1668953"/>
-            <a:ext cx="10380847" cy="137626"/>
+            <a:off x="903118" y="1521337"/>
+            <a:ext cx="10661359" cy="314961"/>
           </a:xfrm>
           <a:prstGeom prst="rect">
             <a:avLst/>
@@ -4609,13 +5066,13 @@
         </p:nvSpPr>
         <p:spPr>
           <a:xfrm>
-            <a:off x="585275" y="752398"/>
-            <a:ext cx="4414520" cy="813754"/>
+            <a:off x="460756" y="419100"/>
+            <a:ext cx="5050028" cy="715587"/>
           </a:xfrm>
         </p:spPr>
         <p:txBody>
           <a:bodyPr>
-            <a:normAutofit/>
+            <a:noAutofit/>
           </a:bodyPr>
           <a:lstStyle/>
           <a:p>
@@ -4624,9 +5081,16 @@
                 <a:latin typeface="Times New Roman" panose="02020603050405020304" pitchFamily="18" charset="0"/>
                 <a:cs typeface="Times New Roman" panose="02020603050405020304" pitchFamily="18" charset="0"/>
               </a:rPr>
-              <a:t>Kernel feladatai</a:t>
-            </a:r>
-            <a:endParaRPr lang="hu-HU" dirty="0">
+              <a:t>Monolitikus</a:t>
+            </a:r>
+            <a:r>
+              <a:rPr lang="hu-HU" sz="4400" dirty="0" smtClean="0">
+                <a:latin typeface="Times New Roman" panose="02020603050405020304" pitchFamily="18" charset="0"/>
+                <a:cs typeface="Times New Roman" panose="02020603050405020304" pitchFamily="18" charset="0"/>
+              </a:rPr>
+              <a:t> kernel</a:t>
+            </a:r>
+            <a:endParaRPr lang="hu-HU" sz="4300" dirty="0">
               <a:latin typeface="Times New Roman" panose="02020603050405020304" pitchFamily="18" charset="0"/>
               <a:cs typeface="Times New Roman" panose="02020603050405020304" pitchFamily="18" charset="0"/>
             </a:endParaRPr>
@@ -4645,73 +5109,40 @@
         </p:nvSpPr>
         <p:spPr>
           <a:xfrm>
-            <a:off x="585275" y="1909380"/>
-            <a:ext cx="3878441" cy="3757494"/>
+            <a:off x="819216" y="2222949"/>
+            <a:ext cx="4209984" cy="1881218"/>
           </a:xfrm>
         </p:spPr>
         <p:txBody>
           <a:bodyPr>
-            <a:normAutofit/>
+            <a:noAutofit/>
           </a:bodyPr>
           <a:lstStyle/>
           <a:p>
-            <a:pPr marL="0" indent="0">
-              <a:buNone/>
-            </a:pPr>
             <a:r>
               <a:rPr lang="hu-HU" sz="2400" dirty="0" smtClean="0">
                 <a:latin typeface="Times New Roman" panose="02020603050405020304" pitchFamily="18" charset="0"/>
                 <a:cs typeface="Times New Roman" panose="02020603050405020304" pitchFamily="18" charset="0"/>
               </a:rPr>
-              <a:t>Eszközök kezelése</a:t>
-            </a:r>
-          </a:p>
-          <a:p>
-            <a:pPr marL="0" indent="0">
-              <a:buNone/>
-            </a:pPr>
+              <a:t>operációsrendszer-architektúra</a:t>
+            </a:r>
+          </a:p>
+          <a:p>
             <a:endParaRPr lang="hu-HU" sz="2400" dirty="0" smtClean="0">
               <a:latin typeface="Times New Roman" panose="02020603050405020304" pitchFamily="18" charset="0"/>
               <a:cs typeface="Times New Roman" panose="02020603050405020304" pitchFamily="18" charset="0"/>
             </a:endParaRPr>
           </a:p>
           <a:p>
-            <a:pPr marL="0" indent="0">
-              <a:buNone/>
-            </a:pPr>
             <a:r>
               <a:rPr lang="hu-HU" sz="2400" dirty="0" smtClean="0">
                 <a:latin typeface="Times New Roman" panose="02020603050405020304" pitchFamily="18" charset="0"/>
                 <a:cs typeface="Times New Roman" panose="02020603050405020304" pitchFamily="18" charset="0"/>
               </a:rPr>
-              <a:t>Programok futásának kezelése</a:t>
-            </a:r>
-          </a:p>
-          <a:p>
-            <a:pPr marL="0" indent="0">
-              <a:buNone/>
-            </a:pPr>
-            <a:endParaRPr lang="hu-HU" sz="2400" dirty="0" smtClean="0">
-              <a:latin typeface="Times New Roman" panose="02020603050405020304" pitchFamily="18" charset="0"/>
-              <a:cs typeface="Times New Roman" panose="02020603050405020304" pitchFamily="18" charset="0"/>
-            </a:endParaRPr>
-          </a:p>
-          <a:p>
-            <a:pPr marL="0" indent="0">
-              <a:buNone/>
-            </a:pPr>
-            <a:r>
-              <a:rPr lang="hu-HU" sz="2400" dirty="0" smtClean="0">
-                <a:latin typeface="Times New Roman" panose="02020603050405020304" pitchFamily="18" charset="0"/>
-                <a:cs typeface="Times New Roman" panose="02020603050405020304" pitchFamily="18" charset="0"/>
-              </a:rPr>
-              <a:t>Háttértárolók kezelése</a:t>
-            </a:r>
-          </a:p>
-          <a:p>
-            <a:pPr marL="0" indent="0">
-              <a:buNone/>
-            </a:pPr>
+              <a:t>Eltérés a többi kernelhez képest</a:t>
+            </a:r>
+          </a:p>
+          <a:p>
             <a:endParaRPr lang="hu-HU" sz="2400" dirty="0">
               <a:latin typeface="Times New Roman" panose="02020603050405020304" pitchFamily="18" charset="0"/>
               <a:cs typeface="Times New Roman" panose="02020603050405020304" pitchFamily="18" charset="0"/>
@@ -4719,20 +5150,560 @@
           </a:p>
         </p:txBody>
       </p:sp>
+      <p:pic>
+        <p:nvPicPr>
+          <p:cNvPr id="1026" name="Picture 2" descr="https://upload.wikimedia.org/wikipedia/commons/thumb/e/ec/Kernel-microkernel.svg/220px-Kernel-microkernel.svg.png"/>
+          <p:cNvPicPr>
+            <a:picLocks noChangeAspect="1" noChangeArrowheads="1"/>
+          </p:cNvPicPr>
+          <p:nvPr/>
+        </p:nvPicPr>
+        <p:blipFill>
+          <a:blip r:embed="rId3">
+            <a:extLst>
+              <a:ext uri="{28A0092B-C50C-407E-A947-70E740481C1C}">
+                <a14:useLocalDpi xmlns:a14="http://schemas.microsoft.com/office/drawing/2010/main" val="0"/>
+              </a:ext>
+            </a:extLst>
+          </a:blip>
+          <a:srcRect/>
+          <a:stretch>
+            <a:fillRect/>
+          </a:stretch>
+        </p:blipFill>
+        <p:spPr bwMode="auto">
+          <a:xfrm>
+            <a:off x="5879804" y="1050507"/>
+            <a:ext cx="5387679" cy="4040762"/>
+          </a:xfrm>
+          <a:prstGeom prst="rect">
+            <a:avLst/>
+          </a:prstGeom>
+          <a:noFill/>
+          <a:extLst>
+            <a:ext uri="{909E8E84-426E-40DD-AFC4-6F175D3DCCD1}">
+              <a14:hiddenFill xmlns:a14="http://schemas.microsoft.com/office/drawing/2010/main">
+                <a:solidFill>
+                  <a:srgbClr val="FFFFFF"/>
+                </a:solidFill>
+              </a14:hiddenFill>
+            </a:ext>
+          </a:extLst>
+        </p:spPr>
+      </p:pic>
+      <p:sp>
+        <p:nvSpPr>
+          <p:cNvPr id="6" name="Szövegdoboz 5"/>
+          <p:cNvSpPr txBox="1"/>
+          <p:nvPr/>
+        </p:nvSpPr>
+        <p:spPr>
+          <a:xfrm>
+            <a:off x="7166344" y="5401340"/>
+            <a:ext cx="1468672" cy="215444"/>
+          </a:xfrm>
+          <a:prstGeom prst="rect">
+            <a:avLst/>
+          </a:prstGeom>
+          <a:noFill/>
+        </p:spPr>
+        <p:txBody>
+          <a:bodyPr wrap="none" rtlCol="0">
+            <a:spAutoFit/>
+          </a:bodyPr>
+          <a:lstStyle/>
+          <a:p>
+            <a:r>
+              <a:rPr lang="hu-HU" sz="800" dirty="0"/>
+              <a:t>https://tinyurl.com/2p9dd39w</a:t>
+            </a:r>
+          </a:p>
+        </p:txBody>
+      </p:sp>
     </p:spTree>
     <p:extLst>
       <p:ext uri="{BB962C8B-B14F-4D97-AF65-F5344CB8AC3E}">
-        <p14:creationId xmlns:p14="http://schemas.microsoft.com/office/powerpoint/2010/main" val="2154744984"/>
+        <p14:creationId xmlns:p14="http://schemas.microsoft.com/office/powerpoint/2010/main" val="3838305485"/>
       </p:ext>
     </p:extLst>
   </p:cSld>
   <p:clrMapOvr>
     <a:masterClrMapping/>
   </p:clrMapOvr>
+  <p:timing>
+    <p:tnLst>
+      <p:par>
+        <p:cTn id="1" dur="indefinite" restart="never" nodeType="tmRoot"/>
+      </p:par>
+    </p:tnLst>
+  </p:timing>
 </p:sld>
 </file>
 
-<file path=ppt/slides/slide5.xml><?xml version="1.0" encoding="utf-8"?>
+<file path=ppt/slides/slide6.xml><?xml version="1.0" encoding="utf-8"?>
+<p:sld xmlns:a="http://schemas.openxmlformats.org/drawingml/2006/main" xmlns:r="http://schemas.openxmlformats.org/officeDocument/2006/relationships" xmlns:p="http://schemas.openxmlformats.org/presentationml/2006/main">
+  <p:cSld>
+    <p:spTree>
+      <p:nvGrpSpPr>
+        <p:cNvPr id="1" name=""/>
+        <p:cNvGrpSpPr/>
+        <p:nvPr/>
+      </p:nvGrpSpPr>
+      <p:grpSpPr>
+        <a:xfrm>
+          <a:off x="0" y="0"/>
+          <a:ext cx="0" cy="0"/>
+          <a:chOff x="0" y="0"/>
+          <a:chExt cx="0" cy="0"/>
+        </a:xfrm>
+      </p:grpSpPr>
+      <p:sp>
+        <p:nvSpPr>
+          <p:cNvPr id="2" name="Cím 1"/>
+          <p:cNvSpPr>
+            <a:spLocks noGrp="1"/>
+          </p:cNvSpPr>
+          <p:nvPr>
+            <p:ph type="title"/>
+          </p:nvPr>
+        </p:nvSpPr>
+        <p:spPr>
+          <a:xfrm>
+            <a:off x="1097280" y="286603"/>
+            <a:ext cx="3910655" cy="1450757"/>
+          </a:xfrm>
+        </p:spPr>
+        <p:txBody>
+          <a:bodyPr>
+            <a:normAutofit/>
+          </a:bodyPr>
+          <a:lstStyle/>
+          <a:p>
+            <a:r>
+              <a:rPr lang="hu-HU" dirty="0" err="1" smtClean="0">
+                <a:latin typeface="Times New Roman" panose="02020603050405020304" pitchFamily="18" charset="0"/>
+                <a:ea typeface="Tahoma" panose="020B0604030504040204" pitchFamily="34" charset="0"/>
+                <a:cs typeface="Times New Roman" panose="02020603050405020304" pitchFamily="18" charset="0"/>
+              </a:rPr>
+              <a:t>Mikrokernel</a:t>
+            </a:r>
+            <a:r>
+              <a:rPr lang="hu-HU" dirty="0">
+                <a:latin typeface="Times New Roman" panose="02020603050405020304" pitchFamily="18" charset="0"/>
+                <a:ea typeface="Tahoma" panose="020B0604030504040204" pitchFamily="34" charset="0"/>
+                <a:cs typeface="Times New Roman" panose="02020603050405020304" pitchFamily="18" charset="0"/>
+              </a:rPr>
+              <a:t/>
+            </a:r>
+            <a:br>
+              <a:rPr lang="hu-HU" dirty="0">
+                <a:latin typeface="Times New Roman" panose="02020603050405020304" pitchFamily="18" charset="0"/>
+                <a:ea typeface="Tahoma" panose="020B0604030504040204" pitchFamily="34" charset="0"/>
+                <a:cs typeface="Times New Roman" panose="02020603050405020304" pitchFamily="18" charset="0"/>
+              </a:rPr>
+            </a:br>
+            <a:endParaRPr lang="hu-HU" dirty="0">
+              <a:latin typeface="Times New Roman" panose="02020603050405020304" pitchFamily="18" charset="0"/>
+              <a:ea typeface="Tahoma" panose="020B0604030504040204" pitchFamily="34" charset="0"/>
+              <a:cs typeface="Times New Roman" panose="02020603050405020304" pitchFamily="18" charset="0"/>
+            </a:endParaRPr>
+          </a:p>
+        </p:txBody>
+      </p:sp>
+      <p:sp>
+        <p:nvSpPr>
+          <p:cNvPr id="3" name="Tartalom helye 2"/>
+          <p:cNvSpPr>
+            <a:spLocks noGrp="1"/>
+          </p:cNvSpPr>
+          <p:nvPr>
+            <p:ph idx="1"/>
+          </p:nvPr>
+        </p:nvSpPr>
+        <p:spPr>
+          <a:xfrm>
+            <a:off x="761690" y="1895830"/>
+            <a:ext cx="4246245" cy="3107266"/>
+          </a:xfrm>
+        </p:spPr>
+        <p:txBody>
+          <a:bodyPr>
+            <a:normAutofit/>
+          </a:bodyPr>
+          <a:lstStyle/>
+          <a:p>
+            <a:r>
+              <a:rPr lang="hu-HU" sz="2400" dirty="0" smtClean="0">
+                <a:latin typeface="Times New Roman" panose="02020603050405020304" pitchFamily="18" charset="0"/>
+                <a:cs typeface="Times New Roman" panose="02020603050405020304" pitchFamily="18" charset="0"/>
+              </a:rPr>
+              <a:t>operációsrendszer-architektúra</a:t>
+            </a:r>
+          </a:p>
+          <a:p>
+            <a:endParaRPr lang="hu-HU" sz="2400" dirty="0" smtClean="0">
+              <a:latin typeface="Times New Roman" panose="02020603050405020304" pitchFamily="18" charset="0"/>
+              <a:cs typeface="Times New Roman" panose="02020603050405020304" pitchFamily="18" charset="0"/>
+            </a:endParaRPr>
+          </a:p>
+          <a:p>
+            <a:r>
+              <a:rPr lang="hu-HU" sz="2400" dirty="0" smtClean="0">
+                <a:latin typeface="Times New Roman" panose="02020603050405020304" pitchFamily="18" charset="0"/>
+                <a:cs typeface="Times New Roman" panose="02020603050405020304" pitchFamily="18" charset="0"/>
+              </a:rPr>
+              <a:t>nélkülözhetetlen</a:t>
+            </a:r>
+            <a:endParaRPr lang="hu-HU" sz="2400" dirty="0">
+              <a:latin typeface="Times New Roman" panose="02020603050405020304" pitchFamily="18" charset="0"/>
+              <a:cs typeface="Times New Roman" panose="02020603050405020304" pitchFamily="18" charset="0"/>
+            </a:endParaRPr>
+          </a:p>
+          <a:p>
+            <a:endParaRPr lang="hu-HU" sz="2400" dirty="0">
+              <a:latin typeface="Times New Roman" panose="02020603050405020304" pitchFamily="18" charset="0"/>
+              <a:cs typeface="Times New Roman" panose="02020603050405020304" pitchFamily="18" charset="0"/>
+            </a:endParaRPr>
+          </a:p>
+          <a:p>
+            <a:endParaRPr lang="hu-HU" sz="2400" dirty="0"/>
+          </a:p>
+        </p:txBody>
+      </p:sp>
+      <p:pic>
+        <p:nvPicPr>
+          <p:cNvPr id="4" name="Kép 3"/>
+          <p:cNvPicPr>
+            <a:picLocks noChangeAspect="1"/>
+          </p:cNvPicPr>
+          <p:nvPr/>
+        </p:nvPicPr>
+        <p:blipFill>
+          <a:blip r:embed="rId2"/>
+          <a:stretch>
+            <a:fillRect/>
+          </a:stretch>
+        </p:blipFill>
+        <p:spPr>
+          <a:xfrm>
+            <a:off x="1097280" y="1578889"/>
+            <a:ext cx="10164763" cy="316941"/>
+          </a:xfrm>
+          <a:prstGeom prst="rect">
+            <a:avLst/>
+          </a:prstGeom>
+        </p:spPr>
+      </p:pic>
+      <p:pic>
+        <p:nvPicPr>
+          <p:cNvPr id="6" name="Picture 2" descr="https://upload.wikimedia.org/wikipedia/commons/thumb/e/ec/Kernel-microkernel.svg/220px-Kernel-microkernel.svg.png"/>
+          <p:cNvPicPr>
+            <a:picLocks noChangeAspect="1" noChangeArrowheads="1"/>
+          </p:cNvPicPr>
+          <p:nvPr/>
+        </p:nvPicPr>
+        <p:blipFill>
+          <a:blip r:embed="rId3">
+            <a:extLst>
+              <a:ext uri="{28A0092B-C50C-407E-A947-70E740481C1C}">
+                <a14:useLocalDpi xmlns:a14="http://schemas.microsoft.com/office/drawing/2010/main" val="0"/>
+              </a:ext>
+            </a:extLst>
+          </a:blip>
+          <a:srcRect/>
+          <a:stretch>
+            <a:fillRect/>
+          </a:stretch>
+        </p:blipFill>
+        <p:spPr bwMode="auto">
+          <a:xfrm>
+            <a:off x="5768001" y="1011981"/>
+            <a:ext cx="5387679" cy="4040762"/>
+          </a:xfrm>
+          <a:prstGeom prst="rect">
+            <a:avLst/>
+          </a:prstGeom>
+          <a:noFill/>
+          <a:extLst>
+            <a:ext uri="{909E8E84-426E-40DD-AFC4-6F175D3DCCD1}">
+              <a14:hiddenFill xmlns:a14="http://schemas.microsoft.com/office/drawing/2010/main">
+                <a:solidFill>
+                  <a:srgbClr val="FFFFFF"/>
+                </a:solidFill>
+              </a14:hiddenFill>
+            </a:ext>
+          </a:extLst>
+        </p:spPr>
+      </p:pic>
+      <p:sp>
+        <p:nvSpPr>
+          <p:cNvPr id="5" name="Szövegdoboz 4"/>
+          <p:cNvSpPr txBox="1"/>
+          <p:nvPr/>
+        </p:nvSpPr>
+        <p:spPr>
+          <a:xfrm>
+            <a:off x="6741042" y="5688419"/>
+            <a:ext cx="1468672" cy="215444"/>
+          </a:xfrm>
+          <a:prstGeom prst="rect">
+            <a:avLst/>
+          </a:prstGeom>
+          <a:noFill/>
+        </p:spPr>
+        <p:txBody>
+          <a:bodyPr wrap="none" rtlCol="0">
+            <a:spAutoFit/>
+          </a:bodyPr>
+          <a:lstStyle/>
+          <a:p>
+            <a:r>
+              <a:rPr lang="hu-HU" sz="800" dirty="0"/>
+              <a:t>https://tinyurl.com/2p9dd39w</a:t>
+            </a:r>
+          </a:p>
+        </p:txBody>
+      </p:sp>
+    </p:spTree>
+    <p:extLst>
+      <p:ext uri="{BB962C8B-B14F-4D97-AF65-F5344CB8AC3E}">
+        <p14:creationId xmlns:p14="http://schemas.microsoft.com/office/powerpoint/2010/main" val="300749020"/>
+      </p:ext>
+    </p:extLst>
+  </p:cSld>
+  <p:clrMapOvr>
+    <a:masterClrMapping/>
+  </p:clrMapOvr>
+  <p:timing>
+    <p:tnLst>
+      <p:par>
+        <p:cTn id="1" dur="indefinite" restart="never" nodeType="tmRoot"/>
+      </p:par>
+    </p:tnLst>
+  </p:timing>
+</p:sld>
+</file>
+
+<file path=ppt/slides/slide7.xml><?xml version="1.0" encoding="utf-8"?>
+<p:sld xmlns:a="http://schemas.openxmlformats.org/drawingml/2006/main" xmlns:r="http://schemas.openxmlformats.org/officeDocument/2006/relationships" xmlns:p="http://schemas.openxmlformats.org/presentationml/2006/main">
+  <p:cSld>
+    <p:spTree>
+      <p:nvGrpSpPr>
+        <p:cNvPr id="1" name=""/>
+        <p:cNvGrpSpPr/>
+        <p:nvPr/>
+      </p:nvGrpSpPr>
+      <p:grpSpPr>
+        <a:xfrm>
+          <a:off x="0" y="0"/>
+          <a:ext cx="0" cy="0"/>
+          <a:chOff x="0" y="0"/>
+          <a:chExt cx="0" cy="0"/>
+        </a:xfrm>
+      </p:grpSpPr>
+      <p:sp>
+        <p:nvSpPr>
+          <p:cNvPr id="2" name="Cím 1"/>
+          <p:cNvSpPr>
+            <a:spLocks noGrp="1"/>
+          </p:cNvSpPr>
+          <p:nvPr>
+            <p:ph type="title"/>
+          </p:nvPr>
+        </p:nvSpPr>
+        <p:spPr>
+          <a:xfrm>
+            <a:off x="276727" y="541421"/>
+            <a:ext cx="4803006" cy="907181"/>
+          </a:xfrm>
+        </p:spPr>
+        <p:txBody>
+          <a:bodyPr>
+            <a:normAutofit/>
+          </a:bodyPr>
+          <a:lstStyle/>
+          <a:p>
+            <a:pPr algn="ctr"/>
+            <a:r>
+              <a:rPr lang="hu-HU" dirty="0">
+                <a:latin typeface="Times New Roman" panose="02020603050405020304" pitchFamily="18" charset="0"/>
+                <a:cs typeface="Times New Roman" panose="02020603050405020304" pitchFamily="18" charset="0"/>
+              </a:rPr>
+              <a:t>H</a:t>
+            </a:r>
+            <a:r>
+              <a:rPr lang="hu-HU" dirty="0" smtClean="0">
+                <a:latin typeface="Times New Roman" panose="02020603050405020304" pitchFamily="18" charset="0"/>
+                <a:cs typeface="Times New Roman" panose="02020603050405020304" pitchFamily="18" charset="0"/>
+              </a:rPr>
+              <a:t>ibrid kernel</a:t>
+            </a:r>
+            <a:endParaRPr lang="hu-HU" dirty="0">
+              <a:latin typeface="Times New Roman" panose="02020603050405020304" pitchFamily="18" charset="0"/>
+              <a:cs typeface="Times New Roman" panose="02020603050405020304" pitchFamily="18" charset="0"/>
+            </a:endParaRPr>
+          </a:p>
+        </p:txBody>
+      </p:sp>
+      <p:sp>
+        <p:nvSpPr>
+          <p:cNvPr id="3" name="Tartalom helye 2"/>
+          <p:cNvSpPr>
+            <a:spLocks noGrp="1"/>
+          </p:cNvSpPr>
+          <p:nvPr>
+            <p:ph idx="1"/>
+          </p:nvPr>
+        </p:nvSpPr>
+        <p:spPr>
+          <a:xfrm>
+            <a:off x="544388" y="2018353"/>
+            <a:ext cx="4187102" cy="1840352"/>
+          </a:xfrm>
+        </p:spPr>
+        <p:txBody>
+          <a:bodyPr>
+            <a:normAutofit/>
+          </a:bodyPr>
+          <a:lstStyle/>
+          <a:p>
+            <a:r>
+              <a:rPr lang="hu-HU" sz="2400" dirty="0" smtClean="0">
+                <a:latin typeface="Times New Roman" panose="02020603050405020304" pitchFamily="18" charset="0"/>
+                <a:cs typeface="Times New Roman" panose="02020603050405020304" pitchFamily="18" charset="0"/>
+              </a:rPr>
+              <a:t>operációsrendszer-architektúra</a:t>
+            </a:r>
+          </a:p>
+          <a:p>
+            <a:endParaRPr lang="hu-HU" sz="2400" dirty="0">
+              <a:latin typeface="Times New Roman" panose="02020603050405020304" pitchFamily="18" charset="0"/>
+              <a:cs typeface="Times New Roman" panose="02020603050405020304" pitchFamily="18" charset="0"/>
+            </a:endParaRPr>
+          </a:p>
+          <a:p>
+            <a:endParaRPr lang="hu-HU" sz="2400" dirty="0">
+              <a:latin typeface="Times New Roman" panose="02020603050405020304" pitchFamily="18" charset="0"/>
+              <a:cs typeface="Times New Roman" panose="02020603050405020304" pitchFamily="18" charset="0"/>
+            </a:endParaRPr>
+          </a:p>
+        </p:txBody>
+      </p:sp>
+      <p:pic>
+        <p:nvPicPr>
+          <p:cNvPr id="4" name="Kép 3"/>
+          <p:cNvPicPr>
+            <a:picLocks noChangeAspect="1"/>
+          </p:cNvPicPr>
+          <p:nvPr/>
+        </p:nvPicPr>
+        <p:blipFill>
+          <a:blip r:embed="rId2"/>
+          <a:stretch>
+            <a:fillRect/>
+          </a:stretch>
+        </p:blipFill>
+        <p:spPr>
+          <a:xfrm>
+            <a:off x="1097280" y="1530773"/>
+            <a:ext cx="10101263" cy="314961"/>
+          </a:xfrm>
+          <a:prstGeom prst="rect">
+            <a:avLst/>
+          </a:prstGeom>
+        </p:spPr>
+      </p:pic>
+      <p:pic>
+        <p:nvPicPr>
+          <p:cNvPr id="9" name="Picture 2" descr="https://upload.wikimedia.org/wikipedia/commons/thumb/e/ec/Kernel-microkernel.svg/220px-Kernel-microkernel.svg.png"/>
+          <p:cNvPicPr>
+            <a:picLocks noChangeAspect="1" noChangeArrowheads="1"/>
+          </p:cNvPicPr>
+          <p:nvPr/>
+        </p:nvPicPr>
+        <p:blipFill>
+          <a:blip r:embed="rId3">
+            <a:extLst>
+              <a:ext uri="{28A0092B-C50C-407E-A947-70E740481C1C}">
+                <a14:useLocalDpi xmlns:a14="http://schemas.microsoft.com/office/drawing/2010/main" val="0"/>
+              </a:ext>
+            </a:extLst>
+          </a:blip>
+          <a:srcRect/>
+          <a:stretch>
+            <a:fillRect/>
+          </a:stretch>
+        </p:blipFill>
+        <p:spPr bwMode="auto">
+          <a:xfrm>
+            <a:off x="5879804" y="1050507"/>
+            <a:ext cx="5387679" cy="4040762"/>
+          </a:xfrm>
+          <a:prstGeom prst="rect">
+            <a:avLst/>
+          </a:prstGeom>
+          <a:noFill/>
+          <a:extLst>
+            <a:ext uri="{909E8E84-426E-40DD-AFC4-6F175D3DCCD1}">
+              <a14:hiddenFill xmlns:a14="http://schemas.microsoft.com/office/drawing/2010/main">
+                <a:solidFill>
+                  <a:srgbClr val="FFFFFF"/>
+                </a:solidFill>
+              </a14:hiddenFill>
+            </a:ext>
+          </a:extLst>
+        </p:spPr>
+      </p:pic>
+      <p:sp>
+        <p:nvSpPr>
+          <p:cNvPr id="7" name="Szövegdoboz 6"/>
+          <p:cNvSpPr txBox="1"/>
+          <p:nvPr/>
+        </p:nvSpPr>
+        <p:spPr>
+          <a:xfrm>
+            <a:off x="7581014" y="5571535"/>
+            <a:ext cx="1468672" cy="215444"/>
+          </a:xfrm>
+          <a:prstGeom prst="rect">
+            <a:avLst/>
+          </a:prstGeom>
+          <a:noFill/>
+        </p:spPr>
+        <p:txBody>
+          <a:bodyPr wrap="none" rtlCol="0">
+            <a:spAutoFit/>
+          </a:bodyPr>
+          <a:lstStyle/>
+          <a:p>
+            <a:r>
+              <a:rPr lang="hu-HU" sz="800" dirty="0"/>
+              <a:t>https://tinyurl.com/2p9dd39w</a:t>
+            </a:r>
+          </a:p>
+        </p:txBody>
+      </p:sp>
+    </p:spTree>
+    <p:extLst>
+      <p:ext uri="{BB962C8B-B14F-4D97-AF65-F5344CB8AC3E}">
+        <p14:creationId xmlns:p14="http://schemas.microsoft.com/office/powerpoint/2010/main" val="1502694442"/>
+      </p:ext>
+    </p:extLst>
+  </p:cSld>
+  <p:clrMapOvr>
+    <a:masterClrMapping/>
+  </p:clrMapOvr>
+  <p:timing>
+    <p:tnLst>
+      <p:par>
+        <p:cTn id="1" dur="indefinite" restart="never" nodeType="tmRoot"/>
+      </p:par>
+    </p:tnLst>
+  </p:timing>
+</p:sld>
+</file>
+
+<file path=ppt/slides/slide8.xml><?xml version="1.0" encoding="utf-8"?>
 <p:sld xmlns:a="http://schemas.openxmlformats.org/drawingml/2006/main" xmlns:r="http://schemas.openxmlformats.org/officeDocument/2006/relationships" xmlns:p="http://schemas.openxmlformats.org/presentationml/2006/main">
   <p:cSld>
     <p:spTree>
@@ -4785,7 +5756,7 @@
         </p:nvSpPr>
         <p:spPr>
           <a:xfrm>
-            <a:off x="603985" y="664411"/>
+            <a:off x="2081911" y="436139"/>
             <a:ext cx="6626994" cy="672095"/>
           </a:xfrm>
         </p:spPr>
@@ -4821,7 +5792,7 @@
         </p:nvSpPr>
         <p:spPr>
           <a:xfrm>
-            <a:off x="261650" y="1637295"/>
+            <a:off x="3462050" y="1328951"/>
             <a:ext cx="5946646" cy="4583031"/>
           </a:xfrm>
         </p:spPr>
@@ -4993,459 +5964,13 @@
   <p:clrMapOvr>
     <a:masterClrMapping/>
   </p:clrMapOvr>
-</p:sld>
-</file>
-
-<file path=ppt/slides/slide6.xml><?xml version="1.0" encoding="utf-8"?>
-<p:sld xmlns:a="http://schemas.openxmlformats.org/drawingml/2006/main" xmlns:r="http://schemas.openxmlformats.org/officeDocument/2006/relationships" xmlns:p="http://schemas.openxmlformats.org/presentationml/2006/main">
-  <p:cSld>
-    <p:spTree>
-      <p:nvGrpSpPr>
-        <p:cNvPr id="1" name=""/>
-        <p:cNvGrpSpPr/>
-        <p:nvPr/>
-      </p:nvGrpSpPr>
-      <p:grpSpPr>
-        <a:xfrm>
-          <a:off x="0" y="0"/>
-          <a:ext cx="0" cy="0"/>
-          <a:chOff x="0" y="0"/>
-          <a:chExt cx="0" cy="0"/>
-        </a:xfrm>
-      </p:grpSpPr>
-      <p:sp>
-        <p:nvSpPr>
-          <p:cNvPr id="2" name="Cím 1"/>
-          <p:cNvSpPr>
-            <a:spLocks noGrp="1"/>
-          </p:cNvSpPr>
-          <p:nvPr>
-            <p:ph type="title"/>
-          </p:nvPr>
-        </p:nvSpPr>
-        <p:spPr>
-          <a:xfrm>
-            <a:off x="2598821" y="186538"/>
-            <a:ext cx="6749716" cy="1765718"/>
-          </a:xfrm>
-        </p:spPr>
-        <p:txBody>
-          <a:bodyPr>
-            <a:normAutofit fontScale="90000"/>
-          </a:bodyPr>
-          <a:lstStyle/>
-          <a:p>
-            <a:r>
-              <a:rPr lang="hu-HU" dirty="0">
-                <a:latin typeface="Times New Roman" panose="02020603050405020304" pitchFamily="18" charset="0"/>
-                <a:cs typeface="Times New Roman" panose="02020603050405020304" pitchFamily="18" charset="0"/>
-              </a:rPr>
-              <a:t>Operációs rendszer változatok</a:t>
-            </a:r>
-            <a:br>
-              <a:rPr lang="hu-HU" dirty="0">
-                <a:latin typeface="Times New Roman" panose="02020603050405020304" pitchFamily="18" charset="0"/>
-                <a:cs typeface="Times New Roman" panose="02020603050405020304" pitchFamily="18" charset="0"/>
-              </a:rPr>
-            </a:br>
-            <a:endParaRPr lang="hu-HU" sz="4300" dirty="0">
-              <a:latin typeface="Times New Roman" panose="02020603050405020304" pitchFamily="18" charset="0"/>
-              <a:cs typeface="Times New Roman" panose="02020603050405020304" pitchFamily="18" charset="0"/>
-            </a:endParaRPr>
-          </a:p>
-        </p:txBody>
-      </p:sp>
-      <p:sp>
-        <p:nvSpPr>
-          <p:cNvPr id="3" name="Tartalom helye 2"/>
-          <p:cNvSpPr>
-            <a:spLocks noGrp="1"/>
-          </p:cNvSpPr>
-          <p:nvPr>
-            <p:ph idx="1"/>
-          </p:nvPr>
-        </p:nvSpPr>
-        <p:spPr>
-          <a:xfrm>
-            <a:off x="854242" y="1867035"/>
-            <a:ext cx="2995863" cy="1850723"/>
-          </a:xfrm>
-        </p:spPr>
-        <p:txBody>
-          <a:bodyPr>
-            <a:normAutofit/>
-          </a:bodyPr>
-          <a:lstStyle/>
-          <a:p>
-            <a:r>
-              <a:rPr lang="hu-HU" sz="2400" dirty="0">
-                <a:latin typeface="Times New Roman" panose="02020603050405020304" pitchFamily="18" charset="0"/>
-                <a:cs typeface="Times New Roman" panose="02020603050405020304" pitchFamily="18" charset="0"/>
-              </a:rPr>
-              <a:t>Microsoft Windows</a:t>
-            </a:r>
-          </a:p>
-          <a:p>
-            <a:r>
-              <a:rPr lang="hu-HU" sz="2400" dirty="0">
-                <a:latin typeface="Times New Roman" panose="02020603050405020304" pitchFamily="18" charset="0"/>
-                <a:cs typeface="Times New Roman" panose="02020603050405020304" pitchFamily="18" charset="0"/>
-              </a:rPr>
-              <a:t>Linux</a:t>
-            </a:r>
-          </a:p>
-          <a:p>
-            <a:r>
-              <a:rPr lang="hu-HU" sz="2400" dirty="0">
-                <a:latin typeface="Times New Roman" panose="02020603050405020304" pitchFamily="18" charset="0"/>
-                <a:cs typeface="Times New Roman" panose="02020603050405020304" pitchFamily="18" charset="0"/>
-              </a:rPr>
-              <a:t>Mac OS </a:t>
-            </a:r>
-            <a:r>
-              <a:rPr lang="hu-HU" sz="2400" dirty="0" smtClean="0">
-                <a:latin typeface="Times New Roman" panose="02020603050405020304" pitchFamily="18" charset="0"/>
-                <a:cs typeface="Times New Roman" panose="02020603050405020304" pitchFamily="18" charset="0"/>
-              </a:rPr>
-              <a:t>X</a:t>
-            </a:r>
-            <a:endParaRPr lang="hu-HU" sz="2400" dirty="0">
-              <a:latin typeface="Times New Roman" panose="02020603050405020304" pitchFamily="18" charset="0"/>
-              <a:cs typeface="Times New Roman" panose="02020603050405020304" pitchFamily="18" charset="0"/>
-            </a:endParaRPr>
-          </a:p>
-        </p:txBody>
-      </p:sp>
-      <p:pic>
-        <p:nvPicPr>
-          <p:cNvPr id="4" name="Kép 3"/>
-          <p:cNvPicPr>
-            <a:picLocks noChangeAspect="1"/>
-          </p:cNvPicPr>
-          <p:nvPr/>
-        </p:nvPicPr>
-        <p:blipFill>
-          <a:blip r:embed="rId2"/>
-          <a:stretch>
-            <a:fillRect/>
-          </a:stretch>
-        </p:blipFill>
-        <p:spPr>
-          <a:xfrm>
-            <a:off x="1073217" y="1552075"/>
-            <a:ext cx="10513193" cy="314961"/>
-          </a:xfrm>
-          <a:prstGeom prst="rect">
-            <a:avLst/>
-          </a:prstGeom>
-        </p:spPr>
-      </p:pic>
-      <p:sp>
-        <p:nvSpPr>
-          <p:cNvPr id="6" name="Szövegdoboz 5"/>
-          <p:cNvSpPr txBox="1"/>
-          <p:nvPr/>
-        </p:nvSpPr>
-        <p:spPr>
-          <a:xfrm>
-            <a:off x="7146758" y="1905270"/>
-            <a:ext cx="3705726" cy="1569660"/>
-          </a:xfrm>
-          <a:prstGeom prst="rect">
-            <a:avLst/>
-          </a:prstGeom>
-          <a:noFill/>
-        </p:spPr>
-        <p:txBody>
-          <a:bodyPr wrap="square" rtlCol="0">
-            <a:spAutoFit/>
-          </a:bodyPr>
-          <a:lstStyle/>
-          <a:p>
-            <a:r>
-              <a:rPr lang="hu-HU" sz="2400" dirty="0" err="1">
-                <a:latin typeface="Times New Roman" panose="02020603050405020304" pitchFamily="18" charset="0"/>
-                <a:cs typeface="Times New Roman" panose="02020603050405020304" pitchFamily="18" charset="0"/>
-              </a:rPr>
-              <a:t>Android</a:t>
-            </a:r>
-            <a:endParaRPr lang="hu-HU" sz="2400" dirty="0">
-              <a:latin typeface="Times New Roman" panose="02020603050405020304" pitchFamily="18" charset="0"/>
-              <a:cs typeface="Times New Roman" panose="02020603050405020304" pitchFamily="18" charset="0"/>
-            </a:endParaRPr>
-          </a:p>
-          <a:p>
-            <a:r>
-              <a:rPr lang="hu-HU" sz="2400" dirty="0">
-                <a:latin typeface="Times New Roman" panose="02020603050405020304" pitchFamily="18" charset="0"/>
-                <a:cs typeface="Times New Roman" panose="02020603050405020304" pitchFamily="18" charset="0"/>
-              </a:rPr>
-              <a:t>IOS</a:t>
-            </a:r>
-          </a:p>
-          <a:p>
-            <a:r>
-              <a:rPr lang="hu-HU" sz="2400" dirty="0">
-                <a:latin typeface="Times New Roman" panose="02020603050405020304" pitchFamily="18" charset="0"/>
-                <a:cs typeface="Times New Roman" panose="02020603050405020304" pitchFamily="18" charset="0"/>
-              </a:rPr>
-              <a:t>Windows </a:t>
-            </a:r>
-            <a:r>
-              <a:rPr lang="hu-HU" sz="2400" dirty="0" err="1">
-                <a:latin typeface="Times New Roman" panose="02020603050405020304" pitchFamily="18" charset="0"/>
-                <a:cs typeface="Times New Roman" panose="02020603050405020304" pitchFamily="18" charset="0"/>
-              </a:rPr>
-              <a:t>Phone</a:t>
-            </a:r>
-            <a:endParaRPr lang="hu-HU" sz="2400" dirty="0">
-              <a:latin typeface="Times New Roman" panose="02020603050405020304" pitchFamily="18" charset="0"/>
-              <a:cs typeface="Times New Roman" panose="02020603050405020304" pitchFamily="18" charset="0"/>
-            </a:endParaRPr>
-          </a:p>
-          <a:p>
-            <a:endParaRPr lang="hu-HU" sz="2400" dirty="0">
-              <a:latin typeface="Times New Roman" panose="02020603050405020304" pitchFamily="18" charset="0"/>
-              <a:cs typeface="Times New Roman" panose="02020603050405020304" pitchFamily="18" charset="0"/>
-            </a:endParaRPr>
-          </a:p>
-        </p:txBody>
-      </p:sp>
-    </p:spTree>
-    <p:extLst>
-      <p:ext uri="{BB962C8B-B14F-4D97-AF65-F5344CB8AC3E}">
-        <p14:creationId xmlns:p14="http://schemas.microsoft.com/office/powerpoint/2010/main" val="1350070956"/>
-      </p:ext>
-    </p:extLst>
-  </p:cSld>
-  <p:clrMapOvr>
-    <a:masterClrMapping/>
-  </p:clrMapOvr>
-</p:sld>
-</file>
-
-<file path=ppt/slides/slide7.xml><?xml version="1.0" encoding="utf-8"?>
-<p:sld xmlns:a="http://schemas.openxmlformats.org/drawingml/2006/main" xmlns:r="http://schemas.openxmlformats.org/officeDocument/2006/relationships" xmlns:p="http://schemas.openxmlformats.org/presentationml/2006/main">
-  <p:cSld>
-    <p:spTree>
-      <p:nvGrpSpPr>
-        <p:cNvPr id="1" name=""/>
-        <p:cNvGrpSpPr/>
-        <p:nvPr/>
-      </p:nvGrpSpPr>
-      <p:grpSpPr>
-        <a:xfrm>
-          <a:off x="0" y="0"/>
-          <a:ext cx="0" cy="0"/>
-          <a:chOff x="0" y="0"/>
-          <a:chExt cx="0" cy="0"/>
-        </a:xfrm>
-      </p:grpSpPr>
-      <p:pic>
-        <p:nvPicPr>
-          <p:cNvPr id="5" name="Kép 4"/>
-          <p:cNvPicPr>
-            <a:picLocks noChangeAspect="1"/>
-          </p:cNvPicPr>
-          <p:nvPr/>
-        </p:nvPicPr>
-        <p:blipFill>
-          <a:blip r:embed="rId2"/>
-          <a:stretch>
-            <a:fillRect/>
-          </a:stretch>
-        </p:blipFill>
-        <p:spPr>
-          <a:xfrm>
-            <a:off x="1033336" y="1521337"/>
-            <a:ext cx="10661359" cy="314961"/>
-          </a:xfrm>
-          <a:prstGeom prst="rect">
-            <a:avLst/>
-          </a:prstGeom>
-        </p:spPr>
-      </p:pic>
-      <p:sp>
-        <p:nvSpPr>
-          <p:cNvPr id="2" name="Cím 1"/>
-          <p:cNvSpPr>
-            <a:spLocks noGrp="1"/>
-          </p:cNvSpPr>
-          <p:nvPr>
-            <p:ph type="title"/>
-          </p:nvPr>
-        </p:nvSpPr>
-        <p:spPr>
-          <a:xfrm>
-            <a:off x="460756" y="419100"/>
-            <a:ext cx="5050028" cy="715587"/>
-          </a:xfrm>
-        </p:spPr>
-        <p:txBody>
-          <a:bodyPr>
-            <a:noAutofit/>
-          </a:bodyPr>
-          <a:lstStyle/>
-          <a:p>
-            <a:endParaRPr lang="hu-HU" sz="4300" dirty="0">
-              <a:latin typeface="Times New Roman" panose="02020603050405020304" pitchFamily="18" charset="0"/>
-              <a:cs typeface="Times New Roman" panose="02020603050405020304" pitchFamily="18" charset="0"/>
-            </a:endParaRPr>
-          </a:p>
-        </p:txBody>
-      </p:sp>
-      <p:sp>
-        <p:nvSpPr>
-          <p:cNvPr id="3" name="Tartalom helye 2"/>
-          <p:cNvSpPr>
-            <a:spLocks noGrp="1"/>
-          </p:cNvSpPr>
-          <p:nvPr>
-            <p:ph idx="1"/>
-          </p:nvPr>
-        </p:nvSpPr>
-        <p:spPr>
-          <a:xfrm>
-            <a:off x="819216" y="2222948"/>
-            <a:ext cx="4161857" cy="3529932"/>
-          </a:xfrm>
-        </p:spPr>
-        <p:txBody>
-          <a:bodyPr>
-            <a:normAutofit/>
-          </a:bodyPr>
-          <a:lstStyle/>
-          <a:p>
-            <a:endParaRPr lang="hu-HU" sz="2400" dirty="0">
-              <a:latin typeface="Times New Roman" panose="02020603050405020304" pitchFamily="18" charset="0"/>
-              <a:cs typeface="Times New Roman" panose="02020603050405020304" pitchFamily="18" charset="0"/>
-            </a:endParaRPr>
-          </a:p>
-        </p:txBody>
-      </p:sp>
-    </p:spTree>
-    <p:extLst>
-      <p:ext uri="{BB962C8B-B14F-4D97-AF65-F5344CB8AC3E}">
-        <p14:creationId xmlns:p14="http://schemas.microsoft.com/office/powerpoint/2010/main" val="3838305485"/>
-      </p:ext>
-    </p:extLst>
-  </p:cSld>
-  <p:clrMapOvr>
-    <a:masterClrMapping/>
-  </p:clrMapOvr>
-</p:sld>
-</file>
-
-<file path=ppt/slides/slide8.xml><?xml version="1.0" encoding="utf-8"?>
-<p:sld xmlns:a="http://schemas.openxmlformats.org/drawingml/2006/main" xmlns:r="http://schemas.openxmlformats.org/officeDocument/2006/relationships" xmlns:p="http://schemas.openxmlformats.org/presentationml/2006/main">
-  <p:cSld>
-    <p:spTree>
-      <p:nvGrpSpPr>
-        <p:cNvPr id="1" name=""/>
-        <p:cNvGrpSpPr/>
-        <p:nvPr/>
-      </p:nvGrpSpPr>
-      <p:grpSpPr>
-        <a:xfrm>
-          <a:off x="0" y="0"/>
-          <a:ext cx="0" cy="0"/>
-          <a:chOff x="0" y="0"/>
-          <a:chExt cx="0" cy="0"/>
-        </a:xfrm>
-      </p:grpSpPr>
-      <p:sp>
-        <p:nvSpPr>
-          <p:cNvPr id="2" name="Cím 1"/>
-          <p:cNvSpPr>
-            <a:spLocks noGrp="1"/>
-          </p:cNvSpPr>
-          <p:nvPr>
-            <p:ph type="title"/>
-          </p:nvPr>
-        </p:nvSpPr>
-        <p:spPr>
-          <a:xfrm>
-            <a:off x="276727" y="541421"/>
-            <a:ext cx="4803006" cy="907181"/>
-          </a:xfrm>
-        </p:spPr>
-        <p:txBody>
-          <a:bodyPr>
-            <a:normAutofit/>
-          </a:bodyPr>
-          <a:lstStyle/>
-          <a:p>
-            <a:pPr algn="ctr"/>
-            <a:endParaRPr lang="hu-HU" sz="4300" dirty="0">
-              <a:latin typeface="Times New Roman" panose="02020603050405020304" pitchFamily="18" charset="0"/>
-              <a:cs typeface="Times New Roman" panose="02020603050405020304" pitchFamily="18" charset="0"/>
-            </a:endParaRPr>
-          </a:p>
-        </p:txBody>
-      </p:sp>
-      <p:sp>
-        <p:nvSpPr>
-          <p:cNvPr id="3" name="Tartalom helye 2"/>
-          <p:cNvSpPr>
-            <a:spLocks noGrp="1"/>
-          </p:cNvSpPr>
-          <p:nvPr>
-            <p:ph idx="1"/>
-          </p:nvPr>
-        </p:nvSpPr>
-        <p:spPr>
-          <a:xfrm>
-            <a:off x="1097280" y="1845734"/>
-            <a:ext cx="3366436" cy="3688792"/>
-          </a:xfrm>
-        </p:spPr>
-        <p:txBody>
-          <a:bodyPr>
-            <a:normAutofit/>
-          </a:bodyPr>
-          <a:lstStyle/>
-          <a:p>
-            <a:endParaRPr lang="hu-HU" sz="2400" dirty="0">
-              <a:latin typeface="Times New Roman" panose="02020603050405020304" pitchFamily="18" charset="0"/>
-              <a:cs typeface="Times New Roman" panose="02020603050405020304" pitchFamily="18" charset="0"/>
-            </a:endParaRPr>
-          </a:p>
-        </p:txBody>
-      </p:sp>
-      <p:pic>
-        <p:nvPicPr>
-          <p:cNvPr id="4" name="Kép 3"/>
-          <p:cNvPicPr>
-            <a:picLocks noChangeAspect="1"/>
-          </p:cNvPicPr>
-          <p:nvPr/>
-        </p:nvPicPr>
-        <p:blipFill>
-          <a:blip r:embed="rId2"/>
-          <a:stretch>
-            <a:fillRect/>
-          </a:stretch>
-        </p:blipFill>
-        <p:spPr>
-          <a:xfrm>
-            <a:off x="1097280" y="1530773"/>
-            <a:ext cx="10101263" cy="314961"/>
-          </a:xfrm>
-          <a:prstGeom prst="rect">
-            <a:avLst/>
-          </a:prstGeom>
-        </p:spPr>
-      </p:pic>
-    </p:spTree>
-    <p:extLst>
-      <p:ext uri="{BB962C8B-B14F-4D97-AF65-F5344CB8AC3E}">
-        <p14:creationId xmlns:p14="http://schemas.microsoft.com/office/powerpoint/2010/main" val="1502694442"/>
-      </p:ext>
-    </p:extLst>
-  </p:cSld>
-  <p:clrMapOvr>
-    <a:masterClrMapping/>
-  </p:clrMapOvr>
+  <p:timing>
+    <p:tnLst>
+      <p:par>
+        <p:cTn id="1" dur="indefinite" restart="never" nodeType="tmRoot"/>
+      </p:par>
+    </p:tnLst>
+  </p:timing>
 </p:sld>
 </file>
 
@@ -5466,9 +5991,112 @@
           <a:chExt cx="0" cy="0"/>
         </a:xfrm>
       </p:grpSpPr>
+      <p:sp>
+        <p:nvSpPr>
+          <p:cNvPr id="2" name="Cím 1"/>
+          <p:cNvSpPr>
+            <a:spLocks noGrp="1"/>
+          </p:cNvSpPr>
+          <p:nvPr>
+            <p:ph type="title"/>
+          </p:nvPr>
+        </p:nvSpPr>
+        <p:spPr>
+          <a:xfrm>
+            <a:off x="2598821" y="186538"/>
+            <a:ext cx="6749716" cy="1765718"/>
+          </a:xfrm>
+        </p:spPr>
+        <p:txBody>
+          <a:bodyPr>
+            <a:normAutofit fontScale="90000"/>
+          </a:bodyPr>
+          <a:lstStyle/>
+          <a:p>
+            <a:r>
+              <a:rPr lang="hu-HU" dirty="0">
+                <a:latin typeface="Times New Roman" panose="02020603050405020304" pitchFamily="18" charset="0"/>
+                <a:cs typeface="Times New Roman" panose="02020603050405020304" pitchFamily="18" charset="0"/>
+              </a:rPr>
+              <a:t>Operációs rendszer változatok</a:t>
+            </a:r>
+            <a:br>
+              <a:rPr lang="hu-HU" dirty="0">
+                <a:latin typeface="Times New Roman" panose="02020603050405020304" pitchFamily="18" charset="0"/>
+                <a:cs typeface="Times New Roman" panose="02020603050405020304" pitchFamily="18" charset="0"/>
+              </a:rPr>
+            </a:br>
+            <a:endParaRPr lang="hu-HU" sz="4300" dirty="0">
+              <a:latin typeface="Times New Roman" panose="02020603050405020304" pitchFamily="18" charset="0"/>
+              <a:cs typeface="Times New Roman" panose="02020603050405020304" pitchFamily="18" charset="0"/>
+            </a:endParaRPr>
+          </a:p>
+        </p:txBody>
+      </p:sp>
+      <p:sp>
+        <p:nvSpPr>
+          <p:cNvPr id="3" name="Tartalom helye 2"/>
+          <p:cNvSpPr>
+            <a:spLocks noGrp="1"/>
+          </p:cNvSpPr>
+          <p:nvPr>
+            <p:ph idx="1"/>
+          </p:nvPr>
+        </p:nvSpPr>
+        <p:spPr>
+          <a:xfrm>
+            <a:off x="854242" y="1867035"/>
+            <a:ext cx="2995863" cy="1850723"/>
+          </a:xfrm>
+        </p:spPr>
+        <p:txBody>
+          <a:bodyPr>
+            <a:normAutofit/>
+          </a:bodyPr>
+          <a:lstStyle/>
+          <a:p>
+            <a:r>
+              <a:rPr lang="hu-HU" sz="2400" dirty="0">
+                <a:latin typeface="Times New Roman" panose="02020603050405020304" pitchFamily="18" charset="0"/>
+                <a:cs typeface="Times New Roman" panose="02020603050405020304" pitchFamily="18" charset="0"/>
+              </a:rPr>
+              <a:t>Microsoft Windows</a:t>
+            </a:r>
+          </a:p>
+          <a:p>
+            <a:r>
+              <a:rPr lang="hu-HU" sz="2400" dirty="0">
+                <a:latin typeface="Times New Roman" panose="02020603050405020304" pitchFamily="18" charset="0"/>
+                <a:cs typeface="Times New Roman" panose="02020603050405020304" pitchFamily="18" charset="0"/>
+              </a:rPr>
+              <a:t>Linux</a:t>
+            </a:r>
+          </a:p>
+          <a:p>
+            <a:r>
+              <a:rPr lang="hu-HU" sz="2400" dirty="0">
+                <a:latin typeface="Times New Roman" panose="02020603050405020304" pitchFamily="18" charset="0"/>
+                <a:cs typeface="Times New Roman" panose="02020603050405020304" pitchFamily="18" charset="0"/>
+              </a:rPr>
+              <a:t>Mac OS </a:t>
+            </a:r>
+            <a:r>
+              <a:rPr lang="hu-HU" sz="2400" dirty="0" smtClean="0">
+                <a:latin typeface="Times New Roman" panose="02020603050405020304" pitchFamily="18" charset="0"/>
+                <a:cs typeface="Times New Roman" panose="02020603050405020304" pitchFamily="18" charset="0"/>
+              </a:rPr>
+              <a:t>X</a:t>
+            </a:r>
+            <a:endParaRPr lang="hu-HU" sz="2400" dirty="0">
+              <a:latin typeface="Times New Roman" panose="02020603050405020304" pitchFamily="18" charset="0"/>
+              <a:cs typeface="Times New Roman" panose="02020603050405020304" pitchFamily="18" charset="0"/>
+            </a:endParaRPr>
+          </a:p>
+        </p:txBody>
+      </p:sp>
       <p:pic>
         <p:nvPicPr>
-          <p:cNvPr id="5" name="Kép 4"/>
+          <p:cNvPr id="4" name="Kép 3"/>
           <p:cNvPicPr>
             <a:picLocks noChangeAspect="1"/>
           </p:cNvPicPr>
@@ -5482,8 +6110,8 @@
         </p:blipFill>
         <p:spPr>
           <a:xfrm>
-            <a:off x="1182686" y="1578889"/>
-            <a:ext cx="10164763" cy="316941"/>
+            <a:off x="1073217" y="1552075"/>
+            <a:ext cx="10513193" cy="314961"/>
           </a:xfrm>
           <a:prstGeom prst="rect">
             <a:avLst/>
@@ -5492,72 +6120,203 @@
       </p:pic>
       <p:sp>
         <p:nvSpPr>
-          <p:cNvPr id="2" name="Cím 1"/>
-          <p:cNvSpPr>
-            <a:spLocks noGrp="1"/>
-          </p:cNvSpPr>
-          <p:nvPr>
-            <p:ph type="title"/>
-          </p:nvPr>
-        </p:nvSpPr>
-        <p:spPr>
-          <a:xfrm>
-            <a:off x="1182686" y="709585"/>
-            <a:ext cx="4839716" cy="709433"/>
-          </a:xfrm>
-        </p:spPr>
-        <p:txBody>
-          <a:bodyPr>
-            <a:normAutofit/>
+          <p:cNvPr id="6" name="Szövegdoboz 5"/>
+          <p:cNvSpPr txBox="1"/>
+          <p:nvPr/>
+        </p:nvSpPr>
+        <p:spPr>
+          <a:xfrm>
+            <a:off x="7157390" y="2007566"/>
+            <a:ext cx="3705726" cy="1569660"/>
+          </a:xfrm>
+          <a:prstGeom prst="rect">
+            <a:avLst/>
+          </a:prstGeom>
+          <a:noFill/>
+        </p:spPr>
+        <p:txBody>
+          <a:bodyPr wrap="square" rtlCol="0">
+            <a:spAutoFit/>
           </a:bodyPr>
           <a:lstStyle/>
           <a:p>
-            <a:endParaRPr lang="hu-HU" sz="4300" dirty="0">
-              <a:latin typeface="Times New Roman" panose="02020603050405020304" pitchFamily="18" charset="0"/>
-              <a:cs typeface="Times New Roman" panose="02020603050405020304" pitchFamily="18" charset="0"/>
-            </a:endParaRPr>
-          </a:p>
-        </p:txBody>
-      </p:sp>
-      <p:sp>
-        <p:nvSpPr>
-          <p:cNvPr id="3" name="Tartalom helye 2"/>
-          <p:cNvSpPr>
-            <a:spLocks noGrp="1"/>
-          </p:cNvSpPr>
-          <p:nvPr>
-            <p:ph idx="1"/>
-          </p:nvPr>
-        </p:nvSpPr>
-        <p:spPr>
-          <a:xfrm>
-            <a:off x="825500" y="2093136"/>
-            <a:ext cx="2959100" cy="3673475"/>
-          </a:xfrm>
-        </p:spPr>
-        <p:txBody>
-          <a:bodyPr>
-            <a:normAutofit/>
-          </a:bodyPr>
-          <a:lstStyle/>
-          <a:p>
+            <a:r>
+              <a:rPr lang="hu-HU" sz="2400" dirty="0" err="1">
+                <a:latin typeface="Times New Roman" panose="02020603050405020304" pitchFamily="18" charset="0"/>
+                <a:cs typeface="Times New Roman" panose="02020603050405020304" pitchFamily="18" charset="0"/>
+              </a:rPr>
+              <a:t>Android</a:t>
+            </a:r>
             <a:endParaRPr lang="hu-HU" sz="2400" dirty="0">
               <a:latin typeface="Times New Roman" panose="02020603050405020304" pitchFamily="18" charset="0"/>
               <a:cs typeface="Times New Roman" panose="02020603050405020304" pitchFamily="18" charset="0"/>
             </a:endParaRPr>
           </a:p>
+          <a:p>
+            <a:r>
+              <a:rPr lang="hu-HU" sz="2400" dirty="0">
+                <a:latin typeface="Times New Roman" panose="02020603050405020304" pitchFamily="18" charset="0"/>
+                <a:cs typeface="Times New Roman" panose="02020603050405020304" pitchFamily="18" charset="0"/>
+              </a:rPr>
+              <a:t>IOS</a:t>
+            </a:r>
+          </a:p>
+          <a:p>
+            <a:r>
+              <a:rPr lang="hu-HU" sz="2400" dirty="0">
+                <a:latin typeface="Times New Roman" panose="02020603050405020304" pitchFamily="18" charset="0"/>
+                <a:cs typeface="Times New Roman" panose="02020603050405020304" pitchFamily="18" charset="0"/>
+              </a:rPr>
+              <a:t>Windows </a:t>
+            </a:r>
+            <a:r>
+              <a:rPr lang="hu-HU" sz="2400" dirty="0" err="1">
+                <a:latin typeface="Times New Roman" panose="02020603050405020304" pitchFamily="18" charset="0"/>
+                <a:cs typeface="Times New Roman" panose="02020603050405020304" pitchFamily="18" charset="0"/>
+              </a:rPr>
+              <a:t>Phone</a:t>
+            </a:r>
+            <a:endParaRPr lang="hu-HU" sz="2400" dirty="0">
+              <a:latin typeface="Times New Roman" panose="02020603050405020304" pitchFamily="18" charset="0"/>
+              <a:cs typeface="Times New Roman" panose="02020603050405020304" pitchFamily="18" charset="0"/>
+            </a:endParaRPr>
+          </a:p>
+          <a:p>
+            <a:endParaRPr lang="hu-HU" sz="2400" dirty="0">
+              <a:latin typeface="Times New Roman" panose="02020603050405020304" pitchFamily="18" charset="0"/>
+              <a:cs typeface="Times New Roman" panose="02020603050405020304" pitchFamily="18" charset="0"/>
+            </a:endParaRPr>
+          </a:p>
+        </p:txBody>
+      </p:sp>
+      <p:pic>
+        <p:nvPicPr>
+          <p:cNvPr id="5122" name="Picture 2" descr="Home | Windows Blog"/>
+          <p:cNvPicPr>
+            <a:picLocks noChangeAspect="1" noChangeArrowheads="1"/>
+          </p:cNvPicPr>
+          <p:nvPr/>
+        </p:nvPicPr>
+        <p:blipFill>
+          <a:blip r:embed="rId3" cstate="print">
+            <a:extLst>
+              <a:ext uri="{28A0092B-C50C-407E-A947-70E740481C1C}">
+                <a14:useLocalDpi xmlns:a14="http://schemas.microsoft.com/office/drawing/2010/main" val="0"/>
+              </a:ext>
+            </a:extLst>
+          </a:blip>
+          <a:srcRect/>
+          <a:stretch>
+            <a:fillRect/>
+          </a:stretch>
+        </p:blipFill>
+        <p:spPr bwMode="auto">
+          <a:xfrm>
+            <a:off x="2911933" y="2796363"/>
+            <a:ext cx="3566735" cy="1872536"/>
+          </a:xfrm>
+          <a:prstGeom prst="rect">
+            <a:avLst/>
+          </a:prstGeom>
+          <a:noFill/>
+          <a:extLst>
+            <a:ext uri="{909E8E84-426E-40DD-AFC4-6F175D3DCCD1}">
+              <a14:hiddenFill xmlns:a14="http://schemas.microsoft.com/office/drawing/2010/main">
+                <a:solidFill>
+                  <a:srgbClr val="FFFFFF"/>
+                </a:solidFill>
+              </a14:hiddenFill>
+            </a:ext>
+          </a:extLst>
+        </p:spPr>
+      </p:pic>
+      <p:pic>
+        <p:nvPicPr>
+          <p:cNvPr id="5124" name="Picture 4" descr="Android | The platform pushing what's possible"/>
+          <p:cNvPicPr>
+            <a:picLocks noChangeAspect="1" noChangeArrowheads="1"/>
+          </p:cNvPicPr>
+          <p:nvPr/>
+        </p:nvPicPr>
+        <p:blipFill>
+          <a:blip r:embed="rId4">
+            <a:extLst>
+              <a:ext uri="{28A0092B-C50C-407E-A947-70E740481C1C}">
+                <a14:useLocalDpi xmlns:a14="http://schemas.microsoft.com/office/drawing/2010/main" val="0"/>
+              </a:ext>
+            </a:extLst>
+          </a:blip>
+          <a:srcRect/>
+          <a:stretch>
+            <a:fillRect/>
+          </a:stretch>
+        </p:blipFill>
+        <p:spPr bwMode="auto">
+          <a:xfrm>
+            <a:off x="7978799" y="3317793"/>
+            <a:ext cx="3437490" cy="1806026"/>
+          </a:xfrm>
+          <a:prstGeom prst="rect">
+            <a:avLst/>
+          </a:prstGeom>
+          <a:noFill/>
+          <a:extLst>
+            <a:ext uri="{909E8E84-426E-40DD-AFC4-6F175D3DCCD1}">
+              <a14:hiddenFill xmlns:a14="http://schemas.microsoft.com/office/drawing/2010/main">
+                <a:solidFill>
+                  <a:srgbClr val="FFFFFF"/>
+                </a:solidFill>
+              </a14:hiddenFill>
+            </a:ext>
+          </a:extLst>
+        </p:spPr>
+      </p:pic>
+      <p:sp>
+        <p:nvSpPr>
+          <p:cNvPr id="5" name="Szövegdoboz 4"/>
+          <p:cNvSpPr txBox="1"/>
+          <p:nvPr/>
+        </p:nvSpPr>
+        <p:spPr>
+          <a:xfrm>
+            <a:off x="3646967" y="5513006"/>
+            <a:ext cx="1422184" cy="215444"/>
+          </a:xfrm>
+          <a:prstGeom prst="rect">
+            <a:avLst/>
+          </a:prstGeom>
+          <a:noFill/>
+        </p:spPr>
+        <p:txBody>
+          <a:bodyPr wrap="none" rtlCol="0">
+            <a:spAutoFit/>
+          </a:bodyPr>
+          <a:lstStyle/>
+          <a:p>
+            <a:r>
+              <a:rPr lang="hu-HU" sz="800" dirty="0"/>
+              <a:t>https://tinyurl.com/2aw7xj4a</a:t>
+            </a:r>
+          </a:p>
         </p:txBody>
       </p:sp>
     </p:spTree>
     <p:extLst>
       <p:ext uri="{BB962C8B-B14F-4D97-AF65-F5344CB8AC3E}">
-        <p14:creationId xmlns:p14="http://schemas.microsoft.com/office/powerpoint/2010/main" val="1474880856"/>
+        <p14:creationId xmlns:p14="http://schemas.microsoft.com/office/powerpoint/2010/main" val="1350070956"/>
       </p:ext>
     </p:extLst>
   </p:cSld>
   <p:clrMapOvr>
     <a:masterClrMapping/>
   </p:clrMapOvr>
+  <p:timing>
+    <p:tnLst>
+      <p:par>
+        <p:cTn id="1" dur="indefinite" restart="never" nodeType="tmRoot"/>
+      </p:par>
+    </p:tnLst>
+  </p:timing>
 </p:sld>
 </file>
 
@@ -5845,15 +6604,6 @@
 </file>
 
 <file path=customXml/item1.xml><?xml version="1.0" encoding="utf-8"?>
-<?mso-contentType ?>
-<FormTemplates xmlns="http://schemas.microsoft.com/sharepoint/v3/contenttype/forms">
-  <Display>DocumentLibraryForm</Display>
-  <Edit>DocumentLibraryForm</Edit>
-  <New>DocumentLibraryForm</New>
-</FormTemplates>
-</file>
-
-<file path=customXml/item2.xml><?xml version="1.0" encoding="utf-8"?>
 <ct:contentTypeSchema xmlns:ct="http://schemas.microsoft.com/office/2006/metadata/contentType" xmlns:ma="http://schemas.microsoft.com/office/2006/metadata/properties/metaAttributes" ct:_="" ma:_="" ma:contentTypeName="Dokumentum" ma:contentTypeID="0x010100CD77C0BABE2EC74395F8CE7BF47B96A4" ma:contentTypeVersion="3" ma:contentTypeDescription="Új dokumentum létrehozása." ma:contentTypeScope="" ma:versionID="223336d302af066c8bce88bcd733e1b3">
   <xsd:schema xmlns:xsd="http://www.w3.org/2001/XMLSchema" xmlns:xs="http://www.w3.org/2001/XMLSchema" xmlns:p="http://schemas.microsoft.com/office/2006/metadata/properties" xmlns:ns2="cda7f449-9791-4026-adf0-6249e0f1a277" targetNamespace="http://schemas.microsoft.com/office/2006/metadata/properties" ma:root="true" ma:fieldsID="0df44673f79e6bec3f9c853bca4d137d" ns2:_="">
     <xsd:import namespace="cda7f449-9791-4026-adf0-6249e0f1a277"/>
@@ -5991,6 +6741,15 @@
 </ct:contentTypeSchema>
 </file>
 
+<file path=customXml/item2.xml><?xml version="1.0" encoding="utf-8"?>
+<?mso-contentType ?>
+<FormTemplates xmlns="http://schemas.microsoft.com/sharepoint/v3/contenttype/forms">
+  <Display>DocumentLibraryForm</Display>
+  <Edit>DocumentLibraryForm</Edit>
+  <New>DocumentLibraryForm</New>
+</FormTemplates>
+</file>
+
 <file path=customXml/item3.xml><?xml version="1.0" encoding="utf-8"?>
 <p:properties xmlns:p="http://schemas.microsoft.com/office/2006/metadata/properties" xmlns:xsi="http://www.w3.org/2001/XMLSchema-instance" xmlns:pc="http://schemas.microsoft.com/office/infopath/2007/PartnerControls">
   <documentManagement>
@@ -6000,14 +6759,6 @@
 </file>
 
 <file path=customXml/itemProps1.xml><?xml version="1.0" encoding="utf-8"?>
-<ds:datastoreItem xmlns:ds="http://schemas.openxmlformats.org/officeDocument/2006/customXml" ds:itemID="{B114293F-6EE4-4834-97C1-1E9AD42354D9}">
-  <ds:schemaRefs>
-    <ds:schemaRef ds:uri="http://schemas.microsoft.com/sharepoint/v3/contenttype/forms"/>
-  </ds:schemaRefs>
-</ds:datastoreItem>
-</file>
-
-<file path=customXml/itemProps2.xml><?xml version="1.0" encoding="utf-8"?>
 <ds:datastoreItem xmlns:ds="http://schemas.openxmlformats.org/officeDocument/2006/customXml" ds:itemID="{E3819425-6C3A-4E76-BE76-D4FC8AB59E43}">
   <ds:schemaRefs>
     <ds:schemaRef ds:uri="http://schemas.microsoft.com/office/2006/metadata/contentType"/>
@@ -6025,6 +6776,14 @@
 </ds:datastoreItem>
 </file>
 
+<file path=customXml/itemProps2.xml><?xml version="1.0" encoding="utf-8"?>
+<ds:datastoreItem xmlns:ds="http://schemas.openxmlformats.org/officeDocument/2006/customXml" ds:itemID="{B114293F-6EE4-4834-97C1-1E9AD42354D9}">
+  <ds:schemaRefs>
+    <ds:schemaRef ds:uri="http://schemas.microsoft.com/sharepoint/v3/contenttype/forms"/>
+  </ds:schemaRefs>
+</ds:datastoreItem>
+</file>
+
 <file path=customXml/itemProps3.xml><?xml version="1.0" encoding="utf-8"?>
 <ds:datastoreItem xmlns:ds="http://schemas.openxmlformats.org/officeDocument/2006/customXml" ds:itemID="{B47C1B41-847B-4982-A61B-2DE97E148F4F}">
   <ds:schemaRefs>

</xml_diff>